<commit_message>
Added bits to Session 3
</commit_message>
<xml_diff>
--- a/Session 3 - Advanced data structures/MATLAB Session 3.pptx
+++ b/Session 3 - Advanced data structures/MATLAB Session 3.pptx
@@ -5,20 +5,22 @@
     <p:sldMasterId id="2147483678" r:id="rId1"/>
   </p:sldMasterIdLst>
   <p:notesMasterIdLst>
-    <p:notesMasterId r:id="rId13"/>
+    <p:notesMasterId r:id="rId15"/>
   </p:notesMasterIdLst>
   <p:sldIdLst>
     <p:sldId id="316" r:id="rId2"/>
     <p:sldId id="351" r:id="rId3"/>
     <p:sldId id="407" r:id="rId4"/>
     <p:sldId id="361" r:id="rId5"/>
-    <p:sldId id="445" r:id="rId6"/>
-    <p:sldId id="448" r:id="rId7"/>
-    <p:sldId id="449" r:id="rId8"/>
-    <p:sldId id="446" r:id="rId9"/>
-    <p:sldId id="447" r:id="rId10"/>
-    <p:sldId id="444" r:id="rId11"/>
-    <p:sldId id="443" r:id="rId12"/>
+    <p:sldId id="450" r:id="rId6"/>
+    <p:sldId id="451" r:id="rId7"/>
+    <p:sldId id="445" r:id="rId8"/>
+    <p:sldId id="448" r:id="rId9"/>
+    <p:sldId id="449" r:id="rId10"/>
+    <p:sldId id="446" r:id="rId11"/>
+    <p:sldId id="447" r:id="rId12"/>
+    <p:sldId id="444" r:id="rId13"/>
+    <p:sldId id="443" r:id="rId14"/>
   </p:sldIdLst>
   <p:sldSz cx="12192000" cy="6858000"/>
   <p:notesSz cx="6669088" cy="9926638"/>
@@ -2328,6 +2330,309 @@
             <a:pPr algn="ctr"/>
             <a:r>
               <a:rPr lang="en-GB" sz="3200" dirty="0"/>
+              <a:t>Advanced image reading (</a:t>
+            </a:r>
+            <a:r>
+              <a:rPr lang="en-GB" sz="3200" dirty="0" err="1"/>
+              <a:t>Bioformats</a:t>
+            </a:r>
+            <a:r>
+              <a:rPr lang="en-GB" sz="3200" dirty="0"/>
+              <a:t>)</a:t>
+            </a:r>
+            <a:endParaRPr lang="en-GB" sz="2800" dirty="0">
+              <a:solidFill>
+                <a:schemeClr val="tx1"/>
+              </a:solidFill>
+            </a:endParaRPr>
+          </a:p>
+        </p:txBody>
+      </p:sp>
+    </p:spTree>
+    <p:extLst>
+      <p:ext uri="{BB962C8B-B14F-4D97-AF65-F5344CB8AC3E}">
+        <p14:creationId xmlns:p14="http://schemas.microsoft.com/office/powerpoint/2010/main" val="3361938738"/>
+      </p:ext>
+    </p:extLst>
+  </p:cSld>
+  <p:clrMapOvr>
+    <a:masterClrMapping/>
+  </p:clrMapOvr>
+  <mc:AlternateContent xmlns:mc="http://schemas.openxmlformats.org/markup-compatibility/2006" xmlns:p14="http://schemas.microsoft.com/office/powerpoint/2010/main">
+    <mc:Choice Requires="p14">
+      <p:transition p14:dur="300">
+        <p:fade/>
+      </p:transition>
+    </mc:Choice>
+    <mc:Fallback xmlns="">
+      <p:transition>
+        <p:fade/>
+      </p:transition>
+    </mc:Fallback>
+  </mc:AlternateContent>
+</p:sld>
+</file>
+
+<file path=ppt/slides/slide11.xml><?xml version="1.0" encoding="utf-8"?>
+<p:sld xmlns:a="http://schemas.openxmlformats.org/drawingml/2006/main" xmlns:r="http://schemas.openxmlformats.org/officeDocument/2006/relationships" xmlns:p="http://schemas.openxmlformats.org/presentationml/2006/main">
+  <p:cSld>
+    <p:spTree>
+      <p:nvGrpSpPr>
+        <p:cNvPr id="1" name=""/>
+        <p:cNvGrpSpPr/>
+        <p:nvPr/>
+      </p:nvGrpSpPr>
+      <p:grpSpPr>
+        <a:xfrm>
+          <a:off x="0" y="0"/>
+          <a:ext cx="0" cy="0"/>
+          <a:chOff x="0" y="0"/>
+          <a:chExt cx="0" cy="0"/>
+        </a:xfrm>
+      </p:grpSpPr>
+      <p:sp>
+        <p:nvSpPr>
+          <p:cNvPr id="2" name="Title 1">
+            <a:extLst>
+              <a:ext uri="{FF2B5EF4-FFF2-40B4-BE49-F238E27FC236}">
+                <a16:creationId xmlns:a16="http://schemas.microsoft.com/office/drawing/2014/main" id="{297C1240-D4CE-4AD2-96B1-DBD7075D8052}"/>
+              </a:ext>
+            </a:extLst>
+          </p:cNvPr>
+          <p:cNvSpPr>
+            <a:spLocks noGrp="1"/>
+          </p:cNvSpPr>
+          <p:nvPr>
+            <p:ph type="title"/>
+          </p:nvPr>
+        </p:nvSpPr>
+        <p:spPr/>
+        <p:txBody>
+          <a:bodyPr/>
+          <a:lstStyle/>
+          <a:p>
+            <a:endParaRPr lang="en-GB"/>
+          </a:p>
+        </p:txBody>
+      </p:sp>
+      <p:sp>
+        <p:nvSpPr>
+          <p:cNvPr id="3" name="Content Placeholder 2">
+            <a:extLst>
+              <a:ext uri="{FF2B5EF4-FFF2-40B4-BE49-F238E27FC236}">
+                <a16:creationId xmlns:a16="http://schemas.microsoft.com/office/drawing/2014/main" id="{7E90A914-5E00-4AAB-802D-4C98FA2788C1}"/>
+              </a:ext>
+            </a:extLst>
+          </p:cNvPr>
+          <p:cNvSpPr>
+            <a:spLocks noGrp="1"/>
+          </p:cNvSpPr>
+          <p:nvPr>
+            <p:ph idx="1"/>
+          </p:nvPr>
+        </p:nvSpPr>
+        <p:spPr/>
+        <p:txBody>
+          <a:bodyPr/>
+          <a:lstStyle/>
+          <a:p>
+            <a:r>
+              <a:rPr lang="en-GB" sz="2400" dirty="0"/>
+              <a:t>[Maybe do this after OOP, as BF has OOP format]</a:t>
+            </a:r>
+          </a:p>
+          <a:p>
+            <a:r>
+              <a:rPr lang="en-GB" sz="2400" dirty="0"/>
+              <a:t>Quick intro to </a:t>
+            </a:r>
+            <a:r>
+              <a:rPr lang="en-GB" sz="2400" dirty="0" err="1"/>
+              <a:t>Bioformats</a:t>
+            </a:r>
+            <a:endParaRPr lang="en-GB" sz="2400" dirty="0"/>
+          </a:p>
+          <a:p>
+            <a:pPr lvl="1"/>
+            <a:r>
+              <a:rPr lang="en-GB" sz="2000" dirty="0"/>
+              <a:t>Example formats it can work with</a:t>
+            </a:r>
+          </a:p>
+          <a:p>
+            <a:pPr lvl="1"/>
+            <a:r>
+              <a:rPr lang="en-GB" sz="2000" dirty="0"/>
+              <a:t>Mention metadata (what sort of values it stores)</a:t>
+            </a:r>
+          </a:p>
+          <a:p>
+            <a:r>
+              <a:rPr lang="en-GB" sz="2400" dirty="0"/>
+              <a:t>Method of getting </a:t>
+            </a:r>
+            <a:r>
+              <a:rPr lang="en-GB" sz="2400" dirty="0" err="1"/>
+              <a:t>Bioformats</a:t>
+            </a:r>
+            <a:r>
+              <a:rPr lang="en-GB" sz="2400" dirty="0"/>
+              <a:t> to work</a:t>
+            </a:r>
+          </a:p>
+          <a:p>
+            <a:pPr lvl="1"/>
+            <a:r>
+              <a:rPr lang="en-GB" sz="2000" dirty="0"/>
+              <a:t>Where to download from</a:t>
+            </a:r>
+          </a:p>
+          <a:p>
+            <a:pPr lvl="2"/>
+            <a:r>
+              <a:rPr lang="en-GB" sz="1800" dirty="0"/>
+              <a:t>Provide link</a:t>
+            </a:r>
+          </a:p>
+          <a:p>
+            <a:pPr lvl="1"/>
+            <a:r>
+              <a:rPr lang="en-GB" sz="2000" dirty="0"/>
+              <a:t>Installation</a:t>
+            </a:r>
+          </a:p>
+          <a:p>
+            <a:pPr lvl="2"/>
+            <a:r>
+              <a:rPr lang="en-GB" sz="1800" dirty="0"/>
+              <a:t>Download, unzip, add to path</a:t>
+            </a:r>
+          </a:p>
+          <a:p>
+            <a:pPr lvl="1"/>
+            <a:r>
+              <a:rPr lang="en-GB" sz="2000" dirty="0"/>
+              <a:t>Running a basic LIF import</a:t>
+            </a:r>
+          </a:p>
+          <a:p>
+            <a:pPr lvl="1"/>
+            <a:r>
+              <a:rPr lang="en-GB" sz="2000" dirty="0"/>
+              <a:t>Dealing with multiple series</a:t>
+            </a:r>
+          </a:p>
+          <a:p>
+            <a:pPr lvl="1"/>
+            <a:r>
+              <a:rPr lang="en-GB" sz="2000" dirty="0"/>
+              <a:t>Dealing with metadata</a:t>
+            </a:r>
+          </a:p>
+          <a:p>
+            <a:pPr lvl="1"/>
+            <a:endParaRPr lang="en-GB" sz="2000" dirty="0"/>
+          </a:p>
+        </p:txBody>
+      </p:sp>
+    </p:spTree>
+    <p:extLst>
+      <p:ext uri="{BB962C8B-B14F-4D97-AF65-F5344CB8AC3E}">
+        <p14:creationId xmlns:p14="http://schemas.microsoft.com/office/powerpoint/2010/main" val="677120248"/>
+      </p:ext>
+    </p:extLst>
+  </p:cSld>
+  <p:clrMapOvr>
+    <a:masterClrMapping/>
+  </p:clrMapOvr>
+  <mc:AlternateContent xmlns:mc="http://schemas.openxmlformats.org/markup-compatibility/2006" xmlns:p14="http://schemas.microsoft.com/office/powerpoint/2010/main">
+    <mc:Choice Requires="p14">
+      <p:transition p14:dur="300">
+        <p:fade/>
+      </p:transition>
+    </mc:Choice>
+    <mc:Fallback xmlns="">
+      <p:transition>
+        <p:fade/>
+      </p:transition>
+    </mc:Fallback>
+  </mc:AlternateContent>
+</p:sld>
+</file>
+
+<file path=ppt/slides/slide12.xml><?xml version="1.0" encoding="utf-8"?>
+<p:sld xmlns:a="http://schemas.openxmlformats.org/drawingml/2006/main" xmlns:r="http://schemas.openxmlformats.org/officeDocument/2006/relationships" xmlns:p="http://schemas.openxmlformats.org/presentationml/2006/main">
+  <p:cSld>
+    <p:spTree>
+      <p:nvGrpSpPr>
+        <p:cNvPr id="1" name=""/>
+        <p:cNvGrpSpPr/>
+        <p:nvPr/>
+      </p:nvGrpSpPr>
+      <p:grpSpPr>
+        <a:xfrm>
+          <a:off x="0" y="0"/>
+          <a:ext cx="0" cy="0"/>
+          <a:chOff x="0" y="0"/>
+          <a:chExt cx="0" cy="0"/>
+        </a:xfrm>
+      </p:grpSpPr>
+      <p:sp>
+        <p:nvSpPr>
+          <p:cNvPr id="2" name="Title 1">
+            <a:extLst>
+              <a:ext uri="{FF2B5EF4-FFF2-40B4-BE49-F238E27FC236}">
+                <a16:creationId xmlns:a16="http://schemas.microsoft.com/office/drawing/2014/main" id="{8EEF9218-B50A-424A-A99D-57BA08F4A8E3}"/>
+              </a:ext>
+            </a:extLst>
+          </p:cNvPr>
+          <p:cNvSpPr>
+            <a:spLocks noGrp="1"/>
+          </p:cNvSpPr>
+          <p:nvPr>
+            <p:ph type="title"/>
+          </p:nvPr>
+        </p:nvSpPr>
+        <p:spPr/>
+        <p:txBody>
+          <a:bodyPr/>
+          <a:lstStyle/>
+          <a:p>
+            <a:endParaRPr lang="en-GB" dirty="0"/>
+          </a:p>
+        </p:txBody>
+      </p:sp>
+      <p:sp>
+        <p:nvSpPr>
+          <p:cNvPr id="4" name="TextBox 3">
+            <a:extLst>
+              <a:ext uri="{FF2B5EF4-FFF2-40B4-BE49-F238E27FC236}">
+                <a16:creationId xmlns:a16="http://schemas.microsoft.com/office/drawing/2014/main" id="{31426854-EE0B-4A5A-AC6D-2BF50C4B1D90}"/>
+              </a:ext>
+            </a:extLst>
+          </p:cNvPr>
+          <p:cNvSpPr txBox="1"/>
+          <p:nvPr/>
+        </p:nvSpPr>
+        <p:spPr>
+          <a:xfrm>
+            <a:off x="2052408" y="3136612"/>
+            <a:ext cx="8087183" cy="584775"/>
+          </a:xfrm>
+          <a:prstGeom prst="rect">
+            <a:avLst/>
+          </a:prstGeom>
+          <a:noFill/>
+        </p:spPr>
+        <p:txBody>
+          <a:bodyPr wrap="square" rtlCol="0">
+            <a:spAutoFit/>
+          </a:bodyPr>
+          <a:lstStyle/>
+          <a:p>
+            <a:pPr algn="ctr"/>
+            <a:r>
+              <a:rPr lang="en-GB" sz="3200" dirty="0"/>
               <a:t>Questions?!</a:t>
             </a:r>
             <a:endParaRPr lang="en-GB" sz="2800" dirty="0">
@@ -2363,7 +2668,7 @@
 </p:sld>
 </file>
 
-<file path=ppt/slides/slide11.xml><?xml version="1.0" encoding="utf-8"?>
+<file path=ppt/slides/slide13.xml><?xml version="1.0" encoding="utf-8"?>
 <p:sld xmlns:a="http://schemas.openxmlformats.org/drawingml/2006/main" xmlns:r="http://schemas.openxmlformats.org/officeDocument/2006/relationships" xmlns:p="http://schemas.openxmlformats.org/presentationml/2006/main">
   <p:cSld>
     <p:spTree>
@@ -3995,7 +4300,7 @@
           <p:cNvPr id="2" name="Title 1">
             <a:extLst>
               <a:ext uri="{FF2B5EF4-FFF2-40B4-BE49-F238E27FC236}">
-                <a16:creationId xmlns:a16="http://schemas.microsoft.com/office/drawing/2014/main" id="{D0D85ECA-B5C8-49EC-818A-B21ADF7B7361}"/>
+                <a16:creationId xmlns:a16="http://schemas.microsoft.com/office/drawing/2014/main" id="{FB0D9636-2B3A-4E3D-9B13-904FF3CE8CE3}"/>
               </a:ext>
             </a:extLst>
           </p:cNvPr>
@@ -4011,7 +4316,10 @@
           <a:bodyPr/>
           <a:lstStyle/>
           <a:p>
-            <a:endParaRPr lang="en-GB" dirty="0"/>
+            <a:r>
+              <a:rPr lang="en-GB" dirty="0"/>
+              <a:t>Advanced data structures</a:t>
+            </a:r>
           </a:p>
         </p:txBody>
       </p:sp>
@@ -4020,7 +4328,7 @@
           <p:cNvPr id="3" name="Content Placeholder 2">
             <a:extLst>
               <a:ext uri="{FF2B5EF4-FFF2-40B4-BE49-F238E27FC236}">
-                <a16:creationId xmlns:a16="http://schemas.microsoft.com/office/drawing/2014/main" id="{24EE01E8-E11D-4130-9055-D854AF20B51C}"/>
+                <a16:creationId xmlns:a16="http://schemas.microsoft.com/office/drawing/2014/main" id="{DFE43EAF-8F5E-44D2-BF28-45DAFCB5DD96}"/>
               </a:ext>
             </a:extLst>
           </p:cNvPr>
@@ -4037,106 +4345,101 @@
           <a:lstStyle/>
           <a:p>
             <a:r>
-              <a:rPr lang="en-GB" sz="2000" dirty="0"/>
+              <a:rPr lang="en-GB" dirty="0"/>
+              <a:t>Arrays and matrices recap</a:t>
+            </a:r>
+          </a:p>
+          <a:p>
+            <a:pPr lvl="1"/>
+            <a:r>
+              <a:rPr lang="en-GB" dirty="0"/>
+              <a:t>Regular grid of numbers in N dimensions</a:t>
+            </a:r>
+          </a:p>
+          <a:p>
+            <a:pPr lvl="1"/>
+            <a:r>
+              <a:rPr lang="en-GB" dirty="0">
+                <a:sym typeface="Wingdings" panose="05000000000000000000" pitchFamily="2" charset="2"/>
+              </a:rPr>
+              <a:t> </a:t>
+            </a:r>
+            <a:r>
+              <a:rPr lang="en-GB" dirty="0"/>
+              <a:t>Fast access to subsets via indexing</a:t>
+            </a:r>
+          </a:p>
+          <a:p>
+            <a:pPr lvl="1"/>
+            <a:r>
+              <a:rPr lang="en-GB" dirty="0">
+                <a:sym typeface="Wingdings" panose="05000000000000000000" pitchFamily="2" charset="2"/>
+              </a:rPr>
+              <a:t> </a:t>
+            </a:r>
+            <a:r>
+              <a:rPr lang="en-GB" dirty="0"/>
+              <a:t>Fast calculations on all values</a:t>
+            </a:r>
+          </a:p>
+          <a:p>
+            <a:pPr lvl="1"/>
+            <a:r>
+              <a:rPr lang="en-GB" dirty="0">
+                <a:sym typeface="Wingdings" panose="05000000000000000000" pitchFamily="2" charset="2"/>
+              </a:rPr>
+              <a:t> </a:t>
+            </a:r>
+            <a:r>
+              <a:rPr lang="en-GB" dirty="0"/>
+              <a:t>Can’t store text</a:t>
+            </a:r>
+          </a:p>
+          <a:p>
+            <a:pPr lvl="1"/>
+            <a:endParaRPr lang="en-GB" sz="1200" dirty="0"/>
+          </a:p>
+          <a:p>
+            <a:r>
+              <a:rPr lang="en-GB" dirty="0"/>
+              <a:t>Alternatives</a:t>
+            </a:r>
+          </a:p>
+          <a:p>
+            <a:pPr lvl="1"/>
+            <a:r>
+              <a:rPr lang="en-GB" dirty="0"/>
               <a:t>Cell arrays</a:t>
             </a:r>
           </a:p>
           <a:p>
             <a:pPr lvl="1"/>
             <a:r>
-              <a:rPr lang="en-GB" sz="1800" dirty="0"/>
-              <a:t>[Is there actually any need to cover these? Maybe just a quick mention]</a:t>
+              <a:rPr lang="en-GB" dirty="0"/>
+              <a:t>Structure arrays (“struct”)</a:t>
             </a:r>
           </a:p>
           <a:p>
             <a:pPr lvl="1"/>
             <a:r>
-              <a:rPr lang="en-GB" sz="1800" dirty="0"/>
-              <a:t>Creating cell arrays</a:t>
+              <a:rPr lang="en-GB" dirty="0"/>
+              <a:t>Tables</a:t>
             </a:r>
           </a:p>
           <a:p>
             <a:pPr lvl="1"/>
-            <a:r>
-              <a:rPr lang="en-GB" sz="1800" dirty="0"/>
-              <a:t>Each cell can contain data of a different type (e.g. text and numeric)</a:t>
-            </a:r>
-          </a:p>
-          <a:p>
-            <a:pPr lvl="2"/>
-            <a:r>
-              <a:rPr lang="en-GB" sz="1400" dirty="0"/>
-              <a:t>[Have these effectively been superseded by tables?]</a:t>
-            </a:r>
-            <a:endParaRPr lang="en-GB" sz="1800" dirty="0"/>
-          </a:p>
-          <a:p>
-            <a:r>
-              <a:rPr lang="en-GB" sz="2000" dirty="0"/>
-              <a:t>Structure arrays</a:t>
-            </a:r>
+            <a:endParaRPr lang="en-GB" dirty="0"/>
           </a:p>
           <a:p>
             <a:pPr lvl="1"/>
-            <a:r>
-              <a:rPr lang="en-GB" sz="1800" dirty="0"/>
-              <a:t>Store variables in a structure by field names</a:t>
-            </a:r>
-          </a:p>
-          <a:p>
-            <a:pPr lvl="1"/>
-            <a:r>
-              <a:rPr lang="en-GB" sz="1800" dirty="0"/>
-              <a:t>Good for grouping data [what else are they good for?]</a:t>
-            </a:r>
-          </a:p>
-          <a:p>
-            <a:pPr lvl="1"/>
-            <a:r>
-              <a:rPr lang="en-GB" sz="1800" dirty="0"/>
-              <a:t>Creating structure arrays</a:t>
-            </a:r>
-          </a:p>
-          <a:p>
-            <a:pPr lvl="1"/>
-            <a:r>
-              <a:rPr lang="en-GB" sz="1800" dirty="0"/>
-              <a:t>Accessing data in structure arrays</a:t>
-            </a:r>
-          </a:p>
-          <a:p>
-            <a:r>
-              <a:rPr lang="en-GB" sz="2000" dirty="0"/>
-              <a:t>Tables</a:t>
-            </a:r>
-          </a:p>
-          <a:p>
-            <a:pPr lvl="1"/>
-            <a:r>
-              <a:rPr lang="en-GB" sz="1800" dirty="0"/>
-              <a:t>[When were they introduced?]</a:t>
-            </a:r>
-          </a:p>
-          <a:p>
-            <a:pPr lvl="1"/>
-            <a:r>
-              <a:rPr lang="en-GB" sz="1800" dirty="0"/>
-              <a:t>[What are the benefits?]</a:t>
-            </a:r>
-          </a:p>
-          <a:p>
-            <a:pPr lvl="1"/>
-            <a:r>
-              <a:rPr lang="en-GB" sz="1800" dirty="0"/>
-              <a:t>[Loading data directly from file into a table]</a:t>
-            </a:r>
+            <a:endParaRPr lang="en-GB" dirty="0"/>
           </a:p>
         </p:txBody>
       </p:sp>
     </p:spTree>
     <p:extLst>
       <p:ext uri="{BB962C8B-B14F-4D97-AF65-F5344CB8AC3E}">
-        <p14:creationId xmlns:p14="http://schemas.microsoft.com/office/powerpoint/2010/main" val="3962622575"/>
+        <p14:creationId xmlns:p14="http://schemas.microsoft.com/office/powerpoint/2010/main" val="875391173"/>
       </p:ext>
     </p:extLst>
   </p:cSld>
@@ -4180,7 +4483,7 @@
           <p:cNvPr id="2" name="Title 1">
             <a:extLst>
               <a:ext uri="{FF2B5EF4-FFF2-40B4-BE49-F238E27FC236}">
-                <a16:creationId xmlns:a16="http://schemas.microsoft.com/office/drawing/2014/main" id="{8EEF9218-B50A-424A-A99D-57BA08F4A8E3}"/>
+                <a16:creationId xmlns:a16="http://schemas.microsoft.com/office/drawing/2014/main" id="{FB0D9636-2B3A-4E3D-9B13-904FF3CE8CE3}"/>
               </a:ext>
             </a:extLst>
           </p:cNvPr>
@@ -4196,55 +4499,42 @@
           <a:bodyPr/>
           <a:lstStyle/>
           <a:p>
-            <a:endParaRPr lang="en-GB" dirty="0"/>
+            <a:r>
+              <a:rPr lang="en-GB" dirty="0"/>
+              <a:t>Cell arrays</a:t>
+            </a:r>
           </a:p>
         </p:txBody>
       </p:sp>
       <p:sp>
         <p:nvSpPr>
-          <p:cNvPr id="4" name="TextBox 3">
+          <p:cNvPr id="3" name="Content Placeholder 2">
             <a:extLst>
               <a:ext uri="{FF2B5EF4-FFF2-40B4-BE49-F238E27FC236}">
-                <a16:creationId xmlns:a16="http://schemas.microsoft.com/office/drawing/2014/main" id="{31426854-EE0B-4A5A-AC6D-2BF50C4B1D90}"/>
+                <a16:creationId xmlns:a16="http://schemas.microsoft.com/office/drawing/2014/main" id="{DFE43EAF-8F5E-44D2-BF28-45DAFCB5DD96}"/>
               </a:ext>
             </a:extLst>
           </p:cNvPr>
-          <p:cNvSpPr txBox="1"/>
-          <p:nvPr/>
+          <p:cNvSpPr>
+            <a:spLocks noGrp="1"/>
+          </p:cNvSpPr>
+          <p:nvPr>
+            <p:ph idx="1"/>
+          </p:nvPr>
         </p:nvSpPr>
-        <p:spPr>
-          <a:xfrm>
-            <a:off x="2052408" y="3136612"/>
-            <a:ext cx="8087183" cy="584775"/>
-          </a:xfrm>
-          <a:prstGeom prst="rect">
-            <a:avLst/>
-          </a:prstGeom>
-          <a:noFill/>
-        </p:spPr>
+        <p:spPr/>
         <p:txBody>
-          <a:bodyPr wrap="square" rtlCol="0">
-            <a:spAutoFit/>
-          </a:bodyPr>
+          <a:bodyPr/>
           <a:lstStyle/>
           <a:p>
-            <a:pPr algn="ctr"/>
-            <a:r>
-              <a:rPr lang="en-GB" sz="3200" dirty="0"/>
-              <a:t>Object oriented programming</a:t>
-            </a:r>
-            <a:endParaRPr lang="en-GB" sz="2800" dirty="0">
-              <a:solidFill>
-                <a:schemeClr val="tx1"/>
-              </a:solidFill>
-            </a:endParaRPr>
+            <a:endParaRPr lang="en-GB" dirty="0"/>
           </a:p>
         </p:txBody>
       </p:sp>
     </p:spTree>
     <p:extLst>
       <p:ext uri="{BB962C8B-B14F-4D97-AF65-F5344CB8AC3E}">
-        <p14:creationId xmlns:p14="http://schemas.microsoft.com/office/powerpoint/2010/main" val="4130560997"/>
+        <p14:creationId xmlns:p14="http://schemas.microsoft.com/office/powerpoint/2010/main" val="814191236"/>
       </p:ext>
     </p:extLst>
   </p:cSld>
@@ -4288,7 +4578,7 @@
           <p:cNvPr id="2" name="Title 1">
             <a:extLst>
               <a:ext uri="{FF2B5EF4-FFF2-40B4-BE49-F238E27FC236}">
-                <a16:creationId xmlns:a16="http://schemas.microsoft.com/office/drawing/2014/main" id="{297C1240-D4CE-4AD2-96B1-DBD7075D8052}"/>
+                <a16:creationId xmlns:a16="http://schemas.microsoft.com/office/drawing/2014/main" id="{D0D85ECA-B5C8-49EC-818A-B21ADF7B7361}"/>
               </a:ext>
             </a:extLst>
           </p:cNvPr>
@@ -4304,7 +4594,7 @@
           <a:bodyPr/>
           <a:lstStyle/>
           <a:p>
-            <a:endParaRPr lang="en-GB"/>
+            <a:endParaRPr lang="en-GB" dirty="0"/>
           </a:p>
         </p:txBody>
       </p:sp>
@@ -4313,7 +4603,7 @@
           <p:cNvPr id="3" name="Content Placeholder 2">
             <a:extLst>
               <a:ext uri="{FF2B5EF4-FFF2-40B4-BE49-F238E27FC236}">
-                <a16:creationId xmlns:a16="http://schemas.microsoft.com/office/drawing/2014/main" id="{7E90A914-5E00-4AAB-802D-4C98FA2788C1}"/>
+                <a16:creationId xmlns:a16="http://schemas.microsoft.com/office/drawing/2014/main" id="{24EE01E8-E11D-4130-9055-D854AF20B51C}"/>
               </a:ext>
             </a:extLst>
           </p:cNvPr>
@@ -4330,78 +4620,106 @@
           <a:lstStyle/>
           <a:p>
             <a:r>
-              <a:rPr lang="en-GB" dirty="0"/>
-              <a:t>Intro to OOP</a:t>
+              <a:rPr lang="en-GB" sz="2000" dirty="0"/>
+              <a:t>Cell arrays</a:t>
             </a:r>
           </a:p>
           <a:p>
             <a:pPr lvl="1"/>
             <a:r>
-              <a:rPr lang="en-GB" dirty="0"/>
-              <a:t>What are objects, classes and methods</a:t>
+              <a:rPr lang="en-GB" sz="1800" dirty="0"/>
+              <a:t>[Is there actually any need to cover these? Maybe just a quick mention]</a:t>
             </a:r>
           </a:p>
           <a:p>
             <a:pPr lvl="1"/>
             <a:r>
-              <a:rPr lang="en-GB" dirty="0"/>
-              <a:t>Why would we use this?</a:t>
-            </a:r>
-          </a:p>
-          <a:p>
-            <a:r>
-              <a:rPr lang="en-GB" dirty="0"/>
-              <a:t>Example of OOP</a:t>
+              <a:rPr lang="en-GB" sz="1800" dirty="0"/>
+              <a:t>Creating cell arrays</a:t>
             </a:r>
           </a:p>
           <a:p>
             <a:pPr lvl="1"/>
             <a:r>
-              <a:rPr lang="en-GB" dirty="0"/>
-              <a:t>Class could refer to physical object, but could also be something that does a job</a:t>
+              <a:rPr lang="en-GB" sz="1800" dirty="0"/>
+              <a:t>Each cell can contain data of a different type (e.g. text and numeric)</a:t>
+            </a:r>
+          </a:p>
+          <a:p>
+            <a:pPr lvl="2"/>
+            <a:r>
+              <a:rPr lang="en-GB" sz="1400" dirty="0"/>
+              <a:t>[Have these effectively been superseded by tables?]</a:t>
+            </a:r>
+            <a:endParaRPr lang="en-GB" sz="1800" dirty="0"/>
+          </a:p>
+          <a:p>
+            <a:r>
+              <a:rPr lang="en-GB" sz="2000" dirty="0"/>
+              <a:t>Structure arrays</a:t>
             </a:r>
           </a:p>
           <a:p>
             <a:pPr lvl="1"/>
             <a:r>
-              <a:rPr lang="en-GB" dirty="0"/>
-              <a:t>Maybe use nuclear detection as an example</a:t>
-            </a:r>
-          </a:p>
-          <a:p>
-            <a:r>
-              <a:rPr lang="en-GB" dirty="0"/>
-              <a:t>Using objects and methods</a:t>
+              <a:rPr lang="en-GB" sz="1800" dirty="0"/>
+              <a:t>Store variables in a structure by field names</a:t>
             </a:r>
           </a:p>
           <a:p>
             <a:pPr lvl="1"/>
             <a:r>
-              <a:rPr lang="en-GB" dirty="0"/>
-              <a:t>Find function which outputs objects (maybe something imaging related – maybe </a:t>
-            </a:r>
-            <a:r>
-              <a:rPr lang="en-GB" dirty="0" err="1"/>
-              <a:t>Bioformats</a:t>
-            </a:r>
-            <a:r>
-              <a:rPr lang="en-GB" dirty="0"/>
-              <a:t>…)</a:t>
-            </a:r>
-          </a:p>
-          <a:p>
-            <a:r>
-              <a:rPr lang="en-GB"/>
-              <a:t>Creating objects</a:t>
-            </a:r>
-            <a:endParaRPr lang="en-GB" dirty="0"/>
+              <a:rPr lang="en-GB" sz="1800" dirty="0"/>
+              <a:t>Good for grouping data [what else are they good for?]</a:t>
+            </a:r>
+          </a:p>
+          <a:p>
+            <a:pPr lvl="1"/>
+            <a:r>
+              <a:rPr lang="en-GB" sz="1800" dirty="0"/>
+              <a:t>Creating structure arrays</a:t>
+            </a:r>
+          </a:p>
+          <a:p>
+            <a:pPr lvl="1"/>
+            <a:r>
+              <a:rPr lang="en-GB" sz="1800" dirty="0"/>
+              <a:t>Accessing data in structure arrays</a:t>
+            </a:r>
+          </a:p>
+          <a:p>
+            <a:r>
+              <a:rPr lang="en-GB" sz="2000" dirty="0"/>
+              <a:t>Tables</a:t>
+            </a:r>
+          </a:p>
+          <a:p>
+            <a:pPr lvl="1"/>
+            <a:r>
+              <a:rPr lang="en-GB" sz="1800" dirty="0"/>
+              <a:t>[When were they introduced?]</a:t>
+            </a:r>
+          </a:p>
+          <a:p>
+            <a:pPr lvl="1"/>
+            <a:r>
+              <a:rPr lang="en-GB" sz="1800" dirty="0"/>
+              <a:t>[What are the benefits?]</a:t>
+            </a:r>
+          </a:p>
+          <a:p>
+            <a:pPr lvl="1"/>
+            <a:r>
+              <a:rPr lang="en-GB" sz="1800" dirty="0"/>
+              <a:t>[Loading data directly from file into a table]</a:t>
+            </a:r>
           </a:p>
         </p:txBody>
       </p:sp>
     </p:spTree>
     <p:extLst>
       <p:ext uri="{BB962C8B-B14F-4D97-AF65-F5344CB8AC3E}">
-        <p14:creationId xmlns:p14="http://schemas.microsoft.com/office/powerpoint/2010/main" val="322493715"/>
+        <p14:creationId xmlns:p14="http://schemas.microsoft.com/office/powerpoint/2010/main" val="3962622575"/>
       </p:ext>
     </p:extLst>
   </p:cSld>
@@ -4496,15 +4814,7 @@
             <a:pPr algn="ctr"/>
             <a:r>
               <a:rPr lang="en-GB" sz="3200" dirty="0"/>
-              <a:t>Advanced image reading (</a:t>
-            </a:r>
-            <a:r>
-              <a:rPr lang="en-GB" sz="3200" dirty="0" err="1"/>
-              <a:t>Bioformats</a:t>
-            </a:r>
-            <a:r>
-              <a:rPr lang="en-GB" sz="3200" dirty="0"/>
-              <a:t>)</a:t>
+              <a:t>Object oriented programming</a:t>
             </a:r>
             <a:endParaRPr lang="en-GB" sz="2800" dirty="0">
               <a:solidFill>
@@ -4517,7 +4827,7 @@
     </p:spTree>
     <p:extLst>
       <p:ext uri="{BB962C8B-B14F-4D97-AF65-F5344CB8AC3E}">
-        <p14:creationId xmlns:p14="http://schemas.microsoft.com/office/powerpoint/2010/main" val="3361938738"/>
+        <p14:creationId xmlns:p14="http://schemas.microsoft.com/office/powerpoint/2010/main" val="4130560997"/>
       </p:ext>
     </p:extLst>
   </p:cSld>
@@ -4603,108 +4913,78 @@
           <a:lstStyle/>
           <a:p>
             <a:r>
-              <a:rPr lang="en-GB" sz="2400" dirty="0"/>
-              <a:t>[Maybe do this after OOP, as BF has OOP format]</a:t>
-            </a:r>
-          </a:p>
-          <a:p>
-            <a:r>
-              <a:rPr lang="en-GB" sz="2400" dirty="0"/>
-              <a:t>Quick intro to </a:t>
-            </a:r>
-            <a:r>
-              <a:rPr lang="en-GB" sz="2400" dirty="0" err="1"/>
+              <a:rPr lang="en-GB" dirty="0"/>
+              <a:t>Intro to OOP</a:t>
+            </a:r>
+          </a:p>
+          <a:p>
+            <a:pPr lvl="1"/>
+            <a:r>
+              <a:rPr lang="en-GB" dirty="0"/>
+              <a:t>What are objects, classes and methods</a:t>
+            </a:r>
+          </a:p>
+          <a:p>
+            <a:pPr lvl="1"/>
+            <a:r>
+              <a:rPr lang="en-GB" dirty="0"/>
+              <a:t>Why would we use this?</a:t>
+            </a:r>
+          </a:p>
+          <a:p>
+            <a:r>
+              <a:rPr lang="en-GB" dirty="0"/>
+              <a:t>Example of OOP</a:t>
+            </a:r>
+          </a:p>
+          <a:p>
+            <a:pPr lvl="1"/>
+            <a:r>
+              <a:rPr lang="en-GB" dirty="0"/>
+              <a:t>Class could refer to physical object, but could also be something that does a job</a:t>
+            </a:r>
+          </a:p>
+          <a:p>
+            <a:pPr lvl="1"/>
+            <a:r>
+              <a:rPr lang="en-GB" dirty="0"/>
+              <a:t>Maybe use nuclear detection as an example</a:t>
+            </a:r>
+          </a:p>
+          <a:p>
+            <a:r>
+              <a:rPr lang="en-GB" dirty="0"/>
+              <a:t>Using objects and methods</a:t>
+            </a:r>
+          </a:p>
+          <a:p>
+            <a:pPr lvl="1"/>
+            <a:r>
+              <a:rPr lang="en-GB" dirty="0"/>
+              <a:t>Find function which outputs objects (maybe something imaging related – maybe </a:t>
+            </a:r>
+            <a:r>
+              <a:rPr lang="en-GB" dirty="0" err="1"/>
               <a:t>Bioformats</a:t>
             </a:r>
-            <a:endParaRPr lang="en-GB" sz="2400" dirty="0"/>
-          </a:p>
-          <a:p>
-            <a:pPr lvl="1"/>
-            <a:r>
-              <a:rPr lang="en-GB" sz="2000" dirty="0"/>
-              <a:t>Example formats it can work with</a:t>
-            </a:r>
-          </a:p>
-          <a:p>
-            <a:pPr lvl="1"/>
-            <a:r>
-              <a:rPr lang="en-GB" sz="2000" dirty="0"/>
-              <a:t>Mention metadata (what sort of values it stores)</a:t>
-            </a:r>
-          </a:p>
-          <a:p>
-            <a:r>
-              <a:rPr lang="en-GB" sz="2400" dirty="0"/>
-              <a:t>Method of getting </a:t>
-            </a:r>
-            <a:r>
-              <a:rPr lang="en-GB" sz="2400" dirty="0" err="1"/>
-              <a:t>Bioformats</a:t>
-            </a:r>
-            <a:r>
-              <a:rPr lang="en-GB" sz="2400" dirty="0"/>
-              <a:t> to work</a:t>
-            </a:r>
-          </a:p>
-          <a:p>
-            <a:pPr lvl="1"/>
-            <a:r>
-              <a:rPr lang="en-GB" sz="2000" dirty="0"/>
-              <a:t>Where to download from</a:t>
-            </a:r>
-          </a:p>
-          <a:p>
-            <a:pPr lvl="2"/>
-            <a:r>
-              <a:rPr lang="en-GB" sz="1800" dirty="0"/>
-              <a:t>Provide link</a:t>
-            </a:r>
-          </a:p>
-          <a:p>
-            <a:pPr lvl="1"/>
-            <a:r>
-              <a:rPr lang="en-GB" sz="2000" dirty="0"/>
-              <a:t>Installation</a:t>
-            </a:r>
-          </a:p>
-          <a:p>
-            <a:pPr lvl="2"/>
-            <a:r>
-              <a:rPr lang="en-GB" sz="1800" dirty="0"/>
-              <a:t>Download, unzip, add to path</a:t>
-            </a:r>
-          </a:p>
-          <a:p>
-            <a:pPr lvl="1"/>
-            <a:r>
-              <a:rPr lang="en-GB" sz="2000" dirty="0"/>
-              <a:t>Running a basic LIF import</a:t>
-            </a:r>
-          </a:p>
-          <a:p>
-            <a:pPr lvl="1"/>
-            <a:r>
-              <a:rPr lang="en-GB" sz="2000" dirty="0"/>
-              <a:t>Dealing with multiple series</a:t>
-            </a:r>
-          </a:p>
-          <a:p>
-            <a:pPr lvl="1"/>
-            <a:r>
-              <a:rPr lang="en-GB" sz="2000" dirty="0"/>
-              <a:t>Dealing with metadata</a:t>
-            </a:r>
-          </a:p>
-          <a:p>
-            <a:pPr lvl="1"/>
-            <a:endParaRPr lang="en-GB" sz="2000" dirty="0"/>
+            <a:r>
+              <a:rPr lang="en-GB" dirty="0"/>
+              <a:t>…)</a:t>
+            </a:r>
+          </a:p>
+          <a:p>
+            <a:r>
+              <a:rPr lang="en-GB"/>
+              <a:t>Creating objects</a:t>
+            </a:r>
+            <a:endParaRPr lang="en-GB" dirty="0"/>
           </a:p>
         </p:txBody>
       </p:sp>
     </p:spTree>
     <p:extLst>
       <p:ext uri="{BB962C8B-B14F-4D97-AF65-F5344CB8AC3E}">
-        <p14:creationId xmlns:p14="http://schemas.microsoft.com/office/powerpoint/2010/main" val="677120248"/>
+        <p14:creationId xmlns:p14="http://schemas.microsoft.com/office/powerpoint/2010/main" val="322493715"/>
       </p:ext>
     </p:extLst>
   </p:cSld>

</xml_diff>

<commit_message>
Added cell array description to Session 3
Still need to add about creating cell arrays.
</commit_message>
<xml_diff>
--- a/Session 3 - Advanced data structures/MATLAB Session 3.pptx
+++ b/Session 3 - Advanced data structures/MATLAB Session 3.pptx
@@ -5,7 +5,7 @@
     <p:sldMasterId id="2147483678" r:id="rId1"/>
   </p:sldMasterIdLst>
   <p:notesMasterIdLst>
-    <p:notesMasterId r:id="rId15"/>
+    <p:notesMasterId r:id="rId21"/>
   </p:notesMasterIdLst>
   <p:sldIdLst>
     <p:sldId id="316" r:id="rId2"/>
@@ -14,13 +14,19 @@
     <p:sldId id="361" r:id="rId5"/>
     <p:sldId id="450" r:id="rId6"/>
     <p:sldId id="451" r:id="rId7"/>
-    <p:sldId id="445" r:id="rId8"/>
-    <p:sldId id="448" r:id="rId9"/>
-    <p:sldId id="449" r:id="rId10"/>
-    <p:sldId id="446" r:id="rId11"/>
-    <p:sldId id="447" r:id="rId12"/>
-    <p:sldId id="444" r:id="rId13"/>
-    <p:sldId id="443" r:id="rId14"/>
+    <p:sldId id="453" r:id="rId8"/>
+    <p:sldId id="454" r:id="rId9"/>
+    <p:sldId id="455" r:id="rId10"/>
+    <p:sldId id="456" r:id="rId11"/>
+    <p:sldId id="457" r:id="rId12"/>
+    <p:sldId id="452" r:id="rId13"/>
+    <p:sldId id="445" r:id="rId14"/>
+    <p:sldId id="448" r:id="rId15"/>
+    <p:sldId id="449" r:id="rId16"/>
+    <p:sldId id="446" r:id="rId17"/>
+    <p:sldId id="447" r:id="rId18"/>
+    <p:sldId id="444" r:id="rId19"/>
+    <p:sldId id="443" r:id="rId20"/>
   </p:sldIdLst>
   <p:sldSz cx="12192000" cy="6858000"/>
   <p:notesSz cx="6669088" cy="9926638"/>
@@ -2226,7 +2232,7 @@
             </a:br>
             <a:r>
               <a:rPr lang="en-GB" sz="2800" dirty="0"/>
-              <a:t>Session 2: Matrices and image processing</a:t>
+              <a:t>Session 3: Advanced data structures</a:t>
             </a:r>
             <a:endParaRPr lang="en-GB" dirty="0"/>
           </a:p>
@@ -2279,7 +2285,7 @@
           <p:cNvPr id="2" name="Title 1">
             <a:extLst>
               <a:ext uri="{FF2B5EF4-FFF2-40B4-BE49-F238E27FC236}">
-                <a16:creationId xmlns:a16="http://schemas.microsoft.com/office/drawing/2014/main" id="{8EEF9218-B50A-424A-A99D-57BA08F4A8E3}"/>
+                <a16:creationId xmlns:a16="http://schemas.microsoft.com/office/drawing/2014/main" id="{FB0D9636-2B3A-4E3D-9B13-904FF3CE8CE3}"/>
               </a:ext>
             </a:extLst>
           </p:cNvPr>
@@ -2295,16 +2301,540 @@
           <a:bodyPr/>
           <a:lstStyle/>
           <a:p>
-            <a:endParaRPr lang="en-GB" dirty="0"/>
-          </a:p>
-        </p:txBody>
-      </p:sp>
-      <p:sp>
-        <p:nvSpPr>
-          <p:cNvPr id="4" name="TextBox 3">
+            <a:r>
+              <a:rPr lang="en-GB" dirty="0"/>
+              <a:t>Cell arrays</a:t>
+            </a:r>
+          </a:p>
+        </p:txBody>
+      </p:sp>
+      <p:sp>
+        <p:nvSpPr>
+          <p:cNvPr id="3" name="Content Placeholder 2">
             <a:extLst>
               <a:ext uri="{FF2B5EF4-FFF2-40B4-BE49-F238E27FC236}">
-                <a16:creationId xmlns:a16="http://schemas.microsoft.com/office/drawing/2014/main" id="{31426854-EE0B-4A5A-AC6D-2BF50C4B1D90}"/>
+                <a16:creationId xmlns:a16="http://schemas.microsoft.com/office/drawing/2014/main" id="{DFE43EAF-8F5E-44D2-BF28-45DAFCB5DD96}"/>
+              </a:ext>
+            </a:extLst>
+          </p:cNvPr>
+          <p:cNvSpPr>
+            <a:spLocks noGrp="1"/>
+          </p:cNvSpPr>
+          <p:nvPr>
+            <p:ph idx="1"/>
+          </p:nvPr>
+        </p:nvSpPr>
+        <p:spPr>
+          <a:xfrm>
+            <a:off x="335360" y="1196754"/>
+            <a:ext cx="7608490" cy="4929411"/>
+          </a:xfrm>
+        </p:spPr>
+        <p:txBody>
+          <a:bodyPr/>
+          <a:lstStyle/>
+          <a:p>
+            <a:r>
+              <a:rPr lang="en-GB" dirty="0"/>
+              <a:t>Similar to arrays, but each element is a “cell”</a:t>
+            </a:r>
+          </a:p>
+          <a:p>
+            <a:pPr lvl="1"/>
+            <a:r>
+              <a:rPr lang="en-GB" dirty="0"/>
+              <a:t>Regular grid of cells</a:t>
+            </a:r>
+          </a:p>
+          <a:p>
+            <a:pPr lvl="1"/>
+            <a:r>
+              <a:rPr lang="en-GB" dirty="0"/>
+              <a:t>Can be N-dimensional</a:t>
+            </a:r>
+          </a:p>
+          <a:p>
+            <a:pPr lvl="1"/>
+            <a:r>
+              <a:rPr lang="en-GB" dirty="0"/>
+              <a:t>Can hold different data types in each cell</a:t>
+            </a:r>
+          </a:p>
+          <a:p>
+            <a:endParaRPr lang="en-GB" sz="1200" dirty="0"/>
+          </a:p>
+          <a:p>
+            <a:r>
+              <a:rPr lang="en-GB" dirty="0"/>
+              <a:t>A cell can hold any data type, for example</a:t>
+            </a:r>
+          </a:p>
+          <a:p>
+            <a:pPr lvl="1"/>
+            <a:r>
+              <a:rPr lang="en-GB" dirty="0"/>
+              <a:t>Single numeric values</a:t>
+            </a:r>
+          </a:p>
+          <a:p>
+            <a:pPr lvl="1"/>
+            <a:r>
+              <a:rPr lang="en-GB" dirty="0"/>
+              <a:t>Text</a:t>
+            </a:r>
+          </a:p>
+          <a:p>
+            <a:pPr lvl="1"/>
+            <a:r>
+              <a:rPr lang="en-GB" dirty="0"/>
+              <a:t>Numeric arrays and matrices</a:t>
+            </a:r>
+          </a:p>
+          <a:p>
+            <a:pPr lvl="1"/>
+            <a:r>
+              <a:rPr lang="en-GB" dirty="0"/>
+              <a:t>Even another cell array!</a:t>
+            </a:r>
+          </a:p>
+          <a:p>
+            <a:pPr lvl="1"/>
+            <a:endParaRPr lang="en-GB" sz="1200" dirty="0"/>
+          </a:p>
+        </p:txBody>
+      </p:sp>
+      <p:graphicFrame>
+        <p:nvGraphicFramePr>
+          <p:cNvPr id="8" name="Table 11">
+            <a:extLst>
+              <a:ext uri="{FF2B5EF4-FFF2-40B4-BE49-F238E27FC236}">
+                <a16:creationId xmlns:a16="http://schemas.microsoft.com/office/drawing/2014/main" id="{4DCE7BA0-FD5A-4C43-8031-5FD38411ED82}"/>
+              </a:ext>
+            </a:extLst>
+          </p:cNvPr>
+          <p:cNvGraphicFramePr>
+            <a:graphicFrameLocks noGrp="1"/>
+          </p:cNvGraphicFramePr>
+          <p:nvPr/>
+        </p:nvGraphicFramePr>
+        <p:xfrm>
+          <a:off x="9225841" y="3112828"/>
+          <a:ext cx="972000" cy="972000"/>
+        </p:xfrm>
+        <a:graphic>
+          <a:graphicData uri="http://schemas.openxmlformats.org/drawingml/2006/table">
+            <a:tbl>
+              <a:tblPr firstRow="1" bandRow="1">
+                <a:tableStyleId>{5940675A-B579-460E-94D1-54222C63F5DA}</a:tableStyleId>
+              </a:tblPr>
+              <a:tblGrid>
+                <a:gridCol w="486000">
+                  <a:extLst>
+                    <a:ext uri="{9D8B030D-6E8A-4147-A177-3AD203B41FA5}">
+                      <a16:colId xmlns:a16="http://schemas.microsoft.com/office/drawing/2014/main" val="2264223351"/>
+                    </a:ext>
+                  </a:extLst>
+                </a:gridCol>
+                <a:gridCol w="486000">
+                  <a:extLst>
+                    <a:ext uri="{9D8B030D-6E8A-4147-A177-3AD203B41FA5}">
+                      <a16:colId xmlns:a16="http://schemas.microsoft.com/office/drawing/2014/main" val="2532173928"/>
+                    </a:ext>
+                  </a:extLst>
+                </a:gridCol>
+              </a:tblGrid>
+              <a:tr h="486000">
+                <a:tc>
+                  <a:txBody>
+                    <a:bodyPr/>
+                    <a:lstStyle/>
+                    <a:p>
+                      <a:pPr algn="ctr"/>
+                      <a:r>
+                        <a:rPr lang="en-GB" sz="1300" dirty="0"/>
+                        <a:t>1.2</a:t>
+                      </a:r>
+                    </a:p>
+                  </a:txBody>
+                  <a:tcPr marL="0" marR="0" marT="0" marB="0" anchor="ctr"/>
+                </a:tc>
+                <a:tc>
+                  <a:txBody>
+                    <a:bodyPr/>
+                    <a:lstStyle/>
+                    <a:p>
+                      <a:pPr algn="ctr"/>
+                      <a:r>
+                        <a:rPr lang="en-GB" sz="1300" dirty="0"/>
+                        <a:t>3.7</a:t>
+                      </a:r>
+                    </a:p>
+                  </a:txBody>
+                  <a:tcPr marL="0" marR="0" marT="0" marB="0" anchor="ctr"/>
+                </a:tc>
+                <a:extLst>
+                  <a:ext uri="{0D108BD9-81ED-4DB2-BD59-A6C34878D82A}">
+                    <a16:rowId xmlns:a16="http://schemas.microsoft.com/office/drawing/2014/main" val="2907702860"/>
+                  </a:ext>
+                </a:extLst>
+              </a:tr>
+              <a:tr h="486000">
+                <a:tc>
+                  <a:txBody>
+                    <a:bodyPr/>
+                    <a:lstStyle/>
+                    <a:p>
+                      <a:pPr algn="ctr"/>
+                      <a:r>
+                        <a:rPr lang="en-GB" sz="1300" dirty="0"/>
+                        <a:t>0.7</a:t>
+                      </a:r>
+                    </a:p>
+                  </a:txBody>
+                  <a:tcPr marL="0" marR="0" marT="0" marB="0" anchor="ctr"/>
+                </a:tc>
+                <a:tc>
+                  <a:txBody>
+                    <a:bodyPr/>
+                    <a:lstStyle/>
+                    <a:p>
+                      <a:pPr algn="ctr"/>
+                      <a:r>
+                        <a:rPr lang="en-GB" sz="1300" dirty="0"/>
+                        <a:t>-5.5</a:t>
+                      </a:r>
+                    </a:p>
+                  </a:txBody>
+                  <a:tcPr marL="0" marR="0" marT="0" marB="0" anchor="ctr"/>
+                </a:tc>
+                <a:extLst>
+                  <a:ext uri="{0D108BD9-81ED-4DB2-BD59-A6C34878D82A}">
+                    <a16:rowId xmlns:a16="http://schemas.microsoft.com/office/drawing/2014/main" val="3764598351"/>
+                  </a:ext>
+                </a:extLst>
+              </a:tr>
+            </a:tbl>
+          </a:graphicData>
+        </a:graphic>
+      </p:graphicFrame>
+      <p:sp>
+        <p:nvSpPr>
+          <p:cNvPr id="12" name="Rectangle: Rounded Corners 11">
+            <a:extLst>
+              <a:ext uri="{FF2B5EF4-FFF2-40B4-BE49-F238E27FC236}">
+                <a16:creationId xmlns:a16="http://schemas.microsoft.com/office/drawing/2014/main" id="{7E9F1019-0F65-4875-8ED9-1A5F9A63DD55}"/>
+              </a:ext>
+            </a:extLst>
+          </p:cNvPr>
+          <p:cNvSpPr/>
+          <p:nvPr/>
+        </p:nvSpPr>
+        <p:spPr>
+          <a:xfrm>
+            <a:off x="9082877" y="1660664"/>
+            <a:ext cx="1257929" cy="1257929"/>
+          </a:xfrm>
+          <a:prstGeom prst="roundRect">
+            <a:avLst/>
+          </a:prstGeom>
+          <a:noFill/>
+          <a:ln w="15240">
+            <a:solidFill>
+              <a:schemeClr val="tx1"/>
+            </a:solidFill>
+          </a:ln>
+        </p:spPr>
+        <p:style>
+          <a:lnRef idx="2">
+            <a:schemeClr val="accent1">
+              <a:shade val="50000"/>
+            </a:schemeClr>
+          </a:lnRef>
+          <a:fillRef idx="1">
+            <a:schemeClr val="accent1"/>
+          </a:fillRef>
+          <a:effectRef idx="0">
+            <a:schemeClr val="accent1"/>
+          </a:effectRef>
+          <a:fontRef idx="minor">
+            <a:schemeClr val="lt1"/>
+          </a:fontRef>
+        </p:style>
+        <p:txBody>
+          <a:bodyPr rtlCol="0" anchor="ctr"/>
+          <a:lstStyle/>
+          <a:p>
+            <a:pPr algn="ctr"/>
+            <a:endParaRPr lang="en-GB"/>
+          </a:p>
+        </p:txBody>
+      </p:sp>
+      <p:sp>
+        <p:nvSpPr>
+          <p:cNvPr id="23" name="Rectangle: Rounded Corners 22">
+            <a:extLst>
+              <a:ext uri="{FF2B5EF4-FFF2-40B4-BE49-F238E27FC236}">
+                <a16:creationId xmlns:a16="http://schemas.microsoft.com/office/drawing/2014/main" id="{F1169B2A-233E-4D7E-9739-72BD24B41066}"/>
+              </a:ext>
+            </a:extLst>
+          </p:cNvPr>
+          <p:cNvSpPr/>
+          <p:nvPr/>
+        </p:nvSpPr>
+        <p:spPr>
+          <a:xfrm>
+            <a:off x="9082877" y="2969864"/>
+            <a:ext cx="1257929" cy="1257929"/>
+          </a:xfrm>
+          <a:prstGeom prst="roundRect">
+            <a:avLst/>
+          </a:prstGeom>
+          <a:noFill/>
+          <a:ln w="15240">
+            <a:solidFill>
+              <a:schemeClr val="tx1"/>
+            </a:solidFill>
+          </a:ln>
+        </p:spPr>
+        <p:style>
+          <a:lnRef idx="2">
+            <a:schemeClr val="accent1">
+              <a:shade val="50000"/>
+            </a:schemeClr>
+          </a:lnRef>
+          <a:fillRef idx="1">
+            <a:schemeClr val="accent1"/>
+          </a:fillRef>
+          <a:effectRef idx="0">
+            <a:schemeClr val="accent1"/>
+          </a:effectRef>
+          <a:fontRef idx="minor">
+            <a:schemeClr val="lt1"/>
+          </a:fontRef>
+        </p:style>
+        <p:txBody>
+          <a:bodyPr rtlCol="0" anchor="ctr"/>
+          <a:lstStyle/>
+          <a:p>
+            <a:pPr algn="ctr"/>
+            <a:endParaRPr lang="en-GB"/>
+          </a:p>
+        </p:txBody>
+      </p:sp>
+      <p:sp>
+        <p:nvSpPr>
+          <p:cNvPr id="27" name="Rectangle: Rounded Corners 26">
+            <a:extLst>
+              <a:ext uri="{FF2B5EF4-FFF2-40B4-BE49-F238E27FC236}">
+                <a16:creationId xmlns:a16="http://schemas.microsoft.com/office/drawing/2014/main" id="{29527B9A-D721-454E-87E9-F623347D7BEA}"/>
+              </a:ext>
+            </a:extLst>
+          </p:cNvPr>
+          <p:cNvSpPr/>
+          <p:nvPr/>
+        </p:nvSpPr>
+        <p:spPr>
+          <a:xfrm>
+            <a:off x="9082877" y="4278820"/>
+            <a:ext cx="1257929" cy="1257929"/>
+          </a:xfrm>
+          <a:prstGeom prst="roundRect">
+            <a:avLst/>
+          </a:prstGeom>
+          <a:noFill/>
+          <a:ln w="15240">
+            <a:solidFill>
+              <a:schemeClr val="tx1"/>
+            </a:solidFill>
+          </a:ln>
+        </p:spPr>
+        <p:style>
+          <a:lnRef idx="2">
+            <a:schemeClr val="accent1">
+              <a:shade val="50000"/>
+            </a:schemeClr>
+          </a:lnRef>
+          <a:fillRef idx="1">
+            <a:schemeClr val="accent1"/>
+          </a:fillRef>
+          <a:effectRef idx="0">
+            <a:schemeClr val="accent1"/>
+          </a:effectRef>
+          <a:fontRef idx="minor">
+            <a:schemeClr val="lt1"/>
+          </a:fontRef>
+        </p:style>
+        <p:txBody>
+          <a:bodyPr rtlCol="0" anchor="ctr"/>
+          <a:lstStyle/>
+          <a:p>
+            <a:pPr algn="ctr"/>
+            <a:endParaRPr lang="en-GB"/>
+          </a:p>
+        </p:txBody>
+      </p:sp>
+      <p:sp>
+        <p:nvSpPr>
+          <p:cNvPr id="33" name="Rectangle: Rounded Corners 32">
+            <a:extLst>
+              <a:ext uri="{FF2B5EF4-FFF2-40B4-BE49-F238E27FC236}">
+                <a16:creationId xmlns:a16="http://schemas.microsoft.com/office/drawing/2014/main" id="{3AF4BA7E-2227-414E-87FE-33656D160CD4}"/>
+              </a:ext>
+            </a:extLst>
+          </p:cNvPr>
+          <p:cNvSpPr/>
+          <p:nvPr/>
+        </p:nvSpPr>
+        <p:spPr>
+          <a:xfrm>
+            <a:off x="10391145" y="1660664"/>
+            <a:ext cx="1257929" cy="1257929"/>
+          </a:xfrm>
+          <a:prstGeom prst="roundRect">
+            <a:avLst/>
+          </a:prstGeom>
+          <a:noFill/>
+          <a:ln w="15240">
+            <a:solidFill>
+              <a:schemeClr val="tx1"/>
+            </a:solidFill>
+          </a:ln>
+        </p:spPr>
+        <p:style>
+          <a:lnRef idx="2">
+            <a:schemeClr val="accent1">
+              <a:shade val="50000"/>
+            </a:schemeClr>
+          </a:lnRef>
+          <a:fillRef idx="1">
+            <a:schemeClr val="accent1"/>
+          </a:fillRef>
+          <a:effectRef idx="0">
+            <a:schemeClr val="accent1"/>
+          </a:effectRef>
+          <a:fontRef idx="minor">
+            <a:schemeClr val="lt1"/>
+          </a:fontRef>
+        </p:style>
+        <p:txBody>
+          <a:bodyPr rtlCol="0" anchor="ctr"/>
+          <a:lstStyle/>
+          <a:p>
+            <a:pPr algn="ctr"/>
+            <a:endParaRPr lang="en-GB"/>
+          </a:p>
+        </p:txBody>
+      </p:sp>
+      <p:sp>
+        <p:nvSpPr>
+          <p:cNvPr id="34" name="Rectangle: Rounded Corners 33">
+            <a:extLst>
+              <a:ext uri="{FF2B5EF4-FFF2-40B4-BE49-F238E27FC236}">
+                <a16:creationId xmlns:a16="http://schemas.microsoft.com/office/drawing/2014/main" id="{94C9D241-0E11-4BB3-8AE7-C4684710EFA7}"/>
+              </a:ext>
+            </a:extLst>
+          </p:cNvPr>
+          <p:cNvSpPr/>
+          <p:nvPr/>
+        </p:nvSpPr>
+        <p:spPr>
+          <a:xfrm>
+            <a:off x="10391145" y="2969864"/>
+            <a:ext cx="1257929" cy="1257929"/>
+          </a:xfrm>
+          <a:prstGeom prst="roundRect">
+            <a:avLst/>
+          </a:prstGeom>
+          <a:noFill/>
+          <a:ln w="15240">
+            <a:solidFill>
+              <a:schemeClr val="tx1"/>
+            </a:solidFill>
+          </a:ln>
+        </p:spPr>
+        <p:style>
+          <a:lnRef idx="2">
+            <a:schemeClr val="accent1">
+              <a:shade val="50000"/>
+            </a:schemeClr>
+          </a:lnRef>
+          <a:fillRef idx="1">
+            <a:schemeClr val="accent1"/>
+          </a:fillRef>
+          <a:effectRef idx="0">
+            <a:schemeClr val="accent1"/>
+          </a:effectRef>
+          <a:fontRef idx="minor">
+            <a:schemeClr val="lt1"/>
+          </a:fontRef>
+        </p:style>
+        <p:txBody>
+          <a:bodyPr rtlCol="0" anchor="ctr"/>
+          <a:lstStyle/>
+          <a:p>
+            <a:pPr algn="ctr"/>
+            <a:endParaRPr lang="en-GB"/>
+          </a:p>
+        </p:txBody>
+      </p:sp>
+      <p:sp>
+        <p:nvSpPr>
+          <p:cNvPr id="35" name="Rectangle: Rounded Corners 34">
+            <a:extLst>
+              <a:ext uri="{FF2B5EF4-FFF2-40B4-BE49-F238E27FC236}">
+                <a16:creationId xmlns:a16="http://schemas.microsoft.com/office/drawing/2014/main" id="{2BF487D2-0EAF-458A-8F60-478369AE7C72}"/>
+              </a:ext>
+            </a:extLst>
+          </p:cNvPr>
+          <p:cNvSpPr/>
+          <p:nvPr/>
+        </p:nvSpPr>
+        <p:spPr>
+          <a:xfrm>
+            <a:off x="10391145" y="4278820"/>
+            <a:ext cx="1257929" cy="1257929"/>
+          </a:xfrm>
+          <a:prstGeom prst="roundRect">
+            <a:avLst/>
+          </a:prstGeom>
+          <a:noFill/>
+          <a:ln w="15240">
+            <a:solidFill>
+              <a:schemeClr val="tx1"/>
+            </a:solidFill>
+          </a:ln>
+        </p:spPr>
+        <p:style>
+          <a:lnRef idx="2">
+            <a:schemeClr val="accent1">
+              <a:shade val="50000"/>
+            </a:schemeClr>
+          </a:lnRef>
+          <a:fillRef idx="1">
+            <a:schemeClr val="accent1"/>
+          </a:fillRef>
+          <a:effectRef idx="0">
+            <a:schemeClr val="accent1"/>
+          </a:effectRef>
+          <a:fontRef idx="minor">
+            <a:schemeClr val="lt1"/>
+          </a:fontRef>
+        </p:style>
+        <p:txBody>
+          <a:bodyPr rtlCol="0" anchor="ctr"/>
+          <a:lstStyle/>
+          <a:p>
+            <a:pPr algn="ctr"/>
+            <a:endParaRPr lang="en-GB"/>
+          </a:p>
+        </p:txBody>
+      </p:sp>
+      <p:sp>
+        <p:nvSpPr>
+          <p:cNvPr id="43" name="TextBox 42">
+            <a:extLst>
+              <a:ext uri="{FF2B5EF4-FFF2-40B4-BE49-F238E27FC236}">
+                <a16:creationId xmlns:a16="http://schemas.microsoft.com/office/drawing/2014/main" id="{987C3DF1-8DE2-4D9A-B19C-B0799B76F18F}"/>
               </a:ext>
             </a:extLst>
           </p:cNvPr>
@@ -2313,8 +2843,8 @@
         </p:nvSpPr>
         <p:spPr>
           <a:xfrm>
-            <a:off x="2052408" y="3136612"/>
-            <a:ext cx="8087183" cy="584775"/>
+            <a:off x="9308131" y="2074184"/>
+            <a:ext cx="807420" cy="430887"/>
           </a:xfrm>
           <a:prstGeom prst="rect">
             <a:avLst/>
@@ -2329,29 +2859,178 @@
           <a:p>
             <a:pPr algn="ctr"/>
             <a:r>
-              <a:rPr lang="en-GB" sz="3200" dirty="0"/>
-              <a:t>Advanced image reading (</a:t>
-            </a:r>
-            <a:r>
-              <a:rPr lang="en-GB" sz="3200" dirty="0" err="1"/>
-              <a:t>Bioformats</a:t>
-            </a:r>
-            <a:r>
-              <a:rPr lang="en-GB" sz="3200" dirty="0"/>
-              <a:t>)</a:t>
-            </a:r>
-            <a:endParaRPr lang="en-GB" sz="2800" dirty="0">
-              <a:solidFill>
-                <a:schemeClr val="tx1"/>
-              </a:solidFill>
-            </a:endParaRPr>
+              <a:rPr lang="en-GB" sz="2200" dirty="0"/>
+              <a:t>0.9</a:t>
+            </a:r>
+          </a:p>
+        </p:txBody>
+      </p:sp>
+      <p:sp>
+        <p:nvSpPr>
+          <p:cNvPr id="44" name="TextBox 43">
+            <a:extLst>
+              <a:ext uri="{FF2B5EF4-FFF2-40B4-BE49-F238E27FC236}">
+                <a16:creationId xmlns:a16="http://schemas.microsoft.com/office/drawing/2014/main" id="{3E821E05-06D3-4EA9-9B74-967B91D8FCF5}"/>
+              </a:ext>
+            </a:extLst>
+          </p:cNvPr>
+          <p:cNvSpPr txBox="1"/>
+          <p:nvPr/>
+        </p:nvSpPr>
+        <p:spPr>
+          <a:xfrm>
+            <a:off x="10391145" y="1904906"/>
+            <a:ext cx="1257930" cy="769441"/>
+          </a:xfrm>
+          <a:prstGeom prst="rect">
+            <a:avLst/>
+          </a:prstGeom>
+          <a:noFill/>
+        </p:spPr>
+        <p:txBody>
+          <a:bodyPr wrap="square" rtlCol="0">
+            <a:spAutoFit/>
+          </a:bodyPr>
+          <a:lstStyle/>
+          <a:p>
+            <a:pPr algn="ctr"/>
+            <a:r>
+              <a:rPr lang="en-GB" sz="2200" dirty="0"/>
+              <a:t>‘some text’</a:t>
+            </a:r>
+          </a:p>
+        </p:txBody>
+      </p:sp>
+      <p:sp>
+        <p:nvSpPr>
+          <p:cNvPr id="50" name="TextBox 49">
+            <a:extLst>
+              <a:ext uri="{FF2B5EF4-FFF2-40B4-BE49-F238E27FC236}">
+                <a16:creationId xmlns:a16="http://schemas.microsoft.com/office/drawing/2014/main" id="{D0DF4DBF-C048-49FD-B22E-80754C2314DE}"/>
+              </a:ext>
+            </a:extLst>
+          </p:cNvPr>
+          <p:cNvSpPr txBox="1"/>
+          <p:nvPr/>
+        </p:nvSpPr>
+        <p:spPr>
+          <a:xfrm>
+            <a:off x="10616399" y="3383385"/>
+            <a:ext cx="807420" cy="430887"/>
+          </a:xfrm>
+          <a:prstGeom prst="rect">
+            <a:avLst/>
+          </a:prstGeom>
+          <a:noFill/>
+        </p:spPr>
+        <p:txBody>
+          <a:bodyPr wrap="square" rtlCol="0">
+            <a:spAutoFit/>
+          </a:bodyPr>
+          <a:lstStyle/>
+          <a:p>
+            <a:pPr algn="ctr"/>
+            <a:r>
+              <a:rPr lang="en-GB" sz="2200" dirty="0"/>
+              <a:t>-128</a:t>
+            </a:r>
+          </a:p>
+        </p:txBody>
+      </p:sp>
+      <p:sp>
+        <p:nvSpPr>
+          <p:cNvPr id="51" name="TextBox 50">
+            <a:extLst>
+              <a:ext uri="{FF2B5EF4-FFF2-40B4-BE49-F238E27FC236}">
+                <a16:creationId xmlns:a16="http://schemas.microsoft.com/office/drawing/2014/main" id="{907622E2-5BB8-4195-9C44-0D86BE661C73}"/>
+              </a:ext>
+            </a:extLst>
+          </p:cNvPr>
+          <p:cNvSpPr txBox="1"/>
+          <p:nvPr/>
+        </p:nvSpPr>
+        <p:spPr>
+          <a:xfrm>
+            <a:off x="9081609" y="4523063"/>
+            <a:ext cx="1257930" cy="769441"/>
+          </a:xfrm>
+          <a:prstGeom prst="rect">
+            <a:avLst/>
+          </a:prstGeom>
+          <a:noFill/>
+        </p:spPr>
+        <p:txBody>
+          <a:bodyPr wrap="square" rtlCol="0">
+            <a:spAutoFit/>
+          </a:bodyPr>
+          <a:lstStyle/>
+          <a:p>
+            <a:pPr algn="ctr"/>
+            <a:r>
+              <a:rPr lang="en-GB" sz="2200" dirty="0"/>
+              <a:t>‘more stuff’</a:t>
+            </a:r>
+          </a:p>
+        </p:txBody>
+      </p:sp>
+      <p:sp>
+        <p:nvSpPr>
+          <p:cNvPr id="52" name="Rectangle 51">
+            <a:extLst>
+              <a:ext uri="{FF2B5EF4-FFF2-40B4-BE49-F238E27FC236}">
+                <a16:creationId xmlns:a16="http://schemas.microsoft.com/office/drawing/2014/main" id="{81EE5999-3AFA-4C93-AC50-F0ED95333EAE}"/>
+              </a:ext>
+            </a:extLst>
+          </p:cNvPr>
+          <p:cNvSpPr/>
+          <p:nvPr/>
+        </p:nvSpPr>
+        <p:spPr>
+          <a:xfrm>
+            <a:off x="335360" y="5105400"/>
+            <a:ext cx="7382512" cy="1020764"/>
+          </a:xfrm>
+          <a:prstGeom prst="rect">
+            <a:avLst/>
+          </a:prstGeom>
+          <a:solidFill>
+            <a:srgbClr val="FFFFFF">
+              <a:alpha val="89804"/>
+            </a:srgbClr>
+          </a:solidFill>
+          <a:ln>
+            <a:noFill/>
+          </a:ln>
+        </p:spPr>
+        <p:style>
+          <a:lnRef idx="2">
+            <a:schemeClr val="accent1">
+              <a:shade val="50000"/>
+            </a:schemeClr>
+          </a:lnRef>
+          <a:fillRef idx="1">
+            <a:schemeClr val="accent1"/>
+          </a:fillRef>
+          <a:effectRef idx="0">
+            <a:schemeClr val="accent1"/>
+          </a:effectRef>
+          <a:fontRef idx="minor">
+            <a:schemeClr val="lt1"/>
+          </a:fontRef>
+        </p:style>
+        <p:txBody>
+          <a:bodyPr rtlCol="0" anchor="ctr"/>
+          <a:lstStyle/>
+          <a:p>
+            <a:pPr algn="ctr"/>
+            <a:endParaRPr lang="en-GB"/>
           </a:p>
         </p:txBody>
       </p:sp>
     </p:spTree>
     <p:extLst>
       <p:ext uri="{BB962C8B-B14F-4D97-AF65-F5344CB8AC3E}">
-        <p14:creationId xmlns:p14="http://schemas.microsoft.com/office/powerpoint/2010/main" val="3361938738"/>
+        <p14:creationId xmlns:p14="http://schemas.microsoft.com/office/powerpoint/2010/main" val="2518612553"/>
       </p:ext>
     </p:extLst>
   </p:cSld>
@@ -2395,7 +3074,7 @@
           <p:cNvPr id="2" name="Title 1">
             <a:extLst>
               <a:ext uri="{FF2B5EF4-FFF2-40B4-BE49-F238E27FC236}">
-                <a16:creationId xmlns:a16="http://schemas.microsoft.com/office/drawing/2014/main" id="{297C1240-D4CE-4AD2-96B1-DBD7075D8052}"/>
+                <a16:creationId xmlns:a16="http://schemas.microsoft.com/office/drawing/2014/main" id="{FB0D9636-2B3A-4E3D-9B13-904FF3CE8CE3}"/>
               </a:ext>
             </a:extLst>
           </p:cNvPr>
@@ -2411,7 +3090,10 @@
           <a:bodyPr/>
           <a:lstStyle/>
           <a:p>
-            <a:endParaRPr lang="en-GB"/>
+            <a:r>
+              <a:rPr lang="en-GB" dirty="0"/>
+              <a:t>Cell arrays</a:t>
+            </a:r>
           </a:p>
         </p:txBody>
       </p:sp>
@@ -2420,7 +3102,7 @@
           <p:cNvPr id="3" name="Content Placeholder 2">
             <a:extLst>
               <a:ext uri="{FF2B5EF4-FFF2-40B4-BE49-F238E27FC236}">
-                <a16:creationId xmlns:a16="http://schemas.microsoft.com/office/drawing/2014/main" id="{7E90A914-5E00-4AAB-802D-4C98FA2788C1}"/>
+                <a16:creationId xmlns:a16="http://schemas.microsoft.com/office/drawing/2014/main" id="{DFE43EAF-8F5E-44D2-BF28-45DAFCB5DD96}"/>
               </a:ext>
             </a:extLst>
           </p:cNvPr>
@@ -2431,114 +3113,856 @@
             <p:ph idx="1"/>
           </p:nvPr>
         </p:nvSpPr>
-        <p:spPr/>
+        <p:spPr>
+          <a:xfrm>
+            <a:off x="335360" y="1196754"/>
+            <a:ext cx="7608490" cy="4929411"/>
+          </a:xfrm>
+        </p:spPr>
         <p:txBody>
           <a:bodyPr/>
           <a:lstStyle/>
           <a:p>
             <a:r>
-              <a:rPr lang="en-GB" sz="2400" dirty="0"/>
-              <a:t>[Maybe do this after OOP, as BF has OOP format]</a:t>
-            </a:r>
-          </a:p>
-          <a:p>
-            <a:r>
-              <a:rPr lang="en-GB" sz="2400" dirty="0"/>
-              <a:t>Quick intro to </a:t>
-            </a:r>
-            <a:r>
-              <a:rPr lang="en-GB" sz="2400" dirty="0" err="1"/>
-              <a:t>Bioformats</a:t>
-            </a:r>
-            <a:endParaRPr lang="en-GB" sz="2400" dirty="0"/>
-          </a:p>
-          <a:p>
-            <a:pPr lvl="1"/>
-            <a:r>
-              <a:rPr lang="en-GB" sz="2000" dirty="0"/>
-              <a:t>Example formats it can work with</a:t>
-            </a:r>
-          </a:p>
-          <a:p>
-            <a:pPr lvl="1"/>
-            <a:r>
-              <a:rPr lang="en-GB" sz="2000" dirty="0"/>
-              <a:t>Mention metadata (what sort of values it stores)</a:t>
-            </a:r>
-          </a:p>
-          <a:p>
-            <a:r>
-              <a:rPr lang="en-GB" sz="2400" dirty="0"/>
-              <a:t>Method of getting </a:t>
-            </a:r>
-            <a:r>
-              <a:rPr lang="en-GB" sz="2400" dirty="0" err="1"/>
-              <a:t>Bioformats</a:t>
-            </a:r>
-            <a:r>
-              <a:rPr lang="en-GB" sz="2400" dirty="0"/>
-              <a:t> to work</a:t>
-            </a:r>
-          </a:p>
-          <a:p>
-            <a:pPr lvl="1"/>
-            <a:r>
-              <a:rPr lang="en-GB" sz="2000" dirty="0"/>
-              <a:t>Where to download from</a:t>
-            </a:r>
-          </a:p>
-          <a:p>
-            <a:pPr lvl="2"/>
-            <a:r>
-              <a:rPr lang="en-GB" sz="1800" dirty="0"/>
-              <a:t>Provide link</a:t>
-            </a:r>
-          </a:p>
-          <a:p>
-            <a:pPr lvl="1"/>
-            <a:r>
-              <a:rPr lang="en-GB" sz="2000" dirty="0"/>
-              <a:t>Installation</a:t>
-            </a:r>
-          </a:p>
-          <a:p>
-            <a:pPr lvl="2"/>
-            <a:r>
-              <a:rPr lang="en-GB" sz="1800" dirty="0"/>
-              <a:t>Download, unzip, add to path</a:t>
-            </a:r>
-          </a:p>
-          <a:p>
-            <a:pPr lvl="1"/>
-            <a:r>
-              <a:rPr lang="en-GB" sz="2000" dirty="0"/>
-              <a:t>Running a basic LIF import</a:t>
-            </a:r>
-          </a:p>
-          <a:p>
-            <a:pPr lvl="1"/>
-            <a:r>
-              <a:rPr lang="en-GB" sz="2000" dirty="0"/>
-              <a:t>Dealing with multiple series</a:t>
-            </a:r>
-          </a:p>
-          <a:p>
-            <a:pPr lvl="1"/>
-            <a:r>
-              <a:rPr lang="en-GB" sz="2000" dirty="0"/>
-              <a:t>Dealing with metadata</a:t>
-            </a:r>
-          </a:p>
-          <a:p>
-            <a:pPr lvl="1"/>
-            <a:endParaRPr lang="en-GB" sz="2000" dirty="0"/>
+              <a:rPr lang="en-GB" dirty="0"/>
+              <a:t>Similar to arrays, but each element is a “cell”</a:t>
+            </a:r>
+          </a:p>
+          <a:p>
+            <a:pPr lvl="1"/>
+            <a:r>
+              <a:rPr lang="en-GB" dirty="0"/>
+              <a:t>Regular grid of cells</a:t>
+            </a:r>
+          </a:p>
+          <a:p>
+            <a:pPr lvl="1"/>
+            <a:r>
+              <a:rPr lang="en-GB" dirty="0"/>
+              <a:t>Can be N-dimensional</a:t>
+            </a:r>
+          </a:p>
+          <a:p>
+            <a:pPr lvl="1"/>
+            <a:r>
+              <a:rPr lang="en-GB" dirty="0"/>
+              <a:t>Can hold different data types in each cell</a:t>
+            </a:r>
+          </a:p>
+          <a:p>
+            <a:endParaRPr lang="en-GB" sz="1200" dirty="0"/>
+          </a:p>
+          <a:p>
+            <a:r>
+              <a:rPr lang="en-GB" dirty="0"/>
+              <a:t>A cell can hold any data type, for example</a:t>
+            </a:r>
+          </a:p>
+          <a:p>
+            <a:pPr lvl="1"/>
+            <a:r>
+              <a:rPr lang="en-GB" dirty="0"/>
+              <a:t>Single numeric values</a:t>
+            </a:r>
+          </a:p>
+          <a:p>
+            <a:pPr lvl="1"/>
+            <a:r>
+              <a:rPr lang="en-GB" dirty="0"/>
+              <a:t>Text</a:t>
+            </a:r>
+          </a:p>
+          <a:p>
+            <a:pPr lvl="1"/>
+            <a:r>
+              <a:rPr lang="en-GB" dirty="0"/>
+              <a:t>Numeric arrays and matrices</a:t>
+            </a:r>
+          </a:p>
+          <a:p>
+            <a:pPr lvl="1"/>
+            <a:r>
+              <a:rPr lang="en-GB" dirty="0"/>
+              <a:t>Even another cell array!</a:t>
+            </a:r>
+          </a:p>
+          <a:p>
+            <a:pPr lvl="1"/>
+            <a:endParaRPr lang="en-GB" sz="1200" dirty="0"/>
+          </a:p>
+        </p:txBody>
+      </p:sp>
+      <p:graphicFrame>
+        <p:nvGraphicFramePr>
+          <p:cNvPr id="8" name="Table 11">
+            <a:extLst>
+              <a:ext uri="{FF2B5EF4-FFF2-40B4-BE49-F238E27FC236}">
+                <a16:creationId xmlns:a16="http://schemas.microsoft.com/office/drawing/2014/main" id="{4DCE7BA0-FD5A-4C43-8031-5FD38411ED82}"/>
+              </a:ext>
+            </a:extLst>
+          </p:cNvPr>
+          <p:cNvGraphicFramePr>
+            <a:graphicFrameLocks noGrp="1"/>
+          </p:cNvGraphicFramePr>
+          <p:nvPr/>
+        </p:nvGraphicFramePr>
+        <p:xfrm>
+          <a:off x="9225841" y="3112828"/>
+          <a:ext cx="972000" cy="972000"/>
+        </p:xfrm>
+        <a:graphic>
+          <a:graphicData uri="http://schemas.openxmlformats.org/drawingml/2006/table">
+            <a:tbl>
+              <a:tblPr firstRow="1" bandRow="1">
+                <a:tableStyleId>{5940675A-B579-460E-94D1-54222C63F5DA}</a:tableStyleId>
+              </a:tblPr>
+              <a:tblGrid>
+                <a:gridCol w="486000">
+                  <a:extLst>
+                    <a:ext uri="{9D8B030D-6E8A-4147-A177-3AD203B41FA5}">
+                      <a16:colId xmlns:a16="http://schemas.microsoft.com/office/drawing/2014/main" val="2264223351"/>
+                    </a:ext>
+                  </a:extLst>
+                </a:gridCol>
+                <a:gridCol w="486000">
+                  <a:extLst>
+                    <a:ext uri="{9D8B030D-6E8A-4147-A177-3AD203B41FA5}">
+                      <a16:colId xmlns:a16="http://schemas.microsoft.com/office/drawing/2014/main" val="2532173928"/>
+                    </a:ext>
+                  </a:extLst>
+                </a:gridCol>
+              </a:tblGrid>
+              <a:tr h="486000">
+                <a:tc>
+                  <a:txBody>
+                    <a:bodyPr/>
+                    <a:lstStyle/>
+                    <a:p>
+                      <a:pPr algn="ctr"/>
+                      <a:r>
+                        <a:rPr lang="en-GB" sz="1300" dirty="0"/>
+                        <a:t>1.2</a:t>
+                      </a:r>
+                    </a:p>
+                  </a:txBody>
+                  <a:tcPr marL="0" marR="0" marT="0" marB="0" anchor="ctr"/>
+                </a:tc>
+                <a:tc>
+                  <a:txBody>
+                    <a:bodyPr/>
+                    <a:lstStyle/>
+                    <a:p>
+                      <a:pPr algn="ctr"/>
+                      <a:r>
+                        <a:rPr lang="en-GB" sz="1300" dirty="0"/>
+                        <a:t>3.7</a:t>
+                      </a:r>
+                    </a:p>
+                  </a:txBody>
+                  <a:tcPr marL="0" marR="0" marT="0" marB="0" anchor="ctr"/>
+                </a:tc>
+                <a:extLst>
+                  <a:ext uri="{0D108BD9-81ED-4DB2-BD59-A6C34878D82A}">
+                    <a16:rowId xmlns:a16="http://schemas.microsoft.com/office/drawing/2014/main" val="2907702860"/>
+                  </a:ext>
+                </a:extLst>
+              </a:tr>
+              <a:tr h="486000">
+                <a:tc>
+                  <a:txBody>
+                    <a:bodyPr/>
+                    <a:lstStyle/>
+                    <a:p>
+                      <a:pPr algn="ctr"/>
+                      <a:r>
+                        <a:rPr lang="en-GB" sz="1300" dirty="0"/>
+                        <a:t>0.7</a:t>
+                      </a:r>
+                    </a:p>
+                  </a:txBody>
+                  <a:tcPr marL="0" marR="0" marT="0" marB="0" anchor="ctr"/>
+                </a:tc>
+                <a:tc>
+                  <a:txBody>
+                    <a:bodyPr/>
+                    <a:lstStyle/>
+                    <a:p>
+                      <a:pPr algn="ctr"/>
+                      <a:r>
+                        <a:rPr lang="en-GB" sz="1300" dirty="0"/>
+                        <a:t>-5.5</a:t>
+                      </a:r>
+                    </a:p>
+                  </a:txBody>
+                  <a:tcPr marL="0" marR="0" marT="0" marB="0" anchor="ctr"/>
+                </a:tc>
+                <a:extLst>
+                  <a:ext uri="{0D108BD9-81ED-4DB2-BD59-A6C34878D82A}">
+                    <a16:rowId xmlns:a16="http://schemas.microsoft.com/office/drawing/2014/main" val="3764598351"/>
+                  </a:ext>
+                </a:extLst>
+              </a:tr>
+            </a:tbl>
+          </a:graphicData>
+        </a:graphic>
+      </p:graphicFrame>
+      <p:sp>
+        <p:nvSpPr>
+          <p:cNvPr id="12" name="Rectangle: Rounded Corners 11">
+            <a:extLst>
+              <a:ext uri="{FF2B5EF4-FFF2-40B4-BE49-F238E27FC236}">
+                <a16:creationId xmlns:a16="http://schemas.microsoft.com/office/drawing/2014/main" id="{7E9F1019-0F65-4875-8ED9-1A5F9A63DD55}"/>
+              </a:ext>
+            </a:extLst>
+          </p:cNvPr>
+          <p:cNvSpPr/>
+          <p:nvPr/>
+        </p:nvSpPr>
+        <p:spPr>
+          <a:xfrm>
+            <a:off x="9082877" y="1660664"/>
+            <a:ext cx="1257929" cy="1257929"/>
+          </a:xfrm>
+          <a:prstGeom prst="roundRect">
+            <a:avLst/>
+          </a:prstGeom>
+          <a:noFill/>
+          <a:ln w="15240">
+            <a:solidFill>
+              <a:schemeClr val="tx1"/>
+            </a:solidFill>
+          </a:ln>
+        </p:spPr>
+        <p:style>
+          <a:lnRef idx="2">
+            <a:schemeClr val="accent1">
+              <a:shade val="50000"/>
+            </a:schemeClr>
+          </a:lnRef>
+          <a:fillRef idx="1">
+            <a:schemeClr val="accent1"/>
+          </a:fillRef>
+          <a:effectRef idx="0">
+            <a:schemeClr val="accent1"/>
+          </a:effectRef>
+          <a:fontRef idx="minor">
+            <a:schemeClr val="lt1"/>
+          </a:fontRef>
+        </p:style>
+        <p:txBody>
+          <a:bodyPr rtlCol="0" anchor="ctr"/>
+          <a:lstStyle/>
+          <a:p>
+            <a:pPr algn="ctr"/>
+            <a:endParaRPr lang="en-GB"/>
+          </a:p>
+        </p:txBody>
+      </p:sp>
+      <p:sp>
+        <p:nvSpPr>
+          <p:cNvPr id="23" name="Rectangle: Rounded Corners 22">
+            <a:extLst>
+              <a:ext uri="{FF2B5EF4-FFF2-40B4-BE49-F238E27FC236}">
+                <a16:creationId xmlns:a16="http://schemas.microsoft.com/office/drawing/2014/main" id="{F1169B2A-233E-4D7E-9739-72BD24B41066}"/>
+              </a:ext>
+            </a:extLst>
+          </p:cNvPr>
+          <p:cNvSpPr/>
+          <p:nvPr/>
+        </p:nvSpPr>
+        <p:spPr>
+          <a:xfrm>
+            <a:off x="9082877" y="2969864"/>
+            <a:ext cx="1257929" cy="1257929"/>
+          </a:xfrm>
+          <a:prstGeom prst="roundRect">
+            <a:avLst/>
+          </a:prstGeom>
+          <a:noFill/>
+          <a:ln w="15240">
+            <a:solidFill>
+              <a:schemeClr val="tx1"/>
+            </a:solidFill>
+          </a:ln>
+        </p:spPr>
+        <p:style>
+          <a:lnRef idx="2">
+            <a:schemeClr val="accent1">
+              <a:shade val="50000"/>
+            </a:schemeClr>
+          </a:lnRef>
+          <a:fillRef idx="1">
+            <a:schemeClr val="accent1"/>
+          </a:fillRef>
+          <a:effectRef idx="0">
+            <a:schemeClr val="accent1"/>
+          </a:effectRef>
+          <a:fontRef idx="minor">
+            <a:schemeClr val="lt1"/>
+          </a:fontRef>
+        </p:style>
+        <p:txBody>
+          <a:bodyPr rtlCol="0" anchor="ctr"/>
+          <a:lstStyle/>
+          <a:p>
+            <a:pPr algn="ctr"/>
+            <a:endParaRPr lang="en-GB"/>
+          </a:p>
+        </p:txBody>
+      </p:sp>
+      <p:sp>
+        <p:nvSpPr>
+          <p:cNvPr id="27" name="Rectangle: Rounded Corners 26">
+            <a:extLst>
+              <a:ext uri="{FF2B5EF4-FFF2-40B4-BE49-F238E27FC236}">
+                <a16:creationId xmlns:a16="http://schemas.microsoft.com/office/drawing/2014/main" id="{29527B9A-D721-454E-87E9-F623347D7BEA}"/>
+              </a:ext>
+            </a:extLst>
+          </p:cNvPr>
+          <p:cNvSpPr/>
+          <p:nvPr/>
+        </p:nvSpPr>
+        <p:spPr>
+          <a:xfrm>
+            <a:off x="9082877" y="4278820"/>
+            <a:ext cx="1257929" cy="1257929"/>
+          </a:xfrm>
+          <a:prstGeom prst="roundRect">
+            <a:avLst/>
+          </a:prstGeom>
+          <a:noFill/>
+          <a:ln w="15240">
+            <a:solidFill>
+              <a:schemeClr val="tx1"/>
+            </a:solidFill>
+          </a:ln>
+        </p:spPr>
+        <p:style>
+          <a:lnRef idx="2">
+            <a:schemeClr val="accent1">
+              <a:shade val="50000"/>
+            </a:schemeClr>
+          </a:lnRef>
+          <a:fillRef idx="1">
+            <a:schemeClr val="accent1"/>
+          </a:fillRef>
+          <a:effectRef idx="0">
+            <a:schemeClr val="accent1"/>
+          </a:effectRef>
+          <a:fontRef idx="minor">
+            <a:schemeClr val="lt1"/>
+          </a:fontRef>
+        </p:style>
+        <p:txBody>
+          <a:bodyPr rtlCol="0" anchor="ctr"/>
+          <a:lstStyle/>
+          <a:p>
+            <a:pPr algn="ctr"/>
+            <a:endParaRPr lang="en-GB"/>
+          </a:p>
+        </p:txBody>
+      </p:sp>
+      <p:sp>
+        <p:nvSpPr>
+          <p:cNvPr id="33" name="Rectangle: Rounded Corners 32">
+            <a:extLst>
+              <a:ext uri="{FF2B5EF4-FFF2-40B4-BE49-F238E27FC236}">
+                <a16:creationId xmlns:a16="http://schemas.microsoft.com/office/drawing/2014/main" id="{3AF4BA7E-2227-414E-87FE-33656D160CD4}"/>
+              </a:ext>
+            </a:extLst>
+          </p:cNvPr>
+          <p:cNvSpPr/>
+          <p:nvPr/>
+        </p:nvSpPr>
+        <p:spPr>
+          <a:xfrm>
+            <a:off x="10391145" y="1660664"/>
+            <a:ext cx="1257929" cy="1257929"/>
+          </a:xfrm>
+          <a:prstGeom prst="roundRect">
+            <a:avLst/>
+          </a:prstGeom>
+          <a:noFill/>
+          <a:ln w="15240">
+            <a:solidFill>
+              <a:schemeClr val="tx1"/>
+            </a:solidFill>
+          </a:ln>
+        </p:spPr>
+        <p:style>
+          <a:lnRef idx="2">
+            <a:schemeClr val="accent1">
+              <a:shade val="50000"/>
+            </a:schemeClr>
+          </a:lnRef>
+          <a:fillRef idx="1">
+            <a:schemeClr val="accent1"/>
+          </a:fillRef>
+          <a:effectRef idx="0">
+            <a:schemeClr val="accent1"/>
+          </a:effectRef>
+          <a:fontRef idx="minor">
+            <a:schemeClr val="lt1"/>
+          </a:fontRef>
+        </p:style>
+        <p:txBody>
+          <a:bodyPr rtlCol="0" anchor="ctr"/>
+          <a:lstStyle/>
+          <a:p>
+            <a:pPr algn="ctr"/>
+            <a:endParaRPr lang="en-GB"/>
+          </a:p>
+        </p:txBody>
+      </p:sp>
+      <p:sp>
+        <p:nvSpPr>
+          <p:cNvPr id="34" name="Rectangle: Rounded Corners 33">
+            <a:extLst>
+              <a:ext uri="{FF2B5EF4-FFF2-40B4-BE49-F238E27FC236}">
+                <a16:creationId xmlns:a16="http://schemas.microsoft.com/office/drawing/2014/main" id="{94C9D241-0E11-4BB3-8AE7-C4684710EFA7}"/>
+              </a:ext>
+            </a:extLst>
+          </p:cNvPr>
+          <p:cNvSpPr/>
+          <p:nvPr/>
+        </p:nvSpPr>
+        <p:spPr>
+          <a:xfrm>
+            <a:off x="10391145" y="2969864"/>
+            <a:ext cx="1257929" cy="1257929"/>
+          </a:xfrm>
+          <a:prstGeom prst="roundRect">
+            <a:avLst/>
+          </a:prstGeom>
+          <a:noFill/>
+          <a:ln w="15240">
+            <a:solidFill>
+              <a:schemeClr val="tx1"/>
+            </a:solidFill>
+          </a:ln>
+        </p:spPr>
+        <p:style>
+          <a:lnRef idx="2">
+            <a:schemeClr val="accent1">
+              <a:shade val="50000"/>
+            </a:schemeClr>
+          </a:lnRef>
+          <a:fillRef idx="1">
+            <a:schemeClr val="accent1"/>
+          </a:fillRef>
+          <a:effectRef idx="0">
+            <a:schemeClr val="accent1"/>
+          </a:effectRef>
+          <a:fontRef idx="minor">
+            <a:schemeClr val="lt1"/>
+          </a:fontRef>
+        </p:style>
+        <p:txBody>
+          <a:bodyPr rtlCol="0" anchor="ctr"/>
+          <a:lstStyle/>
+          <a:p>
+            <a:pPr algn="ctr"/>
+            <a:endParaRPr lang="en-GB"/>
+          </a:p>
+        </p:txBody>
+      </p:sp>
+      <p:sp>
+        <p:nvSpPr>
+          <p:cNvPr id="35" name="Rectangle: Rounded Corners 34">
+            <a:extLst>
+              <a:ext uri="{FF2B5EF4-FFF2-40B4-BE49-F238E27FC236}">
+                <a16:creationId xmlns:a16="http://schemas.microsoft.com/office/drawing/2014/main" id="{2BF487D2-0EAF-458A-8F60-478369AE7C72}"/>
+              </a:ext>
+            </a:extLst>
+          </p:cNvPr>
+          <p:cNvSpPr/>
+          <p:nvPr/>
+        </p:nvSpPr>
+        <p:spPr>
+          <a:xfrm>
+            <a:off x="10391145" y="4278820"/>
+            <a:ext cx="1257929" cy="1257929"/>
+          </a:xfrm>
+          <a:prstGeom prst="roundRect">
+            <a:avLst/>
+          </a:prstGeom>
+          <a:noFill/>
+          <a:ln w="15240">
+            <a:solidFill>
+              <a:schemeClr val="tx1"/>
+            </a:solidFill>
+          </a:ln>
+        </p:spPr>
+        <p:style>
+          <a:lnRef idx="2">
+            <a:schemeClr val="accent1">
+              <a:shade val="50000"/>
+            </a:schemeClr>
+          </a:lnRef>
+          <a:fillRef idx="1">
+            <a:schemeClr val="accent1"/>
+          </a:fillRef>
+          <a:effectRef idx="0">
+            <a:schemeClr val="accent1"/>
+          </a:effectRef>
+          <a:fontRef idx="minor">
+            <a:schemeClr val="lt1"/>
+          </a:fontRef>
+        </p:style>
+        <p:txBody>
+          <a:bodyPr rtlCol="0" anchor="ctr"/>
+          <a:lstStyle/>
+          <a:p>
+            <a:pPr algn="ctr"/>
+            <a:endParaRPr lang="en-GB"/>
+          </a:p>
+        </p:txBody>
+      </p:sp>
+      <p:sp>
+        <p:nvSpPr>
+          <p:cNvPr id="43" name="TextBox 42">
+            <a:extLst>
+              <a:ext uri="{FF2B5EF4-FFF2-40B4-BE49-F238E27FC236}">
+                <a16:creationId xmlns:a16="http://schemas.microsoft.com/office/drawing/2014/main" id="{987C3DF1-8DE2-4D9A-B19C-B0799B76F18F}"/>
+              </a:ext>
+            </a:extLst>
+          </p:cNvPr>
+          <p:cNvSpPr txBox="1"/>
+          <p:nvPr/>
+        </p:nvSpPr>
+        <p:spPr>
+          <a:xfrm>
+            <a:off x="9308131" y="2074184"/>
+            <a:ext cx="807420" cy="430887"/>
+          </a:xfrm>
+          <a:prstGeom prst="rect">
+            <a:avLst/>
+          </a:prstGeom>
+          <a:noFill/>
+        </p:spPr>
+        <p:txBody>
+          <a:bodyPr wrap="square" rtlCol="0">
+            <a:spAutoFit/>
+          </a:bodyPr>
+          <a:lstStyle/>
+          <a:p>
+            <a:pPr algn="ctr"/>
+            <a:r>
+              <a:rPr lang="en-GB" sz="2200" dirty="0"/>
+              <a:t>0.9</a:t>
+            </a:r>
+          </a:p>
+        </p:txBody>
+      </p:sp>
+      <p:sp>
+        <p:nvSpPr>
+          <p:cNvPr id="44" name="TextBox 43">
+            <a:extLst>
+              <a:ext uri="{FF2B5EF4-FFF2-40B4-BE49-F238E27FC236}">
+                <a16:creationId xmlns:a16="http://schemas.microsoft.com/office/drawing/2014/main" id="{3E821E05-06D3-4EA9-9B74-967B91D8FCF5}"/>
+              </a:ext>
+            </a:extLst>
+          </p:cNvPr>
+          <p:cNvSpPr txBox="1"/>
+          <p:nvPr/>
+        </p:nvSpPr>
+        <p:spPr>
+          <a:xfrm>
+            <a:off x="10391145" y="1904906"/>
+            <a:ext cx="1257930" cy="769441"/>
+          </a:xfrm>
+          <a:prstGeom prst="rect">
+            <a:avLst/>
+          </a:prstGeom>
+          <a:noFill/>
+        </p:spPr>
+        <p:txBody>
+          <a:bodyPr wrap="square" rtlCol="0">
+            <a:spAutoFit/>
+          </a:bodyPr>
+          <a:lstStyle/>
+          <a:p>
+            <a:pPr algn="ctr"/>
+            <a:r>
+              <a:rPr lang="en-GB" sz="2200" dirty="0"/>
+              <a:t>‘some text’</a:t>
+            </a:r>
+          </a:p>
+        </p:txBody>
+      </p:sp>
+      <p:grpSp>
+        <p:nvGrpSpPr>
+          <p:cNvPr id="49" name="Group 48">
+            <a:extLst>
+              <a:ext uri="{FF2B5EF4-FFF2-40B4-BE49-F238E27FC236}">
+                <a16:creationId xmlns:a16="http://schemas.microsoft.com/office/drawing/2014/main" id="{6B3DACF4-EA9F-4C67-8E75-96CCDCC398B0}"/>
+              </a:ext>
+            </a:extLst>
+          </p:cNvPr>
+          <p:cNvGrpSpPr/>
+          <p:nvPr/>
+        </p:nvGrpSpPr>
+        <p:grpSpPr>
+          <a:xfrm>
+            <a:off x="10529659" y="4673784"/>
+            <a:ext cx="980901" cy="468000"/>
+            <a:chOff x="10506552" y="4666459"/>
+            <a:chExt cx="980901" cy="468000"/>
+          </a:xfrm>
+        </p:grpSpPr>
+        <p:sp>
+          <p:nvSpPr>
+            <p:cNvPr id="46" name="Rectangle: Rounded Corners 45">
+              <a:extLst>
+                <a:ext uri="{FF2B5EF4-FFF2-40B4-BE49-F238E27FC236}">
+                  <a16:creationId xmlns:a16="http://schemas.microsoft.com/office/drawing/2014/main" id="{4AE21F88-46D8-4552-887F-3A91111E9562}"/>
+                </a:ext>
+              </a:extLst>
+            </p:cNvPr>
+            <p:cNvSpPr/>
+            <p:nvPr/>
+          </p:nvSpPr>
+          <p:spPr>
+            <a:xfrm>
+              <a:off x="10506552" y="4666459"/>
+              <a:ext cx="468000" cy="468000"/>
+            </a:xfrm>
+            <a:prstGeom prst="roundRect">
+              <a:avLst/>
+            </a:prstGeom>
+            <a:noFill/>
+            <a:ln w="15240">
+              <a:solidFill>
+                <a:schemeClr val="tx1"/>
+              </a:solidFill>
+            </a:ln>
+          </p:spPr>
+          <p:style>
+            <a:lnRef idx="2">
+              <a:schemeClr val="accent1">
+                <a:shade val="50000"/>
+              </a:schemeClr>
+            </a:lnRef>
+            <a:fillRef idx="1">
+              <a:schemeClr val="accent1"/>
+            </a:fillRef>
+            <a:effectRef idx="0">
+              <a:schemeClr val="accent1"/>
+            </a:effectRef>
+            <a:fontRef idx="minor">
+              <a:schemeClr val="lt1"/>
+            </a:fontRef>
+          </p:style>
+          <p:txBody>
+            <a:bodyPr rtlCol="0" anchor="ctr"/>
+            <a:lstStyle/>
+            <a:p>
+              <a:pPr algn="ctr"/>
+              <a:endParaRPr lang="en-GB"/>
+            </a:p>
+          </p:txBody>
+        </p:sp>
+        <p:sp>
+          <p:nvSpPr>
+            <p:cNvPr id="47" name="Rectangle: Rounded Corners 46">
+              <a:extLst>
+                <a:ext uri="{FF2B5EF4-FFF2-40B4-BE49-F238E27FC236}">
+                  <a16:creationId xmlns:a16="http://schemas.microsoft.com/office/drawing/2014/main" id="{2C4120C1-4C52-4C7D-97D2-D972F01DA0C5}"/>
+                </a:ext>
+              </a:extLst>
+            </p:cNvPr>
+            <p:cNvSpPr/>
+            <p:nvPr/>
+          </p:nvSpPr>
+          <p:spPr>
+            <a:xfrm>
+              <a:off x="11019453" y="4666459"/>
+              <a:ext cx="468000" cy="468000"/>
+            </a:xfrm>
+            <a:prstGeom prst="roundRect">
+              <a:avLst/>
+            </a:prstGeom>
+            <a:noFill/>
+            <a:ln w="15240">
+              <a:solidFill>
+                <a:schemeClr val="tx1"/>
+              </a:solidFill>
+            </a:ln>
+          </p:spPr>
+          <p:style>
+            <a:lnRef idx="2">
+              <a:schemeClr val="accent1">
+                <a:shade val="50000"/>
+              </a:schemeClr>
+            </a:lnRef>
+            <a:fillRef idx="1">
+              <a:schemeClr val="accent1"/>
+            </a:fillRef>
+            <a:effectRef idx="0">
+              <a:schemeClr val="accent1"/>
+            </a:effectRef>
+            <a:fontRef idx="minor">
+              <a:schemeClr val="lt1"/>
+            </a:fontRef>
+          </p:style>
+          <p:txBody>
+            <a:bodyPr rtlCol="0" anchor="ctr"/>
+            <a:lstStyle/>
+            <a:p>
+              <a:pPr algn="ctr"/>
+              <a:endParaRPr lang="en-GB"/>
+            </a:p>
+          </p:txBody>
+        </p:sp>
+      </p:grpSp>
+      <p:sp>
+        <p:nvSpPr>
+          <p:cNvPr id="50" name="TextBox 49">
+            <a:extLst>
+              <a:ext uri="{FF2B5EF4-FFF2-40B4-BE49-F238E27FC236}">
+                <a16:creationId xmlns:a16="http://schemas.microsoft.com/office/drawing/2014/main" id="{D0DF4DBF-C048-49FD-B22E-80754C2314DE}"/>
+              </a:ext>
+            </a:extLst>
+          </p:cNvPr>
+          <p:cNvSpPr txBox="1"/>
+          <p:nvPr/>
+        </p:nvSpPr>
+        <p:spPr>
+          <a:xfrm>
+            <a:off x="10616399" y="3383385"/>
+            <a:ext cx="807420" cy="430887"/>
+          </a:xfrm>
+          <a:prstGeom prst="rect">
+            <a:avLst/>
+          </a:prstGeom>
+          <a:noFill/>
+        </p:spPr>
+        <p:txBody>
+          <a:bodyPr wrap="square" rtlCol="0">
+            <a:spAutoFit/>
+          </a:bodyPr>
+          <a:lstStyle/>
+          <a:p>
+            <a:pPr algn="ctr"/>
+            <a:r>
+              <a:rPr lang="en-GB" sz="2200" dirty="0"/>
+              <a:t>-128</a:t>
+            </a:r>
+          </a:p>
+        </p:txBody>
+      </p:sp>
+      <p:sp>
+        <p:nvSpPr>
+          <p:cNvPr id="51" name="TextBox 50">
+            <a:extLst>
+              <a:ext uri="{FF2B5EF4-FFF2-40B4-BE49-F238E27FC236}">
+                <a16:creationId xmlns:a16="http://schemas.microsoft.com/office/drawing/2014/main" id="{907622E2-5BB8-4195-9C44-0D86BE661C73}"/>
+              </a:ext>
+            </a:extLst>
+          </p:cNvPr>
+          <p:cNvSpPr txBox="1"/>
+          <p:nvPr/>
+        </p:nvSpPr>
+        <p:spPr>
+          <a:xfrm>
+            <a:off x="9081609" y="4523063"/>
+            <a:ext cx="1257930" cy="769441"/>
+          </a:xfrm>
+          <a:prstGeom prst="rect">
+            <a:avLst/>
+          </a:prstGeom>
+          <a:noFill/>
+        </p:spPr>
+        <p:txBody>
+          <a:bodyPr wrap="square" rtlCol="0">
+            <a:spAutoFit/>
+          </a:bodyPr>
+          <a:lstStyle/>
+          <a:p>
+            <a:pPr algn="ctr"/>
+            <a:r>
+              <a:rPr lang="en-GB" sz="2200" dirty="0"/>
+              <a:t>‘more stuff’</a:t>
+            </a:r>
+          </a:p>
+        </p:txBody>
+      </p:sp>
+      <p:sp>
+        <p:nvSpPr>
+          <p:cNvPr id="19" name="TextBox 18">
+            <a:extLst>
+              <a:ext uri="{FF2B5EF4-FFF2-40B4-BE49-F238E27FC236}">
+                <a16:creationId xmlns:a16="http://schemas.microsoft.com/office/drawing/2014/main" id="{D5B64744-CC08-40D9-8257-AAE8903601F5}"/>
+              </a:ext>
+            </a:extLst>
+          </p:cNvPr>
+          <p:cNvSpPr txBox="1"/>
+          <p:nvPr/>
+        </p:nvSpPr>
+        <p:spPr>
+          <a:xfrm>
+            <a:off x="10134694" y="4689945"/>
+            <a:ext cx="1257930" cy="430887"/>
+          </a:xfrm>
+          <a:prstGeom prst="rect">
+            <a:avLst/>
+          </a:prstGeom>
+          <a:noFill/>
+        </p:spPr>
+        <p:txBody>
+          <a:bodyPr wrap="square" rtlCol="0">
+            <a:spAutoFit/>
+          </a:bodyPr>
+          <a:lstStyle/>
+          <a:p>
+            <a:pPr algn="ctr"/>
+            <a:r>
+              <a:rPr lang="en-GB" sz="2200" dirty="0"/>
+              <a:t>‘a’</a:t>
+            </a:r>
+          </a:p>
+        </p:txBody>
+      </p:sp>
+      <p:sp>
+        <p:nvSpPr>
+          <p:cNvPr id="20" name="TextBox 19">
+            <a:extLst>
+              <a:ext uri="{FF2B5EF4-FFF2-40B4-BE49-F238E27FC236}">
+                <a16:creationId xmlns:a16="http://schemas.microsoft.com/office/drawing/2014/main" id="{46A2B42D-40A4-4982-B244-6331630DA106}"/>
+              </a:ext>
+            </a:extLst>
+          </p:cNvPr>
+          <p:cNvSpPr txBox="1"/>
+          <p:nvPr/>
+        </p:nvSpPr>
+        <p:spPr>
+          <a:xfrm>
+            <a:off x="11042560" y="4689945"/>
+            <a:ext cx="468000" cy="430887"/>
+          </a:xfrm>
+          <a:prstGeom prst="rect">
+            <a:avLst/>
+          </a:prstGeom>
+          <a:noFill/>
+        </p:spPr>
+        <p:txBody>
+          <a:bodyPr wrap="square" rtlCol="0">
+            <a:spAutoFit/>
+          </a:bodyPr>
+          <a:lstStyle/>
+          <a:p>
+            <a:pPr algn="ctr"/>
+            <a:r>
+              <a:rPr lang="en-GB" sz="2200" dirty="0"/>
+              <a:t>42</a:t>
+            </a:r>
           </a:p>
         </p:txBody>
       </p:sp>
     </p:spTree>
     <p:extLst>
       <p:ext uri="{BB962C8B-B14F-4D97-AF65-F5344CB8AC3E}">
-        <p14:creationId xmlns:p14="http://schemas.microsoft.com/office/powerpoint/2010/main" val="677120248"/>
+        <p14:creationId xmlns:p14="http://schemas.microsoft.com/office/powerpoint/2010/main" val="998366495"/>
       </p:ext>
     </p:extLst>
   </p:cSld>
@@ -2582,6 +4006,875 @@
           <p:cNvPr id="2" name="Title 1">
             <a:extLst>
               <a:ext uri="{FF2B5EF4-FFF2-40B4-BE49-F238E27FC236}">
+                <a16:creationId xmlns:a16="http://schemas.microsoft.com/office/drawing/2014/main" id="{FB0D9636-2B3A-4E3D-9B13-904FF3CE8CE3}"/>
+              </a:ext>
+            </a:extLst>
+          </p:cNvPr>
+          <p:cNvSpPr>
+            <a:spLocks noGrp="1"/>
+          </p:cNvSpPr>
+          <p:nvPr>
+            <p:ph type="title"/>
+          </p:nvPr>
+        </p:nvSpPr>
+        <p:spPr/>
+        <p:txBody>
+          <a:bodyPr/>
+          <a:lstStyle/>
+          <a:p>
+            <a:r>
+              <a:rPr lang="en-GB" dirty="0"/>
+              <a:t>Cell arrays</a:t>
+            </a:r>
+          </a:p>
+        </p:txBody>
+      </p:sp>
+      <p:sp>
+        <p:nvSpPr>
+          <p:cNvPr id="3" name="Content Placeholder 2">
+            <a:extLst>
+              <a:ext uri="{FF2B5EF4-FFF2-40B4-BE49-F238E27FC236}">
+                <a16:creationId xmlns:a16="http://schemas.microsoft.com/office/drawing/2014/main" id="{DFE43EAF-8F5E-44D2-BF28-45DAFCB5DD96}"/>
+              </a:ext>
+            </a:extLst>
+          </p:cNvPr>
+          <p:cNvSpPr>
+            <a:spLocks noGrp="1"/>
+          </p:cNvSpPr>
+          <p:nvPr>
+            <p:ph idx="1"/>
+          </p:nvPr>
+        </p:nvSpPr>
+        <p:spPr/>
+        <p:txBody>
+          <a:bodyPr/>
+          <a:lstStyle/>
+          <a:p>
+            <a:r>
+              <a:rPr lang="en-GB" dirty="0"/>
+              <a:t>Create cell arrays using braces</a:t>
+            </a:r>
+          </a:p>
+          <a:p>
+            <a:pPr lvl="1"/>
+            <a:r>
+              <a:rPr lang="en-GB" dirty="0"/>
+              <a:t>Use same comma and semicolon form as matrices</a:t>
+            </a:r>
+          </a:p>
+          <a:p>
+            <a:pPr lvl="2"/>
+            <a:r>
+              <a:rPr lang="en-GB" dirty="0" err="1"/>
+              <a:t>cell_array</a:t>
+            </a:r>
+            <a:r>
+              <a:rPr lang="en-GB" dirty="0"/>
+              <a:t> = {}</a:t>
+            </a:r>
+          </a:p>
+        </p:txBody>
+      </p:sp>
+    </p:spTree>
+    <p:extLst>
+      <p:ext uri="{BB962C8B-B14F-4D97-AF65-F5344CB8AC3E}">
+        <p14:creationId xmlns:p14="http://schemas.microsoft.com/office/powerpoint/2010/main" val="3258307153"/>
+      </p:ext>
+    </p:extLst>
+  </p:cSld>
+  <p:clrMapOvr>
+    <a:masterClrMapping/>
+  </p:clrMapOvr>
+  <mc:AlternateContent xmlns:mc="http://schemas.openxmlformats.org/markup-compatibility/2006" xmlns:p14="http://schemas.microsoft.com/office/powerpoint/2010/main">
+    <mc:Choice Requires="p14">
+      <p:transition p14:dur="300">
+        <p:fade/>
+      </p:transition>
+    </mc:Choice>
+    <mc:Fallback xmlns="">
+      <p:transition>
+        <p:fade/>
+      </p:transition>
+    </mc:Fallback>
+  </mc:AlternateContent>
+</p:sld>
+</file>
+
+<file path=ppt/slides/slide13.xml><?xml version="1.0" encoding="utf-8"?>
+<p:sld xmlns:a="http://schemas.openxmlformats.org/drawingml/2006/main" xmlns:r="http://schemas.openxmlformats.org/officeDocument/2006/relationships" xmlns:p="http://schemas.openxmlformats.org/presentationml/2006/main">
+  <p:cSld>
+    <p:spTree>
+      <p:nvGrpSpPr>
+        <p:cNvPr id="1" name=""/>
+        <p:cNvGrpSpPr/>
+        <p:nvPr/>
+      </p:nvGrpSpPr>
+      <p:grpSpPr>
+        <a:xfrm>
+          <a:off x="0" y="0"/>
+          <a:ext cx="0" cy="0"/>
+          <a:chOff x="0" y="0"/>
+          <a:chExt cx="0" cy="0"/>
+        </a:xfrm>
+      </p:grpSpPr>
+      <p:sp>
+        <p:nvSpPr>
+          <p:cNvPr id="2" name="Title 1">
+            <a:extLst>
+              <a:ext uri="{FF2B5EF4-FFF2-40B4-BE49-F238E27FC236}">
+                <a16:creationId xmlns:a16="http://schemas.microsoft.com/office/drawing/2014/main" id="{D0D85ECA-B5C8-49EC-818A-B21ADF7B7361}"/>
+              </a:ext>
+            </a:extLst>
+          </p:cNvPr>
+          <p:cNvSpPr>
+            <a:spLocks noGrp="1"/>
+          </p:cNvSpPr>
+          <p:nvPr>
+            <p:ph type="title"/>
+          </p:nvPr>
+        </p:nvSpPr>
+        <p:spPr/>
+        <p:txBody>
+          <a:bodyPr/>
+          <a:lstStyle/>
+          <a:p>
+            <a:endParaRPr lang="en-GB" dirty="0"/>
+          </a:p>
+        </p:txBody>
+      </p:sp>
+      <p:sp>
+        <p:nvSpPr>
+          <p:cNvPr id="3" name="Content Placeholder 2">
+            <a:extLst>
+              <a:ext uri="{FF2B5EF4-FFF2-40B4-BE49-F238E27FC236}">
+                <a16:creationId xmlns:a16="http://schemas.microsoft.com/office/drawing/2014/main" id="{24EE01E8-E11D-4130-9055-D854AF20B51C}"/>
+              </a:ext>
+            </a:extLst>
+          </p:cNvPr>
+          <p:cNvSpPr>
+            <a:spLocks noGrp="1"/>
+          </p:cNvSpPr>
+          <p:nvPr>
+            <p:ph idx="1"/>
+          </p:nvPr>
+        </p:nvSpPr>
+        <p:spPr/>
+        <p:txBody>
+          <a:bodyPr/>
+          <a:lstStyle/>
+          <a:p>
+            <a:r>
+              <a:rPr lang="en-GB" sz="2000" dirty="0"/>
+              <a:t>Cell arrays</a:t>
+            </a:r>
+          </a:p>
+          <a:p>
+            <a:pPr lvl="1"/>
+            <a:r>
+              <a:rPr lang="en-GB" sz="1800" dirty="0"/>
+              <a:t>[Is there actually any need to cover these? Maybe just a quick mention]</a:t>
+            </a:r>
+          </a:p>
+          <a:p>
+            <a:pPr lvl="1"/>
+            <a:r>
+              <a:rPr lang="en-GB" sz="1800" dirty="0"/>
+              <a:t>Creating cell arrays</a:t>
+            </a:r>
+          </a:p>
+          <a:p>
+            <a:pPr lvl="1"/>
+            <a:r>
+              <a:rPr lang="en-GB" sz="1800" dirty="0"/>
+              <a:t>Each cell can contain data of a different type (e.g. text and numeric)</a:t>
+            </a:r>
+          </a:p>
+          <a:p>
+            <a:pPr lvl="2"/>
+            <a:r>
+              <a:rPr lang="en-GB" sz="1400" dirty="0"/>
+              <a:t>[Have these effectively been superseded by tables?]</a:t>
+            </a:r>
+            <a:endParaRPr lang="en-GB" sz="1800" dirty="0"/>
+          </a:p>
+          <a:p>
+            <a:r>
+              <a:rPr lang="en-GB" sz="2000" dirty="0"/>
+              <a:t>Structure arrays</a:t>
+            </a:r>
+          </a:p>
+          <a:p>
+            <a:pPr lvl="1"/>
+            <a:r>
+              <a:rPr lang="en-GB" sz="1800" dirty="0"/>
+              <a:t>Store variables in a structure by field names</a:t>
+            </a:r>
+          </a:p>
+          <a:p>
+            <a:pPr lvl="1"/>
+            <a:r>
+              <a:rPr lang="en-GB" sz="1800" dirty="0"/>
+              <a:t>Good for grouping data [what else are they good for?]</a:t>
+            </a:r>
+          </a:p>
+          <a:p>
+            <a:pPr lvl="1"/>
+            <a:r>
+              <a:rPr lang="en-GB" sz="1800" dirty="0"/>
+              <a:t>Creating structure arrays</a:t>
+            </a:r>
+          </a:p>
+          <a:p>
+            <a:pPr lvl="1"/>
+            <a:r>
+              <a:rPr lang="en-GB" sz="1800" dirty="0"/>
+              <a:t>Accessing data in structure arrays</a:t>
+            </a:r>
+          </a:p>
+          <a:p>
+            <a:r>
+              <a:rPr lang="en-GB" sz="2000" dirty="0"/>
+              <a:t>Tables</a:t>
+            </a:r>
+          </a:p>
+          <a:p>
+            <a:pPr lvl="1"/>
+            <a:r>
+              <a:rPr lang="en-GB" sz="1800" dirty="0"/>
+              <a:t>[When were they introduced?]</a:t>
+            </a:r>
+          </a:p>
+          <a:p>
+            <a:pPr lvl="1"/>
+            <a:r>
+              <a:rPr lang="en-GB" sz="1800" dirty="0"/>
+              <a:t>[What are the benefits?]</a:t>
+            </a:r>
+          </a:p>
+          <a:p>
+            <a:pPr lvl="1"/>
+            <a:r>
+              <a:rPr lang="en-GB" sz="1800" dirty="0"/>
+              <a:t>[Loading data directly from file into a table]</a:t>
+            </a:r>
+          </a:p>
+        </p:txBody>
+      </p:sp>
+    </p:spTree>
+    <p:extLst>
+      <p:ext uri="{BB962C8B-B14F-4D97-AF65-F5344CB8AC3E}">
+        <p14:creationId xmlns:p14="http://schemas.microsoft.com/office/powerpoint/2010/main" val="3962622575"/>
+      </p:ext>
+    </p:extLst>
+  </p:cSld>
+  <p:clrMapOvr>
+    <a:masterClrMapping/>
+  </p:clrMapOvr>
+  <mc:AlternateContent xmlns:mc="http://schemas.openxmlformats.org/markup-compatibility/2006" xmlns:p14="http://schemas.microsoft.com/office/powerpoint/2010/main">
+    <mc:Choice Requires="p14">
+      <p:transition p14:dur="300">
+        <p:fade/>
+      </p:transition>
+    </mc:Choice>
+    <mc:Fallback xmlns="">
+      <p:transition>
+        <p:fade/>
+      </p:transition>
+    </mc:Fallback>
+  </mc:AlternateContent>
+</p:sld>
+</file>
+
+<file path=ppt/slides/slide14.xml><?xml version="1.0" encoding="utf-8"?>
+<p:sld xmlns:a="http://schemas.openxmlformats.org/drawingml/2006/main" xmlns:r="http://schemas.openxmlformats.org/officeDocument/2006/relationships" xmlns:p="http://schemas.openxmlformats.org/presentationml/2006/main">
+  <p:cSld>
+    <p:spTree>
+      <p:nvGrpSpPr>
+        <p:cNvPr id="1" name=""/>
+        <p:cNvGrpSpPr/>
+        <p:nvPr/>
+      </p:nvGrpSpPr>
+      <p:grpSpPr>
+        <a:xfrm>
+          <a:off x="0" y="0"/>
+          <a:ext cx="0" cy="0"/>
+          <a:chOff x="0" y="0"/>
+          <a:chExt cx="0" cy="0"/>
+        </a:xfrm>
+      </p:grpSpPr>
+      <p:sp>
+        <p:nvSpPr>
+          <p:cNvPr id="2" name="Title 1">
+            <a:extLst>
+              <a:ext uri="{FF2B5EF4-FFF2-40B4-BE49-F238E27FC236}">
+                <a16:creationId xmlns:a16="http://schemas.microsoft.com/office/drawing/2014/main" id="{8EEF9218-B50A-424A-A99D-57BA08F4A8E3}"/>
+              </a:ext>
+            </a:extLst>
+          </p:cNvPr>
+          <p:cNvSpPr>
+            <a:spLocks noGrp="1"/>
+          </p:cNvSpPr>
+          <p:nvPr>
+            <p:ph type="title"/>
+          </p:nvPr>
+        </p:nvSpPr>
+        <p:spPr/>
+        <p:txBody>
+          <a:bodyPr/>
+          <a:lstStyle/>
+          <a:p>
+            <a:endParaRPr lang="en-GB" dirty="0"/>
+          </a:p>
+        </p:txBody>
+      </p:sp>
+      <p:sp>
+        <p:nvSpPr>
+          <p:cNvPr id="4" name="TextBox 3">
+            <a:extLst>
+              <a:ext uri="{FF2B5EF4-FFF2-40B4-BE49-F238E27FC236}">
+                <a16:creationId xmlns:a16="http://schemas.microsoft.com/office/drawing/2014/main" id="{31426854-EE0B-4A5A-AC6D-2BF50C4B1D90}"/>
+              </a:ext>
+            </a:extLst>
+          </p:cNvPr>
+          <p:cNvSpPr txBox="1"/>
+          <p:nvPr/>
+        </p:nvSpPr>
+        <p:spPr>
+          <a:xfrm>
+            <a:off x="2052408" y="3136612"/>
+            <a:ext cx="8087183" cy="584775"/>
+          </a:xfrm>
+          <a:prstGeom prst="rect">
+            <a:avLst/>
+          </a:prstGeom>
+          <a:noFill/>
+        </p:spPr>
+        <p:txBody>
+          <a:bodyPr wrap="square" rtlCol="0">
+            <a:spAutoFit/>
+          </a:bodyPr>
+          <a:lstStyle/>
+          <a:p>
+            <a:pPr algn="ctr"/>
+            <a:r>
+              <a:rPr lang="en-GB" sz="3200" dirty="0"/>
+              <a:t>Object oriented programming</a:t>
+            </a:r>
+            <a:endParaRPr lang="en-GB" sz="2800" dirty="0">
+              <a:solidFill>
+                <a:schemeClr val="tx1"/>
+              </a:solidFill>
+            </a:endParaRPr>
+          </a:p>
+        </p:txBody>
+      </p:sp>
+    </p:spTree>
+    <p:extLst>
+      <p:ext uri="{BB962C8B-B14F-4D97-AF65-F5344CB8AC3E}">
+        <p14:creationId xmlns:p14="http://schemas.microsoft.com/office/powerpoint/2010/main" val="4130560997"/>
+      </p:ext>
+    </p:extLst>
+  </p:cSld>
+  <p:clrMapOvr>
+    <a:masterClrMapping/>
+  </p:clrMapOvr>
+  <mc:AlternateContent xmlns:mc="http://schemas.openxmlformats.org/markup-compatibility/2006" xmlns:p14="http://schemas.microsoft.com/office/powerpoint/2010/main">
+    <mc:Choice Requires="p14">
+      <p:transition p14:dur="300">
+        <p:fade/>
+      </p:transition>
+    </mc:Choice>
+    <mc:Fallback xmlns="">
+      <p:transition>
+        <p:fade/>
+      </p:transition>
+    </mc:Fallback>
+  </mc:AlternateContent>
+</p:sld>
+</file>
+
+<file path=ppt/slides/slide15.xml><?xml version="1.0" encoding="utf-8"?>
+<p:sld xmlns:a="http://schemas.openxmlformats.org/drawingml/2006/main" xmlns:r="http://schemas.openxmlformats.org/officeDocument/2006/relationships" xmlns:p="http://schemas.openxmlformats.org/presentationml/2006/main">
+  <p:cSld>
+    <p:spTree>
+      <p:nvGrpSpPr>
+        <p:cNvPr id="1" name=""/>
+        <p:cNvGrpSpPr/>
+        <p:nvPr/>
+      </p:nvGrpSpPr>
+      <p:grpSpPr>
+        <a:xfrm>
+          <a:off x="0" y="0"/>
+          <a:ext cx="0" cy="0"/>
+          <a:chOff x="0" y="0"/>
+          <a:chExt cx="0" cy="0"/>
+        </a:xfrm>
+      </p:grpSpPr>
+      <p:sp>
+        <p:nvSpPr>
+          <p:cNvPr id="2" name="Title 1">
+            <a:extLst>
+              <a:ext uri="{FF2B5EF4-FFF2-40B4-BE49-F238E27FC236}">
+                <a16:creationId xmlns:a16="http://schemas.microsoft.com/office/drawing/2014/main" id="{297C1240-D4CE-4AD2-96B1-DBD7075D8052}"/>
+              </a:ext>
+            </a:extLst>
+          </p:cNvPr>
+          <p:cNvSpPr>
+            <a:spLocks noGrp="1"/>
+          </p:cNvSpPr>
+          <p:nvPr>
+            <p:ph type="title"/>
+          </p:nvPr>
+        </p:nvSpPr>
+        <p:spPr/>
+        <p:txBody>
+          <a:bodyPr/>
+          <a:lstStyle/>
+          <a:p>
+            <a:endParaRPr lang="en-GB"/>
+          </a:p>
+        </p:txBody>
+      </p:sp>
+      <p:sp>
+        <p:nvSpPr>
+          <p:cNvPr id="3" name="Content Placeholder 2">
+            <a:extLst>
+              <a:ext uri="{FF2B5EF4-FFF2-40B4-BE49-F238E27FC236}">
+                <a16:creationId xmlns:a16="http://schemas.microsoft.com/office/drawing/2014/main" id="{7E90A914-5E00-4AAB-802D-4C98FA2788C1}"/>
+              </a:ext>
+            </a:extLst>
+          </p:cNvPr>
+          <p:cNvSpPr>
+            <a:spLocks noGrp="1"/>
+          </p:cNvSpPr>
+          <p:nvPr>
+            <p:ph idx="1"/>
+          </p:nvPr>
+        </p:nvSpPr>
+        <p:spPr/>
+        <p:txBody>
+          <a:bodyPr/>
+          <a:lstStyle/>
+          <a:p>
+            <a:r>
+              <a:rPr lang="en-GB" dirty="0"/>
+              <a:t>Intro to OOP</a:t>
+            </a:r>
+          </a:p>
+          <a:p>
+            <a:pPr lvl="1"/>
+            <a:r>
+              <a:rPr lang="en-GB" dirty="0"/>
+              <a:t>What are objects, classes and methods</a:t>
+            </a:r>
+          </a:p>
+          <a:p>
+            <a:pPr lvl="1"/>
+            <a:r>
+              <a:rPr lang="en-GB" dirty="0"/>
+              <a:t>Why would we use this?</a:t>
+            </a:r>
+          </a:p>
+          <a:p>
+            <a:r>
+              <a:rPr lang="en-GB" dirty="0"/>
+              <a:t>Example of OOP</a:t>
+            </a:r>
+          </a:p>
+          <a:p>
+            <a:pPr lvl="1"/>
+            <a:r>
+              <a:rPr lang="en-GB" dirty="0"/>
+              <a:t>Class could refer to physical object, but could also be something that does a job</a:t>
+            </a:r>
+          </a:p>
+          <a:p>
+            <a:pPr lvl="1"/>
+            <a:r>
+              <a:rPr lang="en-GB" dirty="0"/>
+              <a:t>Maybe use nuclear detection as an example</a:t>
+            </a:r>
+          </a:p>
+          <a:p>
+            <a:r>
+              <a:rPr lang="en-GB" dirty="0"/>
+              <a:t>Using objects and methods</a:t>
+            </a:r>
+          </a:p>
+          <a:p>
+            <a:pPr lvl="1"/>
+            <a:r>
+              <a:rPr lang="en-GB" dirty="0"/>
+              <a:t>Find function which outputs objects (maybe something imaging related – maybe </a:t>
+            </a:r>
+            <a:r>
+              <a:rPr lang="en-GB" dirty="0" err="1"/>
+              <a:t>Bioformats</a:t>
+            </a:r>
+            <a:r>
+              <a:rPr lang="en-GB" dirty="0"/>
+              <a:t>…)</a:t>
+            </a:r>
+          </a:p>
+          <a:p>
+            <a:r>
+              <a:rPr lang="en-GB"/>
+              <a:t>Creating objects</a:t>
+            </a:r>
+            <a:endParaRPr lang="en-GB" dirty="0"/>
+          </a:p>
+        </p:txBody>
+      </p:sp>
+    </p:spTree>
+    <p:extLst>
+      <p:ext uri="{BB962C8B-B14F-4D97-AF65-F5344CB8AC3E}">
+        <p14:creationId xmlns:p14="http://schemas.microsoft.com/office/powerpoint/2010/main" val="322493715"/>
+      </p:ext>
+    </p:extLst>
+  </p:cSld>
+  <p:clrMapOvr>
+    <a:masterClrMapping/>
+  </p:clrMapOvr>
+  <mc:AlternateContent xmlns:mc="http://schemas.openxmlformats.org/markup-compatibility/2006" xmlns:p14="http://schemas.microsoft.com/office/powerpoint/2010/main">
+    <mc:Choice Requires="p14">
+      <p:transition p14:dur="300">
+        <p:fade/>
+      </p:transition>
+    </mc:Choice>
+    <mc:Fallback xmlns="">
+      <p:transition>
+        <p:fade/>
+      </p:transition>
+    </mc:Fallback>
+  </mc:AlternateContent>
+</p:sld>
+</file>
+
+<file path=ppt/slides/slide16.xml><?xml version="1.0" encoding="utf-8"?>
+<p:sld xmlns:a="http://schemas.openxmlformats.org/drawingml/2006/main" xmlns:r="http://schemas.openxmlformats.org/officeDocument/2006/relationships" xmlns:p="http://schemas.openxmlformats.org/presentationml/2006/main">
+  <p:cSld>
+    <p:spTree>
+      <p:nvGrpSpPr>
+        <p:cNvPr id="1" name=""/>
+        <p:cNvGrpSpPr/>
+        <p:nvPr/>
+      </p:nvGrpSpPr>
+      <p:grpSpPr>
+        <a:xfrm>
+          <a:off x="0" y="0"/>
+          <a:ext cx="0" cy="0"/>
+          <a:chOff x="0" y="0"/>
+          <a:chExt cx="0" cy="0"/>
+        </a:xfrm>
+      </p:grpSpPr>
+      <p:sp>
+        <p:nvSpPr>
+          <p:cNvPr id="2" name="Title 1">
+            <a:extLst>
+              <a:ext uri="{FF2B5EF4-FFF2-40B4-BE49-F238E27FC236}">
+                <a16:creationId xmlns:a16="http://schemas.microsoft.com/office/drawing/2014/main" id="{8EEF9218-B50A-424A-A99D-57BA08F4A8E3}"/>
+              </a:ext>
+            </a:extLst>
+          </p:cNvPr>
+          <p:cNvSpPr>
+            <a:spLocks noGrp="1"/>
+          </p:cNvSpPr>
+          <p:nvPr>
+            <p:ph type="title"/>
+          </p:nvPr>
+        </p:nvSpPr>
+        <p:spPr/>
+        <p:txBody>
+          <a:bodyPr/>
+          <a:lstStyle/>
+          <a:p>
+            <a:endParaRPr lang="en-GB" dirty="0"/>
+          </a:p>
+        </p:txBody>
+      </p:sp>
+      <p:sp>
+        <p:nvSpPr>
+          <p:cNvPr id="4" name="TextBox 3">
+            <a:extLst>
+              <a:ext uri="{FF2B5EF4-FFF2-40B4-BE49-F238E27FC236}">
+                <a16:creationId xmlns:a16="http://schemas.microsoft.com/office/drawing/2014/main" id="{31426854-EE0B-4A5A-AC6D-2BF50C4B1D90}"/>
+              </a:ext>
+            </a:extLst>
+          </p:cNvPr>
+          <p:cNvSpPr txBox="1"/>
+          <p:nvPr/>
+        </p:nvSpPr>
+        <p:spPr>
+          <a:xfrm>
+            <a:off x="2052408" y="3136612"/>
+            <a:ext cx="8087183" cy="584775"/>
+          </a:xfrm>
+          <a:prstGeom prst="rect">
+            <a:avLst/>
+          </a:prstGeom>
+          <a:noFill/>
+        </p:spPr>
+        <p:txBody>
+          <a:bodyPr wrap="square" rtlCol="0">
+            <a:spAutoFit/>
+          </a:bodyPr>
+          <a:lstStyle/>
+          <a:p>
+            <a:pPr algn="ctr"/>
+            <a:r>
+              <a:rPr lang="en-GB" sz="3200" dirty="0"/>
+              <a:t>Advanced image reading (</a:t>
+            </a:r>
+            <a:r>
+              <a:rPr lang="en-GB" sz="3200" dirty="0" err="1"/>
+              <a:t>Bioformats</a:t>
+            </a:r>
+            <a:r>
+              <a:rPr lang="en-GB" sz="3200" dirty="0"/>
+              <a:t>)</a:t>
+            </a:r>
+            <a:endParaRPr lang="en-GB" sz="2800" dirty="0">
+              <a:solidFill>
+                <a:schemeClr val="tx1"/>
+              </a:solidFill>
+            </a:endParaRPr>
+          </a:p>
+        </p:txBody>
+      </p:sp>
+    </p:spTree>
+    <p:extLst>
+      <p:ext uri="{BB962C8B-B14F-4D97-AF65-F5344CB8AC3E}">
+        <p14:creationId xmlns:p14="http://schemas.microsoft.com/office/powerpoint/2010/main" val="3361938738"/>
+      </p:ext>
+    </p:extLst>
+  </p:cSld>
+  <p:clrMapOvr>
+    <a:masterClrMapping/>
+  </p:clrMapOvr>
+  <mc:AlternateContent xmlns:mc="http://schemas.openxmlformats.org/markup-compatibility/2006" xmlns:p14="http://schemas.microsoft.com/office/powerpoint/2010/main">
+    <mc:Choice Requires="p14">
+      <p:transition p14:dur="300">
+        <p:fade/>
+      </p:transition>
+    </mc:Choice>
+    <mc:Fallback xmlns="">
+      <p:transition>
+        <p:fade/>
+      </p:transition>
+    </mc:Fallback>
+  </mc:AlternateContent>
+</p:sld>
+</file>
+
+<file path=ppt/slides/slide17.xml><?xml version="1.0" encoding="utf-8"?>
+<p:sld xmlns:a="http://schemas.openxmlformats.org/drawingml/2006/main" xmlns:r="http://schemas.openxmlformats.org/officeDocument/2006/relationships" xmlns:p="http://schemas.openxmlformats.org/presentationml/2006/main">
+  <p:cSld>
+    <p:spTree>
+      <p:nvGrpSpPr>
+        <p:cNvPr id="1" name=""/>
+        <p:cNvGrpSpPr/>
+        <p:nvPr/>
+      </p:nvGrpSpPr>
+      <p:grpSpPr>
+        <a:xfrm>
+          <a:off x="0" y="0"/>
+          <a:ext cx="0" cy="0"/>
+          <a:chOff x="0" y="0"/>
+          <a:chExt cx="0" cy="0"/>
+        </a:xfrm>
+      </p:grpSpPr>
+      <p:sp>
+        <p:nvSpPr>
+          <p:cNvPr id="2" name="Title 1">
+            <a:extLst>
+              <a:ext uri="{FF2B5EF4-FFF2-40B4-BE49-F238E27FC236}">
+                <a16:creationId xmlns:a16="http://schemas.microsoft.com/office/drawing/2014/main" id="{297C1240-D4CE-4AD2-96B1-DBD7075D8052}"/>
+              </a:ext>
+            </a:extLst>
+          </p:cNvPr>
+          <p:cNvSpPr>
+            <a:spLocks noGrp="1"/>
+          </p:cNvSpPr>
+          <p:nvPr>
+            <p:ph type="title"/>
+          </p:nvPr>
+        </p:nvSpPr>
+        <p:spPr/>
+        <p:txBody>
+          <a:bodyPr/>
+          <a:lstStyle/>
+          <a:p>
+            <a:endParaRPr lang="en-GB"/>
+          </a:p>
+        </p:txBody>
+      </p:sp>
+      <p:sp>
+        <p:nvSpPr>
+          <p:cNvPr id="3" name="Content Placeholder 2">
+            <a:extLst>
+              <a:ext uri="{FF2B5EF4-FFF2-40B4-BE49-F238E27FC236}">
+                <a16:creationId xmlns:a16="http://schemas.microsoft.com/office/drawing/2014/main" id="{7E90A914-5E00-4AAB-802D-4C98FA2788C1}"/>
+              </a:ext>
+            </a:extLst>
+          </p:cNvPr>
+          <p:cNvSpPr>
+            <a:spLocks noGrp="1"/>
+          </p:cNvSpPr>
+          <p:nvPr>
+            <p:ph idx="1"/>
+          </p:nvPr>
+        </p:nvSpPr>
+        <p:spPr/>
+        <p:txBody>
+          <a:bodyPr/>
+          <a:lstStyle/>
+          <a:p>
+            <a:r>
+              <a:rPr lang="en-GB" sz="2400" dirty="0"/>
+              <a:t>[Maybe do this after OOP, as BF has OOP format]</a:t>
+            </a:r>
+          </a:p>
+          <a:p>
+            <a:r>
+              <a:rPr lang="en-GB" sz="2400" dirty="0"/>
+              <a:t>Quick intro to </a:t>
+            </a:r>
+            <a:r>
+              <a:rPr lang="en-GB" sz="2400" dirty="0" err="1"/>
+              <a:t>Bioformats</a:t>
+            </a:r>
+            <a:endParaRPr lang="en-GB" sz="2400" dirty="0"/>
+          </a:p>
+          <a:p>
+            <a:pPr lvl="1"/>
+            <a:r>
+              <a:rPr lang="en-GB" sz="2000" dirty="0"/>
+              <a:t>Example formats it can work with</a:t>
+            </a:r>
+          </a:p>
+          <a:p>
+            <a:pPr lvl="1"/>
+            <a:r>
+              <a:rPr lang="en-GB" sz="2000" dirty="0"/>
+              <a:t>Mention metadata (what sort of values it stores)</a:t>
+            </a:r>
+          </a:p>
+          <a:p>
+            <a:r>
+              <a:rPr lang="en-GB" sz="2400" dirty="0"/>
+              <a:t>Method of getting </a:t>
+            </a:r>
+            <a:r>
+              <a:rPr lang="en-GB" sz="2400" dirty="0" err="1"/>
+              <a:t>Bioformats</a:t>
+            </a:r>
+            <a:r>
+              <a:rPr lang="en-GB" sz="2400" dirty="0"/>
+              <a:t> to work</a:t>
+            </a:r>
+          </a:p>
+          <a:p>
+            <a:pPr lvl="1"/>
+            <a:r>
+              <a:rPr lang="en-GB" sz="2000" dirty="0"/>
+              <a:t>Where to download from</a:t>
+            </a:r>
+          </a:p>
+          <a:p>
+            <a:pPr lvl="2"/>
+            <a:r>
+              <a:rPr lang="en-GB" sz="1800" dirty="0"/>
+              <a:t>Provide link</a:t>
+            </a:r>
+          </a:p>
+          <a:p>
+            <a:pPr lvl="1"/>
+            <a:r>
+              <a:rPr lang="en-GB" sz="2000" dirty="0"/>
+              <a:t>Installation</a:t>
+            </a:r>
+          </a:p>
+          <a:p>
+            <a:pPr lvl="2"/>
+            <a:r>
+              <a:rPr lang="en-GB" sz="1800" dirty="0"/>
+              <a:t>Download, unzip, add to path</a:t>
+            </a:r>
+          </a:p>
+          <a:p>
+            <a:pPr lvl="1"/>
+            <a:r>
+              <a:rPr lang="en-GB" sz="2000" dirty="0"/>
+              <a:t>Running a basic LIF import</a:t>
+            </a:r>
+          </a:p>
+          <a:p>
+            <a:pPr lvl="1"/>
+            <a:r>
+              <a:rPr lang="en-GB" sz="2000" dirty="0"/>
+              <a:t>Dealing with multiple series</a:t>
+            </a:r>
+          </a:p>
+          <a:p>
+            <a:pPr lvl="1"/>
+            <a:r>
+              <a:rPr lang="en-GB" sz="2000" dirty="0"/>
+              <a:t>Dealing with metadata</a:t>
+            </a:r>
+          </a:p>
+          <a:p>
+            <a:pPr lvl="1"/>
+            <a:endParaRPr lang="en-GB" sz="2000" dirty="0"/>
+          </a:p>
+        </p:txBody>
+      </p:sp>
+    </p:spTree>
+    <p:extLst>
+      <p:ext uri="{BB962C8B-B14F-4D97-AF65-F5344CB8AC3E}">
+        <p14:creationId xmlns:p14="http://schemas.microsoft.com/office/powerpoint/2010/main" val="677120248"/>
+      </p:ext>
+    </p:extLst>
+  </p:cSld>
+  <p:clrMapOvr>
+    <a:masterClrMapping/>
+  </p:clrMapOvr>
+  <mc:AlternateContent xmlns:mc="http://schemas.openxmlformats.org/markup-compatibility/2006" xmlns:p14="http://schemas.microsoft.com/office/powerpoint/2010/main">
+    <mc:Choice Requires="p14">
+      <p:transition p14:dur="300">
+        <p:fade/>
+      </p:transition>
+    </mc:Choice>
+    <mc:Fallback xmlns="">
+      <p:transition>
+        <p:fade/>
+      </p:transition>
+    </mc:Fallback>
+  </mc:AlternateContent>
+</p:sld>
+</file>
+
+<file path=ppt/slides/slide18.xml><?xml version="1.0" encoding="utf-8"?>
+<p:sld xmlns:a="http://schemas.openxmlformats.org/drawingml/2006/main" xmlns:r="http://schemas.openxmlformats.org/officeDocument/2006/relationships" xmlns:p="http://schemas.openxmlformats.org/presentationml/2006/main">
+  <p:cSld>
+    <p:spTree>
+      <p:nvGrpSpPr>
+        <p:cNvPr id="1" name=""/>
+        <p:cNvGrpSpPr/>
+        <p:nvPr/>
+      </p:nvGrpSpPr>
+      <p:grpSpPr>
+        <a:xfrm>
+          <a:off x="0" y="0"/>
+          <a:ext cx="0" cy="0"/>
+          <a:chOff x="0" y="0"/>
+          <a:chExt cx="0" cy="0"/>
+        </a:xfrm>
+      </p:grpSpPr>
+      <p:sp>
+        <p:nvSpPr>
+          <p:cNvPr id="2" name="Title 1">
+            <a:extLst>
+              <a:ext uri="{FF2B5EF4-FFF2-40B4-BE49-F238E27FC236}">
                 <a16:creationId xmlns:a16="http://schemas.microsoft.com/office/drawing/2014/main" id="{8EEF9218-B50A-424A-A99D-57BA08F4A8E3}"/>
               </a:ext>
             </a:extLst>
@@ -2668,7 +4961,7 @@
 </p:sld>
 </file>
 
-<file path=ppt/slides/slide13.xml><?xml version="1.0" encoding="utf-8"?>
+<file path=ppt/slides/slide19.xml><?xml version="1.0" encoding="utf-8"?>
 <p:sld xmlns:a="http://schemas.openxmlformats.org/drawingml/2006/main" xmlns:r="http://schemas.openxmlformats.org/officeDocument/2006/relationships" xmlns:p="http://schemas.openxmlformats.org/presentationml/2006/main">
   <p:cSld>
     <p:spTree>
@@ -4353,7 +6646,14 @@
             <a:pPr lvl="1"/>
             <a:r>
               <a:rPr lang="en-GB" dirty="0"/>
-              <a:t>Regular grid of numbers in N dimensions</a:t>
+              <a:t>Arrays are a regular grid of numbers in N dimensions</a:t>
+            </a:r>
+          </a:p>
+          <a:p>
+            <a:pPr lvl="1"/>
+            <a:r>
+              <a:rPr lang="en-GB" dirty="0"/>
+              <a:t>Vectors are 1D arrays, matrices are 2D arrays</a:t>
             </a:r>
           </a:p>
           <a:p>
@@ -4392,7 +6692,7 @@
             </a:r>
             <a:r>
               <a:rPr lang="en-GB" dirty="0"/>
-              <a:t>Can’t store text</a:t>
+              <a:t>Can only store numeric values</a:t>
             </a:r>
           </a:p>
           <a:p>
@@ -4402,7 +6702,7 @@
           <a:p>
             <a:r>
               <a:rPr lang="en-GB" dirty="0"/>
-              <a:t>Alternatives</a:t>
+              <a:t>Alternatives for mixed data types</a:t>
             </a:r>
           </a:p>
           <a:p>
@@ -4416,7 +6716,7 @@
             <a:pPr lvl="1"/>
             <a:r>
               <a:rPr lang="en-GB" dirty="0"/>
-              <a:t>Structure arrays (“struct”)</a:t>
+              <a:t>Structure arrays (“structs”)</a:t>
             </a:r>
           </a:p>
           <a:p>
@@ -4522,12 +6822,136 @@
             <p:ph idx="1"/>
           </p:nvPr>
         </p:nvSpPr>
-        <p:spPr/>
+        <p:spPr>
+          <a:xfrm>
+            <a:off x="335360" y="1196754"/>
+            <a:ext cx="7608490" cy="4929411"/>
+          </a:xfrm>
+        </p:spPr>
         <p:txBody>
           <a:bodyPr/>
           <a:lstStyle/>
           <a:p>
-            <a:endParaRPr lang="en-GB" dirty="0"/>
+            <a:r>
+              <a:rPr lang="en-GB" dirty="0"/>
+              <a:t>Similar to arrays, but each element is a “cell”</a:t>
+            </a:r>
+          </a:p>
+          <a:p>
+            <a:pPr lvl="1"/>
+            <a:r>
+              <a:rPr lang="en-GB" dirty="0"/>
+              <a:t>Regular grid of cells</a:t>
+            </a:r>
+          </a:p>
+          <a:p>
+            <a:pPr lvl="1"/>
+            <a:r>
+              <a:rPr lang="en-GB" dirty="0"/>
+              <a:t>Can be N-dimensional</a:t>
+            </a:r>
+          </a:p>
+          <a:p>
+            <a:pPr lvl="1"/>
+            <a:r>
+              <a:rPr lang="en-GB" dirty="0"/>
+              <a:t>Can hold different data types in each cell</a:t>
+            </a:r>
+          </a:p>
+          <a:p>
+            <a:endParaRPr lang="en-GB" sz="1200" dirty="0"/>
+          </a:p>
+          <a:p>
+            <a:r>
+              <a:rPr lang="en-GB" dirty="0"/>
+              <a:t>A cell can hold any data type, for example</a:t>
+            </a:r>
+          </a:p>
+          <a:p>
+            <a:pPr lvl="1"/>
+            <a:r>
+              <a:rPr lang="en-GB" dirty="0"/>
+              <a:t>Single numeric values</a:t>
+            </a:r>
+          </a:p>
+          <a:p>
+            <a:pPr lvl="1"/>
+            <a:r>
+              <a:rPr lang="en-GB" dirty="0"/>
+              <a:t>Text</a:t>
+            </a:r>
+          </a:p>
+          <a:p>
+            <a:pPr lvl="1"/>
+            <a:r>
+              <a:rPr lang="en-GB" dirty="0"/>
+              <a:t>Numeric arrays and matrices</a:t>
+            </a:r>
+          </a:p>
+          <a:p>
+            <a:pPr lvl="1"/>
+            <a:r>
+              <a:rPr lang="en-GB" dirty="0"/>
+              <a:t>Even another cell array!</a:t>
+            </a:r>
+          </a:p>
+          <a:p>
+            <a:pPr lvl="1"/>
+            <a:endParaRPr lang="en-GB" sz="1200" dirty="0"/>
+          </a:p>
+        </p:txBody>
+      </p:sp>
+      <p:sp>
+        <p:nvSpPr>
+          <p:cNvPr id="52" name="Rectangle 51">
+            <a:extLst>
+              <a:ext uri="{FF2B5EF4-FFF2-40B4-BE49-F238E27FC236}">
+                <a16:creationId xmlns:a16="http://schemas.microsoft.com/office/drawing/2014/main" id="{81EE5999-3AFA-4C93-AC50-F0ED95333EAE}"/>
+              </a:ext>
+            </a:extLst>
+          </p:cNvPr>
+          <p:cNvSpPr/>
+          <p:nvPr/>
+        </p:nvSpPr>
+        <p:spPr>
+          <a:xfrm>
+            <a:off x="335360" y="3133725"/>
+            <a:ext cx="7382512" cy="2992441"/>
+          </a:xfrm>
+          <a:prstGeom prst="rect">
+            <a:avLst/>
+          </a:prstGeom>
+          <a:solidFill>
+            <a:srgbClr val="FFFFFF">
+              <a:alpha val="89804"/>
+            </a:srgbClr>
+          </a:solidFill>
+          <a:ln>
+            <a:noFill/>
+          </a:ln>
+        </p:spPr>
+        <p:style>
+          <a:lnRef idx="2">
+            <a:schemeClr val="accent1">
+              <a:shade val="50000"/>
+            </a:schemeClr>
+          </a:lnRef>
+          <a:fillRef idx="1">
+            <a:schemeClr val="accent1"/>
+          </a:fillRef>
+          <a:effectRef idx="0">
+            <a:schemeClr val="accent1"/>
+          </a:effectRef>
+          <a:fontRef idx="minor">
+            <a:schemeClr val="lt1"/>
+          </a:fontRef>
+        </p:style>
+        <p:txBody>
+          <a:bodyPr rtlCol="0" anchor="ctr"/>
+          <a:lstStyle/>
+          <a:p>
+            <a:pPr algn="ctr"/>
+            <a:endParaRPr lang="en-GB"/>
           </a:p>
         </p:txBody>
       </p:sp>
@@ -4578,7 +7002,7 @@
           <p:cNvPr id="2" name="Title 1">
             <a:extLst>
               <a:ext uri="{FF2B5EF4-FFF2-40B4-BE49-F238E27FC236}">
-                <a16:creationId xmlns:a16="http://schemas.microsoft.com/office/drawing/2014/main" id="{D0D85ECA-B5C8-49EC-818A-B21ADF7B7361}"/>
+                <a16:creationId xmlns:a16="http://schemas.microsoft.com/office/drawing/2014/main" id="{FB0D9636-2B3A-4E3D-9B13-904FF3CE8CE3}"/>
               </a:ext>
             </a:extLst>
           </p:cNvPr>
@@ -4594,7 +7018,10 @@
           <a:bodyPr/>
           <a:lstStyle/>
           <a:p>
-            <a:endParaRPr lang="en-GB" dirty="0"/>
+            <a:r>
+              <a:rPr lang="en-GB" dirty="0"/>
+              <a:t>Cell arrays</a:t>
+            </a:r>
           </a:p>
         </p:txBody>
       </p:sp>
@@ -4603,7 +7030,7 @@
           <p:cNvPr id="3" name="Content Placeholder 2">
             <a:extLst>
               <a:ext uri="{FF2B5EF4-FFF2-40B4-BE49-F238E27FC236}">
-                <a16:creationId xmlns:a16="http://schemas.microsoft.com/office/drawing/2014/main" id="{24EE01E8-E11D-4130-9055-D854AF20B51C}"/>
+                <a16:creationId xmlns:a16="http://schemas.microsoft.com/office/drawing/2014/main" id="{DFE43EAF-8F5E-44D2-BF28-45DAFCB5DD96}"/>
               </a:ext>
             </a:extLst>
           </p:cNvPr>
@@ -4614,112 +7041,455 @@
             <p:ph idx="1"/>
           </p:nvPr>
         </p:nvSpPr>
-        <p:spPr/>
+        <p:spPr>
+          <a:xfrm>
+            <a:off x="335360" y="1196754"/>
+            <a:ext cx="7608490" cy="4929411"/>
+          </a:xfrm>
+        </p:spPr>
         <p:txBody>
           <a:bodyPr/>
           <a:lstStyle/>
           <a:p>
             <a:r>
-              <a:rPr lang="en-GB" sz="2000" dirty="0"/>
-              <a:t>Cell arrays</a:t>
-            </a:r>
-          </a:p>
-          <a:p>
-            <a:pPr lvl="1"/>
-            <a:r>
-              <a:rPr lang="en-GB" sz="1800" dirty="0"/>
-              <a:t>[Is there actually any need to cover these? Maybe just a quick mention]</a:t>
-            </a:r>
-          </a:p>
-          <a:p>
-            <a:pPr lvl="1"/>
-            <a:r>
-              <a:rPr lang="en-GB" sz="1800" dirty="0"/>
-              <a:t>Creating cell arrays</a:t>
-            </a:r>
-          </a:p>
-          <a:p>
-            <a:pPr lvl="1"/>
-            <a:r>
-              <a:rPr lang="en-GB" sz="1800" dirty="0"/>
-              <a:t>Each cell can contain data of a different type (e.g. text and numeric)</a:t>
-            </a:r>
-          </a:p>
-          <a:p>
-            <a:pPr lvl="2"/>
-            <a:r>
-              <a:rPr lang="en-GB" sz="1400" dirty="0"/>
-              <a:t>[Have these effectively been superseded by tables?]</a:t>
-            </a:r>
-            <a:endParaRPr lang="en-GB" sz="1800" dirty="0"/>
-          </a:p>
-          <a:p>
-            <a:r>
-              <a:rPr lang="en-GB" sz="2000" dirty="0"/>
-              <a:t>Structure arrays</a:t>
-            </a:r>
-          </a:p>
-          <a:p>
-            <a:pPr lvl="1"/>
-            <a:r>
-              <a:rPr lang="en-GB" sz="1800" dirty="0"/>
-              <a:t>Store variables in a structure by field names</a:t>
-            </a:r>
-          </a:p>
-          <a:p>
-            <a:pPr lvl="1"/>
-            <a:r>
-              <a:rPr lang="en-GB" sz="1800" dirty="0"/>
-              <a:t>Good for grouping data [what else are they good for?]</a:t>
-            </a:r>
-          </a:p>
-          <a:p>
-            <a:pPr lvl="1"/>
-            <a:r>
-              <a:rPr lang="en-GB" sz="1800" dirty="0"/>
-              <a:t>Creating structure arrays</a:t>
-            </a:r>
-          </a:p>
-          <a:p>
-            <a:pPr lvl="1"/>
-            <a:r>
-              <a:rPr lang="en-GB" sz="1800" dirty="0"/>
-              <a:t>Accessing data in structure arrays</a:t>
-            </a:r>
-          </a:p>
-          <a:p>
-            <a:r>
-              <a:rPr lang="en-GB" sz="2000" dirty="0"/>
-              <a:t>Tables</a:t>
-            </a:r>
-          </a:p>
-          <a:p>
-            <a:pPr lvl="1"/>
-            <a:r>
-              <a:rPr lang="en-GB" sz="1800" dirty="0"/>
-              <a:t>[When were they introduced?]</a:t>
-            </a:r>
-          </a:p>
-          <a:p>
-            <a:pPr lvl="1"/>
-            <a:r>
-              <a:rPr lang="en-GB" sz="1800" dirty="0"/>
-              <a:t>[What are the benefits?]</a:t>
-            </a:r>
-          </a:p>
-          <a:p>
-            <a:pPr lvl="1"/>
-            <a:r>
-              <a:rPr lang="en-GB" sz="1800" dirty="0"/>
-              <a:t>[Loading data directly from file into a table]</a:t>
-            </a:r>
+              <a:rPr lang="en-GB" dirty="0"/>
+              <a:t>Similar to arrays, but each element is a “cell”</a:t>
+            </a:r>
+          </a:p>
+          <a:p>
+            <a:pPr lvl="1"/>
+            <a:r>
+              <a:rPr lang="en-GB" dirty="0"/>
+              <a:t>Regular grid of cells</a:t>
+            </a:r>
+          </a:p>
+          <a:p>
+            <a:pPr lvl="1"/>
+            <a:r>
+              <a:rPr lang="en-GB" dirty="0"/>
+              <a:t>Can be N-dimensional</a:t>
+            </a:r>
+          </a:p>
+          <a:p>
+            <a:pPr lvl="1"/>
+            <a:r>
+              <a:rPr lang="en-GB" dirty="0"/>
+              <a:t>Can hold different data types in each cell</a:t>
+            </a:r>
+          </a:p>
+          <a:p>
+            <a:endParaRPr lang="en-GB" sz="1200" dirty="0"/>
+          </a:p>
+          <a:p>
+            <a:r>
+              <a:rPr lang="en-GB" dirty="0"/>
+              <a:t>A cell can hold any data type, for example</a:t>
+            </a:r>
+          </a:p>
+          <a:p>
+            <a:pPr lvl="1"/>
+            <a:r>
+              <a:rPr lang="en-GB" dirty="0"/>
+              <a:t>Single numeric values</a:t>
+            </a:r>
+          </a:p>
+          <a:p>
+            <a:pPr lvl="1"/>
+            <a:r>
+              <a:rPr lang="en-GB" dirty="0"/>
+              <a:t>Text</a:t>
+            </a:r>
+          </a:p>
+          <a:p>
+            <a:pPr lvl="1"/>
+            <a:r>
+              <a:rPr lang="en-GB" dirty="0"/>
+              <a:t>Numeric arrays and matrices</a:t>
+            </a:r>
+          </a:p>
+          <a:p>
+            <a:pPr lvl="1"/>
+            <a:r>
+              <a:rPr lang="en-GB" dirty="0"/>
+              <a:t>Even another cell array!</a:t>
+            </a:r>
+          </a:p>
+          <a:p>
+            <a:pPr lvl="1"/>
+            <a:endParaRPr lang="en-GB" sz="1200" dirty="0"/>
+          </a:p>
+        </p:txBody>
+      </p:sp>
+      <p:sp>
+        <p:nvSpPr>
+          <p:cNvPr id="12" name="Rectangle: Rounded Corners 11">
+            <a:extLst>
+              <a:ext uri="{FF2B5EF4-FFF2-40B4-BE49-F238E27FC236}">
+                <a16:creationId xmlns:a16="http://schemas.microsoft.com/office/drawing/2014/main" id="{7E9F1019-0F65-4875-8ED9-1A5F9A63DD55}"/>
+              </a:ext>
+            </a:extLst>
+          </p:cNvPr>
+          <p:cNvSpPr/>
+          <p:nvPr/>
+        </p:nvSpPr>
+        <p:spPr>
+          <a:xfrm>
+            <a:off x="9082877" y="1660664"/>
+            <a:ext cx="1257929" cy="1257929"/>
+          </a:xfrm>
+          <a:prstGeom prst="roundRect">
+            <a:avLst/>
+          </a:prstGeom>
+          <a:noFill/>
+          <a:ln w="15240">
+            <a:solidFill>
+              <a:schemeClr val="tx1"/>
+            </a:solidFill>
+          </a:ln>
+        </p:spPr>
+        <p:style>
+          <a:lnRef idx="2">
+            <a:schemeClr val="accent1">
+              <a:shade val="50000"/>
+            </a:schemeClr>
+          </a:lnRef>
+          <a:fillRef idx="1">
+            <a:schemeClr val="accent1"/>
+          </a:fillRef>
+          <a:effectRef idx="0">
+            <a:schemeClr val="accent1"/>
+          </a:effectRef>
+          <a:fontRef idx="minor">
+            <a:schemeClr val="lt1"/>
+          </a:fontRef>
+        </p:style>
+        <p:txBody>
+          <a:bodyPr rtlCol="0" anchor="ctr"/>
+          <a:lstStyle/>
+          <a:p>
+            <a:pPr algn="ctr"/>
+            <a:endParaRPr lang="en-GB"/>
+          </a:p>
+        </p:txBody>
+      </p:sp>
+      <p:sp>
+        <p:nvSpPr>
+          <p:cNvPr id="23" name="Rectangle: Rounded Corners 22">
+            <a:extLst>
+              <a:ext uri="{FF2B5EF4-FFF2-40B4-BE49-F238E27FC236}">
+                <a16:creationId xmlns:a16="http://schemas.microsoft.com/office/drawing/2014/main" id="{F1169B2A-233E-4D7E-9739-72BD24B41066}"/>
+              </a:ext>
+            </a:extLst>
+          </p:cNvPr>
+          <p:cNvSpPr/>
+          <p:nvPr/>
+        </p:nvSpPr>
+        <p:spPr>
+          <a:xfrm>
+            <a:off x="9082877" y="2969864"/>
+            <a:ext cx="1257929" cy="1257929"/>
+          </a:xfrm>
+          <a:prstGeom prst="roundRect">
+            <a:avLst/>
+          </a:prstGeom>
+          <a:noFill/>
+          <a:ln w="15240">
+            <a:solidFill>
+              <a:schemeClr val="tx1"/>
+            </a:solidFill>
+          </a:ln>
+        </p:spPr>
+        <p:style>
+          <a:lnRef idx="2">
+            <a:schemeClr val="accent1">
+              <a:shade val="50000"/>
+            </a:schemeClr>
+          </a:lnRef>
+          <a:fillRef idx="1">
+            <a:schemeClr val="accent1"/>
+          </a:fillRef>
+          <a:effectRef idx="0">
+            <a:schemeClr val="accent1"/>
+          </a:effectRef>
+          <a:fontRef idx="minor">
+            <a:schemeClr val="lt1"/>
+          </a:fontRef>
+        </p:style>
+        <p:txBody>
+          <a:bodyPr rtlCol="0" anchor="ctr"/>
+          <a:lstStyle/>
+          <a:p>
+            <a:pPr algn="ctr"/>
+            <a:endParaRPr lang="en-GB"/>
+          </a:p>
+        </p:txBody>
+      </p:sp>
+      <p:sp>
+        <p:nvSpPr>
+          <p:cNvPr id="27" name="Rectangle: Rounded Corners 26">
+            <a:extLst>
+              <a:ext uri="{FF2B5EF4-FFF2-40B4-BE49-F238E27FC236}">
+                <a16:creationId xmlns:a16="http://schemas.microsoft.com/office/drawing/2014/main" id="{29527B9A-D721-454E-87E9-F623347D7BEA}"/>
+              </a:ext>
+            </a:extLst>
+          </p:cNvPr>
+          <p:cNvSpPr/>
+          <p:nvPr/>
+        </p:nvSpPr>
+        <p:spPr>
+          <a:xfrm>
+            <a:off x="9082877" y="4278820"/>
+            <a:ext cx="1257929" cy="1257929"/>
+          </a:xfrm>
+          <a:prstGeom prst="roundRect">
+            <a:avLst/>
+          </a:prstGeom>
+          <a:noFill/>
+          <a:ln w="15240">
+            <a:solidFill>
+              <a:schemeClr val="tx1"/>
+            </a:solidFill>
+          </a:ln>
+        </p:spPr>
+        <p:style>
+          <a:lnRef idx="2">
+            <a:schemeClr val="accent1">
+              <a:shade val="50000"/>
+            </a:schemeClr>
+          </a:lnRef>
+          <a:fillRef idx="1">
+            <a:schemeClr val="accent1"/>
+          </a:fillRef>
+          <a:effectRef idx="0">
+            <a:schemeClr val="accent1"/>
+          </a:effectRef>
+          <a:fontRef idx="minor">
+            <a:schemeClr val="lt1"/>
+          </a:fontRef>
+        </p:style>
+        <p:txBody>
+          <a:bodyPr rtlCol="0" anchor="ctr"/>
+          <a:lstStyle/>
+          <a:p>
+            <a:pPr algn="ctr"/>
+            <a:endParaRPr lang="en-GB"/>
+          </a:p>
+        </p:txBody>
+      </p:sp>
+      <p:sp>
+        <p:nvSpPr>
+          <p:cNvPr id="33" name="Rectangle: Rounded Corners 32">
+            <a:extLst>
+              <a:ext uri="{FF2B5EF4-FFF2-40B4-BE49-F238E27FC236}">
+                <a16:creationId xmlns:a16="http://schemas.microsoft.com/office/drawing/2014/main" id="{3AF4BA7E-2227-414E-87FE-33656D160CD4}"/>
+              </a:ext>
+            </a:extLst>
+          </p:cNvPr>
+          <p:cNvSpPr/>
+          <p:nvPr/>
+        </p:nvSpPr>
+        <p:spPr>
+          <a:xfrm>
+            <a:off x="10391145" y="1660664"/>
+            <a:ext cx="1257929" cy="1257929"/>
+          </a:xfrm>
+          <a:prstGeom prst="roundRect">
+            <a:avLst/>
+          </a:prstGeom>
+          <a:noFill/>
+          <a:ln w="15240">
+            <a:solidFill>
+              <a:schemeClr val="tx1"/>
+            </a:solidFill>
+          </a:ln>
+        </p:spPr>
+        <p:style>
+          <a:lnRef idx="2">
+            <a:schemeClr val="accent1">
+              <a:shade val="50000"/>
+            </a:schemeClr>
+          </a:lnRef>
+          <a:fillRef idx="1">
+            <a:schemeClr val="accent1"/>
+          </a:fillRef>
+          <a:effectRef idx="0">
+            <a:schemeClr val="accent1"/>
+          </a:effectRef>
+          <a:fontRef idx="minor">
+            <a:schemeClr val="lt1"/>
+          </a:fontRef>
+        </p:style>
+        <p:txBody>
+          <a:bodyPr rtlCol="0" anchor="ctr"/>
+          <a:lstStyle/>
+          <a:p>
+            <a:pPr algn="ctr"/>
+            <a:endParaRPr lang="en-GB"/>
+          </a:p>
+        </p:txBody>
+      </p:sp>
+      <p:sp>
+        <p:nvSpPr>
+          <p:cNvPr id="34" name="Rectangle: Rounded Corners 33">
+            <a:extLst>
+              <a:ext uri="{FF2B5EF4-FFF2-40B4-BE49-F238E27FC236}">
+                <a16:creationId xmlns:a16="http://schemas.microsoft.com/office/drawing/2014/main" id="{94C9D241-0E11-4BB3-8AE7-C4684710EFA7}"/>
+              </a:ext>
+            </a:extLst>
+          </p:cNvPr>
+          <p:cNvSpPr/>
+          <p:nvPr/>
+        </p:nvSpPr>
+        <p:spPr>
+          <a:xfrm>
+            <a:off x="10391145" y="2969864"/>
+            <a:ext cx="1257929" cy="1257929"/>
+          </a:xfrm>
+          <a:prstGeom prst="roundRect">
+            <a:avLst/>
+          </a:prstGeom>
+          <a:noFill/>
+          <a:ln w="15240">
+            <a:solidFill>
+              <a:schemeClr val="tx1"/>
+            </a:solidFill>
+          </a:ln>
+        </p:spPr>
+        <p:style>
+          <a:lnRef idx="2">
+            <a:schemeClr val="accent1">
+              <a:shade val="50000"/>
+            </a:schemeClr>
+          </a:lnRef>
+          <a:fillRef idx="1">
+            <a:schemeClr val="accent1"/>
+          </a:fillRef>
+          <a:effectRef idx="0">
+            <a:schemeClr val="accent1"/>
+          </a:effectRef>
+          <a:fontRef idx="minor">
+            <a:schemeClr val="lt1"/>
+          </a:fontRef>
+        </p:style>
+        <p:txBody>
+          <a:bodyPr rtlCol="0" anchor="ctr"/>
+          <a:lstStyle/>
+          <a:p>
+            <a:pPr algn="ctr"/>
+            <a:endParaRPr lang="en-GB"/>
+          </a:p>
+        </p:txBody>
+      </p:sp>
+      <p:sp>
+        <p:nvSpPr>
+          <p:cNvPr id="35" name="Rectangle: Rounded Corners 34">
+            <a:extLst>
+              <a:ext uri="{FF2B5EF4-FFF2-40B4-BE49-F238E27FC236}">
+                <a16:creationId xmlns:a16="http://schemas.microsoft.com/office/drawing/2014/main" id="{2BF487D2-0EAF-458A-8F60-478369AE7C72}"/>
+              </a:ext>
+            </a:extLst>
+          </p:cNvPr>
+          <p:cNvSpPr/>
+          <p:nvPr/>
+        </p:nvSpPr>
+        <p:spPr>
+          <a:xfrm>
+            <a:off x="10391145" y="4278820"/>
+            <a:ext cx="1257929" cy="1257929"/>
+          </a:xfrm>
+          <a:prstGeom prst="roundRect">
+            <a:avLst/>
+          </a:prstGeom>
+          <a:noFill/>
+          <a:ln w="15240">
+            <a:solidFill>
+              <a:schemeClr val="tx1"/>
+            </a:solidFill>
+          </a:ln>
+        </p:spPr>
+        <p:style>
+          <a:lnRef idx="2">
+            <a:schemeClr val="accent1">
+              <a:shade val="50000"/>
+            </a:schemeClr>
+          </a:lnRef>
+          <a:fillRef idx="1">
+            <a:schemeClr val="accent1"/>
+          </a:fillRef>
+          <a:effectRef idx="0">
+            <a:schemeClr val="accent1"/>
+          </a:effectRef>
+          <a:fontRef idx="minor">
+            <a:schemeClr val="lt1"/>
+          </a:fontRef>
+        </p:style>
+        <p:txBody>
+          <a:bodyPr rtlCol="0" anchor="ctr"/>
+          <a:lstStyle/>
+          <a:p>
+            <a:pPr algn="ctr"/>
+            <a:endParaRPr lang="en-GB"/>
+          </a:p>
+        </p:txBody>
+      </p:sp>
+      <p:sp>
+        <p:nvSpPr>
+          <p:cNvPr id="52" name="Rectangle 51">
+            <a:extLst>
+              <a:ext uri="{FF2B5EF4-FFF2-40B4-BE49-F238E27FC236}">
+                <a16:creationId xmlns:a16="http://schemas.microsoft.com/office/drawing/2014/main" id="{81EE5999-3AFA-4C93-AC50-F0ED95333EAE}"/>
+              </a:ext>
+            </a:extLst>
+          </p:cNvPr>
+          <p:cNvSpPr/>
+          <p:nvPr/>
+        </p:nvSpPr>
+        <p:spPr>
+          <a:xfrm>
+            <a:off x="335360" y="3686175"/>
+            <a:ext cx="7382512" cy="2439990"/>
+          </a:xfrm>
+          <a:prstGeom prst="rect">
+            <a:avLst/>
+          </a:prstGeom>
+          <a:solidFill>
+            <a:srgbClr val="FFFFFF">
+              <a:alpha val="89804"/>
+            </a:srgbClr>
+          </a:solidFill>
+          <a:ln>
+            <a:noFill/>
+          </a:ln>
+        </p:spPr>
+        <p:style>
+          <a:lnRef idx="2">
+            <a:schemeClr val="accent1">
+              <a:shade val="50000"/>
+            </a:schemeClr>
+          </a:lnRef>
+          <a:fillRef idx="1">
+            <a:schemeClr val="accent1"/>
+          </a:fillRef>
+          <a:effectRef idx="0">
+            <a:schemeClr val="accent1"/>
+          </a:effectRef>
+          <a:fontRef idx="minor">
+            <a:schemeClr val="lt1"/>
+          </a:fontRef>
+        </p:style>
+        <p:txBody>
+          <a:bodyPr rtlCol="0" anchor="ctr"/>
+          <a:lstStyle/>
+          <a:p>
+            <a:pPr algn="ctr"/>
+            <a:endParaRPr lang="en-GB"/>
           </a:p>
         </p:txBody>
       </p:sp>
     </p:spTree>
     <p:extLst>
       <p:ext uri="{BB962C8B-B14F-4D97-AF65-F5344CB8AC3E}">
-        <p14:creationId xmlns:p14="http://schemas.microsoft.com/office/powerpoint/2010/main" val="3962622575"/>
+        <p14:creationId xmlns:p14="http://schemas.microsoft.com/office/powerpoint/2010/main" val="1511559818"/>
       </p:ext>
     </p:extLst>
   </p:cSld>
@@ -4763,7 +7533,7 @@
           <p:cNvPr id="2" name="Title 1">
             <a:extLst>
               <a:ext uri="{FF2B5EF4-FFF2-40B4-BE49-F238E27FC236}">
-                <a16:creationId xmlns:a16="http://schemas.microsoft.com/office/drawing/2014/main" id="{8EEF9218-B50A-424A-A99D-57BA08F4A8E3}"/>
+                <a16:creationId xmlns:a16="http://schemas.microsoft.com/office/drawing/2014/main" id="{FB0D9636-2B3A-4E3D-9B13-904FF3CE8CE3}"/>
               </a:ext>
             </a:extLst>
           </p:cNvPr>
@@ -4779,16 +7549,426 @@
           <a:bodyPr/>
           <a:lstStyle/>
           <a:p>
-            <a:endParaRPr lang="en-GB" dirty="0"/>
-          </a:p>
-        </p:txBody>
-      </p:sp>
-      <p:sp>
-        <p:nvSpPr>
-          <p:cNvPr id="4" name="TextBox 3">
+            <a:r>
+              <a:rPr lang="en-GB" dirty="0"/>
+              <a:t>Cell arrays</a:t>
+            </a:r>
+          </a:p>
+        </p:txBody>
+      </p:sp>
+      <p:sp>
+        <p:nvSpPr>
+          <p:cNvPr id="3" name="Content Placeholder 2">
             <a:extLst>
               <a:ext uri="{FF2B5EF4-FFF2-40B4-BE49-F238E27FC236}">
-                <a16:creationId xmlns:a16="http://schemas.microsoft.com/office/drawing/2014/main" id="{31426854-EE0B-4A5A-AC6D-2BF50C4B1D90}"/>
+                <a16:creationId xmlns:a16="http://schemas.microsoft.com/office/drawing/2014/main" id="{DFE43EAF-8F5E-44D2-BF28-45DAFCB5DD96}"/>
+              </a:ext>
+            </a:extLst>
+          </p:cNvPr>
+          <p:cNvSpPr>
+            <a:spLocks noGrp="1"/>
+          </p:cNvSpPr>
+          <p:nvPr>
+            <p:ph idx="1"/>
+          </p:nvPr>
+        </p:nvSpPr>
+        <p:spPr>
+          <a:xfrm>
+            <a:off x="335360" y="1196754"/>
+            <a:ext cx="7608490" cy="4929411"/>
+          </a:xfrm>
+        </p:spPr>
+        <p:txBody>
+          <a:bodyPr/>
+          <a:lstStyle/>
+          <a:p>
+            <a:r>
+              <a:rPr lang="en-GB" dirty="0"/>
+              <a:t>Similar to arrays, but each element is a “cell”</a:t>
+            </a:r>
+          </a:p>
+          <a:p>
+            <a:pPr lvl="1"/>
+            <a:r>
+              <a:rPr lang="en-GB" dirty="0"/>
+              <a:t>Regular grid of cells</a:t>
+            </a:r>
+          </a:p>
+          <a:p>
+            <a:pPr lvl="1"/>
+            <a:r>
+              <a:rPr lang="en-GB" dirty="0"/>
+              <a:t>Can be N-dimensional</a:t>
+            </a:r>
+          </a:p>
+          <a:p>
+            <a:pPr lvl="1"/>
+            <a:r>
+              <a:rPr lang="en-GB" dirty="0"/>
+              <a:t>Can hold different data types in each cell</a:t>
+            </a:r>
+          </a:p>
+          <a:p>
+            <a:endParaRPr lang="en-GB" sz="1200" dirty="0"/>
+          </a:p>
+          <a:p>
+            <a:r>
+              <a:rPr lang="en-GB" dirty="0"/>
+              <a:t>A cell can hold any data type, for example</a:t>
+            </a:r>
+          </a:p>
+          <a:p>
+            <a:pPr lvl="1"/>
+            <a:r>
+              <a:rPr lang="en-GB" dirty="0"/>
+              <a:t>Single numeric values</a:t>
+            </a:r>
+          </a:p>
+          <a:p>
+            <a:pPr lvl="1"/>
+            <a:r>
+              <a:rPr lang="en-GB" dirty="0"/>
+              <a:t>Text</a:t>
+            </a:r>
+          </a:p>
+          <a:p>
+            <a:pPr lvl="1"/>
+            <a:r>
+              <a:rPr lang="en-GB" dirty="0"/>
+              <a:t>Numeric arrays and matrices</a:t>
+            </a:r>
+          </a:p>
+          <a:p>
+            <a:pPr lvl="1"/>
+            <a:r>
+              <a:rPr lang="en-GB" dirty="0"/>
+              <a:t>Even another cell array!</a:t>
+            </a:r>
+          </a:p>
+          <a:p>
+            <a:pPr lvl="1"/>
+            <a:endParaRPr lang="en-GB" sz="1200" dirty="0"/>
+          </a:p>
+        </p:txBody>
+      </p:sp>
+      <p:sp>
+        <p:nvSpPr>
+          <p:cNvPr id="12" name="Rectangle: Rounded Corners 11">
+            <a:extLst>
+              <a:ext uri="{FF2B5EF4-FFF2-40B4-BE49-F238E27FC236}">
+                <a16:creationId xmlns:a16="http://schemas.microsoft.com/office/drawing/2014/main" id="{7E9F1019-0F65-4875-8ED9-1A5F9A63DD55}"/>
+              </a:ext>
+            </a:extLst>
+          </p:cNvPr>
+          <p:cNvSpPr/>
+          <p:nvPr/>
+        </p:nvSpPr>
+        <p:spPr>
+          <a:xfrm>
+            <a:off x="9082877" y="1660664"/>
+            <a:ext cx="1257929" cy="1257929"/>
+          </a:xfrm>
+          <a:prstGeom prst="roundRect">
+            <a:avLst/>
+          </a:prstGeom>
+          <a:noFill/>
+          <a:ln w="15240">
+            <a:solidFill>
+              <a:schemeClr val="tx1"/>
+            </a:solidFill>
+          </a:ln>
+        </p:spPr>
+        <p:style>
+          <a:lnRef idx="2">
+            <a:schemeClr val="accent1">
+              <a:shade val="50000"/>
+            </a:schemeClr>
+          </a:lnRef>
+          <a:fillRef idx="1">
+            <a:schemeClr val="accent1"/>
+          </a:fillRef>
+          <a:effectRef idx="0">
+            <a:schemeClr val="accent1"/>
+          </a:effectRef>
+          <a:fontRef idx="minor">
+            <a:schemeClr val="lt1"/>
+          </a:fontRef>
+        </p:style>
+        <p:txBody>
+          <a:bodyPr rtlCol="0" anchor="ctr"/>
+          <a:lstStyle/>
+          <a:p>
+            <a:pPr algn="ctr"/>
+            <a:endParaRPr lang="en-GB"/>
+          </a:p>
+        </p:txBody>
+      </p:sp>
+      <p:sp>
+        <p:nvSpPr>
+          <p:cNvPr id="23" name="Rectangle: Rounded Corners 22">
+            <a:extLst>
+              <a:ext uri="{FF2B5EF4-FFF2-40B4-BE49-F238E27FC236}">
+                <a16:creationId xmlns:a16="http://schemas.microsoft.com/office/drawing/2014/main" id="{F1169B2A-233E-4D7E-9739-72BD24B41066}"/>
+              </a:ext>
+            </a:extLst>
+          </p:cNvPr>
+          <p:cNvSpPr/>
+          <p:nvPr/>
+        </p:nvSpPr>
+        <p:spPr>
+          <a:xfrm>
+            <a:off x="9082877" y="2969864"/>
+            <a:ext cx="1257929" cy="1257929"/>
+          </a:xfrm>
+          <a:prstGeom prst="roundRect">
+            <a:avLst/>
+          </a:prstGeom>
+          <a:noFill/>
+          <a:ln w="15240">
+            <a:solidFill>
+              <a:schemeClr val="tx1"/>
+            </a:solidFill>
+          </a:ln>
+        </p:spPr>
+        <p:style>
+          <a:lnRef idx="2">
+            <a:schemeClr val="accent1">
+              <a:shade val="50000"/>
+            </a:schemeClr>
+          </a:lnRef>
+          <a:fillRef idx="1">
+            <a:schemeClr val="accent1"/>
+          </a:fillRef>
+          <a:effectRef idx="0">
+            <a:schemeClr val="accent1"/>
+          </a:effectRef>
+          <a:fontRef idx="minor">
+            <a:schemeClr val="lt1"/>
+          </a:fontRef>
+        </p:style>
+        <p:txBody>
+          <a:bodyPr rtlCol="0" anchor="ctr"/>
+          <a:lstStyle/>
+          <a:p>
+            <a:pPr algn="ctr"/>
+            <a:endParaRPr lang="en-GB"/>
+          </a:p>
+        </p:txBody>
+      </p:sp>
+      <p:sp>
+        <p:nvSpPr>
+          <p:cNvPr id="27" name="Rectangle: Rounded Corners 26">
+            <a:extLst>
+              <a:ext uri="{FF2B5EF4-FFF2-40B4-BE49-F238E27FC236}">
+                <a16:creationId xmlns:a16="http://schemas.microsoft.com/office/drawing/2014/main" id="{29527B9A-D721-454E-87E9-F623347D7BEA}"/>
+              </a:ext>
+            </a:extLst>
+          </p:cNvPr>
+          <p:cNvSpPr/>
+          <p:nvPr/>
+        </p:nvSpPr>
+        <p:spPr>
+          <a:xfrm>
+            <a:off x="9082877" y="4278820"/>
+            <a:ext cx="1257929" cy="1257929"/>
+          </a:xfrm>
+          <a:prstGeom prst="roundRect">
+            <a:avLst/>
+          </a:prstGeom>
+          <a:noFill/>
+          <a:ln w="15240">
+            <a:solidFill>
+              <a:schemeClr val="tx1"/>
+            </a:solidFill>
+          </a:ln>
+        </p:spPr>
+        <p:style>
+          <a:lnRef idx="2">
+            <a:schemeClr val="accent1">
+              <a:shade val="50000"/>
+            </a:schemeClr>
+          </a:lnRef>
+          <a:fillRef idx="1">
+            <a:schemeClr val="accent1"/>
+          </a:fillRef>
+          <a:effectRef idx="0">
+            <a:schemeClr val="accent1"/>
+          </a:effectRef>
+          <a:fontRef idx="minor">
+            <a:schemeClr val="lt1"/>
+          </a:fontRef>
+        </p:style>
+        <p:txBody>
+          <a:bodyPr rtlCol="0" anchor="ctr"/>
+          <a:lstStyle/>
+          <a:p>
+            <a:pPr algn="ctr"/>
+            <a:endParaRPr lang="en-GB"/>
+          </a:p>
+        </p:txBody>
+      </p:sp>
+      <p:sp>
+        <p:nvSpPr>
+          <p:cNvPr id="33" name="Rectangle: Rounded Corners 32">
+            <a:extLst>
+              <a:ext uri="{FF2B5EF4-FFF2-40B4-BE49-F238E27FC236}">
+                <a16:creationId xmlns:a16="http://schemas.microsoft.com/office/drawing/2014/main" id="{3AF4BA7E-2227-414E-87FE-33656D160CD4}"/>
+              </a:ext>
+            </a:extLst>
+          </p:cNvPr>
+          <p:cNvSpPr/>
+          <p:nvPr/>
+        </p:nvSpPr>
+        <p:spPr>
+          <a:xfrm>
+            <a:off x="10391145" y="1660664"/>
+            <a:ext cx="1257929" cy="1257929"/>
+          </a:xfrm>
+          <a:prstGeom prst="roundRect">
+            <a:avLst/>
+          </a:prstGeom>
+          <a:noFill/>
+          <a:ln w="15240">
+            <a:solidFill>
+              <a:schemeClr val="tx1"/>
+            </a:solidFill>
+          </a:ln>
+        </p:spPr>
+        <p:style>
+          <a:lnRef idx="2">
+            <a:schemeClr val="accent1">
+              <a:shade val="50000"/>
+            </a:schemeClr>
+          </a:lnRef>
+          <a:fillRef idx="1">
+            <a:schemeClr val="accent1"/>
+          </a:fillRef>
+          <a:effectRef idx="0">
+            <a:schemeClr val="accent1"/>
+          </a:effectRef>
+          <a:fontRef idx="minor">
+            <a:schemeClr val="lt1"/>
+          </a:fontRef>
+        </p:style>
+        <p:txBody>
+          <a:bodyPr rtlCol="0" anchor="ctr"/>
+          <a:lstStyle/>
+          <a:p>
+            <a:pPr algn="ctr"/>
+            <a:endParaRPr lang="en-GB"/>
+          </a:p>
+        </p:txBody>
+      </p:sp>
+      <p:sp>
+        <p:nvSpPr>
+          <p:cNvPr id="34" name="Rectangle: Rounded Corners 33">
+            <a:extLst>
+              <a:ext uri="{FF2B5EF4-FFF2-40B4-BE49-F238E27FC236}">
+                <a16:creationId xmlns:a16="http://schemas.microsoft.com/office/drawing/2014/main" id="{94C9D241-0E11-4BB3-8AE7-C4684710EFA7}"/>
+              </a:ext>
+            </a:extLst>
+          </p:cNvPr>
+          <p:cNvSpPr/>
+          <p:nvPr/>
+        </p:nvSpPr>
+        <p:spPr>
+          <a:xfrm>
+            <a:off x="10391145" y="2969864"/>
+            <a:ext cx="1257929" cy="1257929"/>
+          </a:xfrm>
+          <a:prstGeom prst="roundRect">
+            <a:avLst/>
+          </a:prstGeom>
+          <a:noFill/>
+          <a:ln w="15240">
+            <a:solidFill>
+              <a:schemeClr val="tx1"/>
+            </a:solidFill>
+          </a:ln>
+        </p:spPr>
+        <p:style>
+          <a:lnRef idx="2">
+            <a:schemeClr val="accent1">
+              <a:shade val="50000"/>
+            </a:schemeClr>
+          </a:lnRef>
+          <a:fillRef idx="1">
+            <a:schemeClr val="accent1"/>
+          </a:fillRef>
+          <a:effectRef idx="0">
+            <a:schemeClr val="accent1"/>
+          </a:effectRef>
+          <a:fontRef idx="minor">
+            <a:schemeClr val="lt1"/>
+          </a:fontRef>
+        </p:style>
+        <p:txBody>
+          <a:bodyPr rtlCol="0" anchor="ctr"/>
+          <a:lstStyle/>
+          <a:p>
+            <a:pPr algn="ctr"/>
+            <a:endParaRPr lang="en-GB"/>
+          </a:p>
+        </p:txBody>
+      </p:sp>
+      <p:sp>
+        <p:nvSpPr>
+          <p:cNvPr id="35" name="Rectangle: Rounded Corners 34">
+            <a:extLst>
+              <a:ext uri="{FF2B5EF4-FFF2-40B4-BE49-F238E27FC236}">
+                <a16:creationId xmlns:a16="http://schemas.microsoft.com/office/drawing/2014/main" id="{2BF487D2-0EAF-458A-8F60-478369AE7C72}"/>
+              </a:ext>
+            </a:extLst>
+          </p:cNvPr>
+          <p:cNvSpPr/>
+          <p:nvPr/>
+        </p:nvSpPr>
+        <p:spPr>
+          <a:xfrm>
+            <a:off x="10391145" y="4278820"/>
+            <a:ext cx="1257929" cy="1257929"/>
+          </a:xfrm>
+          <a:prstGeom prst="roundRect">
+            <a:avLst/>
+          </a:prstGeom>
+          <a:noFill/>
+          <a:ln w="15240">
+            <a:solidFill>
+              <a:schemeClr val="tx1"/>
+            </a:solidFill>
+          </a:ln>
+        </p:spPr>
+        <p:style>
+          <a:lnRef idx="2">
+            <a:schemeClr val="accent1">
+              <a:shade val="50000"/>
+            </a:schemeClr>
+          </a:lnRef>
+          <a:fillRef idx="1">
+            <a:schemeClr val="accent1"/>
+          </a:fillRef>
+          <a:effectRef idx="0">
+            <a:schemeClr val="accent1"/>
+          </a:effectRef>
+          <a:fontRef idx="minor">
+            <a:schemeClr val="lt1"/>
+          </a:fontRef>
+        </p:style>
+        <p:txBody>
+          <a:bodyPr rtlCol="0" anchor="ctr"/>
+          <a:lstStyle/>
+          <a:p>
+            <a:pPr algn="ctr"/>
+            <a:endParaRPr lang="en-GB"/>
+          </a:p>
+        </p:txBody>
+      </p:sp>
+      <p:sp>
+        <p:nvSpPr>
+          <p:cNvPr id="43" name="TextBox 42">
+            <a:extLst>
+              <a:ext uri="{FF2B5EF4-FFF2-40B4-BE49-F238E27FC236}">
+                <a16:creationId xmlns:a16="http://schemas.microsoft.com/office/drawing/2014/main" id="{987C3DF1-8DE2-4D9A-B19C-B0799B76F18F}"/>
               </a:ext>
             </a:extLst>
           </p:cNvPr>
@@ -4797,8 +7977,8 @@
         </p:nvSpPr>
         <p:spPr>
           <a:xfrm>
-            <a:off x="2052408" y="3136612"/>
-            <a:ext cx="8087183" cy="584775"/>
+            <a:off x="9308131" y="2074184"/>
+            <a:ext cx="807420" cy="430887"/>
           </a:xfrm>
           <a:prstGeom prst="rect">
             <a:avLst/>
@@ -4813,21 +7993,106 @@
           <a:p>
             <a:pPr algn="ctr"/>
             <a:r>
-              <a:rPr lang="en-GB" sz="3200" dirty="0"/>
-              <a:t>Object oriented programming</a:t>
-            </a:r>
-            <a:endParaRPr lang="en-GB" sz="2800" dirty="0">
-              <a:solidFill>
-                <a:schemeClr val="tx1"/>
-              </a:solidFill>
-            </a:endParaRPr>
+              <a:rPr lang="en-GB" sz="2200" dirty="0"/>
+              <a:t>0.9</a:t>
+            </a:r>
+          </a:p>
+        </p:txBody>
+      </p:sp>
+      <p:sp>
+        <p:nvSpPr>
+          <p:cNvPr id="50" name="TextBox 49">
+            <a:extLst>
+              <a:ext uri="{FF2B5EF4-FFF2-40B4-BE49-F238E27FC236}">
+                <a16:creationId xmlns:a16="http://schemas.microsoft.com/office/drawing/2014/main" id="{D0DF4DBF-C048-49FD-B22E-80754C2314DE}"/>
+              </a:ext>
+            </a:extLst>
+          </p:cNvPr>
+          <p:cNvSpPr txBox="1"/>
+          <p:nvPr/>
+        </p:nvSpPr>
+        <p:spPr>
+          <a:xfrm>
+            <a:off x="10616399" y="3383385"/>
+            <a:ext cx="807420" cy="430887"/>
+          </a:xfrm>
+          <a:prstGeom prst="rect">
+            <a:avLst/>
+          </a:prstGeom>
+          <a:noFill/>
+        </p:spPr>
+        <p:txBody>
+          <a:bodyPr wrap="square" rtlCol="0">
+            <a:spAutoFit/>
+          </a:bodyPr>
+          <a:lstStyle/>
+          <a:p>
+            <a:pPr algn="ctr"/>
+            <a:r>
+              <a:rPr lang="en-GB" sz="2200" dirty="0"/>
+              <a:t>-128</a:t>
+            </a:r>
+          </a:p>
+        </p:txBody>
+      </p:sp>
+      <p:sp>
+        <p:nvSpPr>
+          <p:cNvPr id="52" name="Rectangle 51">
+            <a:extLst>
+              <a:ext uri="{FF2B5EF4-FFF2-40B4-BE49-F238E27FC236}">
+                <a16:creationId xmlns:a16="http://schemas.microsoft.com/office/drawing/2014/main" id="{81EE5999-3AFA-4C93-AC50-F0ED95333EAE}"/>
+              </a:ext>
+            </a:extLst>
+          </p:cNvPr>
+          <p:cNvSpPr/>
+          <p:nvPr/>
+        </p:nvSpPr>
+        <p:spPr>
+          <a:xfrm>
+            <a:off x="335360" y="4227793"/>
+            <a:ext cx="7382512" cy="1898372"/>
+          </a:xfrm>
+          <a:prstGeom prst="rect">
+            <a:avLst/>
+          </a:prstGeom>
+          <a:solidFill>
+            <a:srgbClr val="FFFFFF">
+              <a:alpha val="89804"/>
+            </a:srgbClr>
+          </a:solidFill>
+          <a:ln>
+            <a:noFill/>
+          </a:ln>
+        </p:spPr>
+        <p:style>
+          <a:lnRef idx="2">
+            <a:schemeClr val="accent1">
+              <a:shade val="50000"/>
+            </a:schemeClr>
+          </a:lnRef>
+          <a:fillRef idx="1">
+            <a:schemeClr val="accent1"/>
+          </a:fillRef>
+          <a:effectRef idx="0">
+            <a:schemeClr val="accent1"/>
+          </a:effectRef>
+          <a:fontRef idx="minor">
+            <a:schemeClr val="lt1"/>
+          </a:fontRef>
+        </p:style>
+        <p:txBody>
+          <a:bodyPr rtlCol="0" anchor="ctr"/>
+          <a:lstStyle/>
+          <a:p>
+            <a:pPr algn="ctr"/>
+            <a:endParaRPr lang="en-GB"/>
           </a:p>
         </p:txBody>
       </p:sp>
     </p:spTree>
     <p:extLst>
       <p:ext uri="{BB962C8B-B14F-4D97-AF65-F5344CB8AC3E}">
-        <p14:creationId xmlns:p14="http://schemas.microsoft.com/office/powerpoint/2010/main" val="4130560997"/>
+        <p14:creationId xmlns:p14="http://schemas.microsoft.com/office/powerpoint/2010/main" val="2716574349"/>
       </p:ext>
     </p:extLst>
   </p:cSld>
@@ -4871,7 +8136,7 @@
           <p:cNvPr id="2" name="Title 1">
             <a:extLst>
               <a:ext uri="{FF2B5EF4-FFF2-40B4-BE49-F238E27FC236}">
-                <a16:creationId xmlns:a16="http://schemas.microsoft.com/office/drawing/2014/main" id="{297C1240-D4CE-4AD2-96B1-DBD7075D8052}"/>
+                <a16:creationId xmlns:a16="http://schemas.microsoft.com/office/drawing/2014/main" id="{FB0D9636-2B3A-4E3D-9B13-904FF3CE8CE3}"/>
               </a:ext>
             </a:extLst>
           </p:cNvPr>
@@ -4887,7 +8152,10 @@
           <a:bodyPr/>
           <a:lstStyle/>
           <a:p>
-            <a:endParaRPr lang="en-GB"/>
+            <a:r>
+              <a:rPr lang="en-GB" dirty="0"/>
+              <a:t>Cell arrays</a:t>
+            </a:r>
           </a:p>
         </p:txBody>
       </p:sp>
@@ -4896,7 +8164,7 @@
           <p:cNvPr id="3" name="Content Placeholder 2">
             <a:extLst>
               <a:ext uri="{FF2B5EF4-FFF2-40B4-BE49-F238E27FC236}">
-                <a16:creationId xmlns:a16="http://schemas.microsoft.com/office/drawing/2014/main" id="{7E90A914-5E00-4AAB-802D-4C98FA2788C1}"/>
+                <a16:creationId xmlns:a16="http://schemas.microsoft.com/office/drawing/2014/main" id="{DFE43EAF-8F5E-44D2-BF28-45DAFCB5DD96}"/>
               </a:ext>
             </a:extLst>
           </p:cNvPr>
@@ -4907,84 +8175,599 @@
             <p:ph idx="1"/>
           </p:nvPr>
         </p:nvSpPr>
-        <p:spPr/>
+        <p:spPr>
+          <a:xfrm>
+            <a:off x="335360" y="1196754"/>
+            <a:ext cx="7608490" cy="4929411"/>
+          </a:xfrm>
+        </p:spPr>
         <p:txBody>
           <a:bodyPr/>
           <a:lstStyle/>
           <a:p>
             <a:r>
               <a:rPr lang="en-GB" dirty="0"/>
-              <a:t>Intro to OOP</a:t>
+              <a:t>Similar to arrays, but each element is a “cell”</a:t>
             </a:r>
           </a:p>
           <a:p>
             <a:pPr lvl="1"/>
             <a:r>
               <a:rPr lang="en-GB" dirty="0"/>
-              <a:t>What are objects, classes and methods</a:t>
+              <a:t>Regular grid of cells</a:t>
             </a:r>
           </a:p>
           <a:p>
             <a:pPr lvl="1"/>
             <a:r>
               <a:rPr lang="en-GB" dirty="0"/>
-              <a:t>Why would we use this?</a:t>
-            </a:r>
-          </a:p>
-          <a:p>
+              <a:t>Can be N-dimensional</a:t>
+            </a:r>
+          </a:p>
+          <a:p>
+            <a:pPr lvl="1"/>
             <a:r>
               <a:rPr lang="en-GB" dirty="0"/>
-              <a:t>Example of OOP</a:t>
-            </a:r>
-          </a:p>
-          <a:p>
-            <a:pPr lvl="1"/>
+              <a:t>Can hold different data types in each cell</a:t>
+            </a:r>
+          </a:p>
+          <a:p>
+            <a:endParaRPr lang="en-GB" sz="1200" dirty="0"/>
+          </a:p>
+          <a:p>
             <a:r>
               <a:rPr lang="en-GB" dirty="0"/>
-              <a:t>Class could refer to physical object, but could also be something that does a job</a:t>
+              <a:t>A cell can hold any data type, for example</a:t>
             </a:r>
           </a:p>
           <a:p>
             <a:pPr lvl="1"/>
             <a:r>
               <a:rPr lang="en-GB" dirty="0"/>
-              <a:t>Maybe use nuclear detection as an example</a:t>
-            </a:r>
-          </a:p>
-          <a:p>
+              <a:t>Single numeric values</a:t>
+            </a:r>
+          </a:p>
+          <a:p>
+            <a:pPr lvl="1"/>
             <a:r>
               <a:rPr lang="en-GB" dirty="0"/>
-              <a:t>Using objects and methods</a:t>
+              <a:t>Text</a:t>
             </a:r>
           </a:p>
           <a:p>
             <a:pPr lvl="1"/>
             <a:r>
               <a:rPr lang="en-GB" dirty="0"/>
-              <a:t>Find function which outputs objects (maybe something imaging related – maybe </a:t>
-            </a:r>
-            <a:r>
-              <a:rPr lang="en-GB" dirty="0" err="1"/>
-              <a:t>Bioformats</a:t>
-            </a:r>
+              <a:t>Numeric arrays and matrices</a:t>
+            </a:r>
+          </a:p>
+          <a:p>
+            <a:pPr lvl="1"/>
             <a:r>
               <a:rPr lang="en-GB" dirty="0"/>
-              <a:t>…)</a:t>
-            </a:r>
-          </a:p>
-          <a:p>
-            <a:r>
-              <a:rPr lang="en-GB"/>
-              <a:t>Creating objects</a:t>
-            </a:r>
-            <a:endParaRPr lang="en-GB" dirty="0"/>
+              <a:t>Even another cell array!</a:t>
+            </a:r>
+          </a:p>
+          <a:p>
+            <a:pPr lvl="1"/>
+            <a:endParaRPr lang="en-GB" sz="1200" dirty="0"/>
+          </a:p>
+        </p:txBody>
+      </p:sp>
+      <p:sp>
+        <p:nvSpPr>
+          <p:cNvPr id="12" name="Rectangle: Rounded Corners 11">
+            <a:extLst>
+              <a:ext uri="{FF2B5EF4-FFF2-40B4-BE49-F238E27FC236}">
+                <a16:creationId xmlns:a16="http://schemas.microsoft.com/office/drawing/2014/main" id="{7E9F1019-0F65-4875-8ED9-1A5F9A63DD55}"/>
+              </a:ext>
+            </a:extLst>
+          </p:cNvPr>
+          <p:cNvSpPr/>
+          <p:nvPr/>
+        </p:nvSpPr>
+        <p:spPr>
+          <a:xfrm>
+            <a:off x="9082877" y="1660664"/>
+            <a:ext cx="1257929" cy="1257929"/>
+          </a:xfrm>
+          <a:prstGeom prst="roundRect">
+            <a:avLst/>
+          </a:prstGeom>
+          <a:noFill/>
+          <a:ln w="15240">
+            <a:solidFill>
+              <a:schemeClr val="tx1"/>
+            </a:solidFill>
+          </a:ln>
+        </p:spPr>
+        <p:style>
+          <a:lnRef idx="2">
+            <a:schemeClr val="accent1">
+              <a:shade val="50000"/>
+            </a:schemeClr>
+          </a:lnRef>
+          <a:fillRef idx="1">
+            <a:schemeClr val="accent1"/>
+          </a:fillRef>
+          <a:effectRef idx="0">
+            <a:schemeClr val="accent1"/>
+          </a:effectRef>
+          <a:fontRef idx="minor">
+            <a:schemeClr val="lt1"/>
+          </a:fontRef>
+        </p:style>
+        <p:txBody>
+          <a:bodyPr rtlCol="0" anchor="ctr"/>
+          <a:lstStyle/>
+          <a:p>
+            <a:pPr algn="ctr"/>
+            <a:endParaRPr lang="en-GB"/>
+          </a:p>
+        </p:txBody>
+      </p:sp>
+      <p:sp>
+        <p:nvSpPr>
+          <p:cNvPr id="23" name="Rectangle: Rounded Corners 22">
+            <a:extLst>
+              <a:ext uri="{FF2B5EF4-FFF2-40B4-BE49-F238E27FC236}">
+                <a16:creationId xmlns:a16="http://schemas.microsoft.com/office/drawing/2014/main" id="{F1169B2A-233E-4D7E-9739-72BD24B41066}"/>
+              </a:ext>
+            </a:extLst>
+          </p:cNvPr>
+          <p:cNvSpPr/>
+          <p:nvPr/>
+        </p:nvSpPr>
+        <p:spPr>
+          <a:xfrm>
+            <a:off x="9082877" y="2969864"/>
+            <a:ext cx="1257929" cy="1257929"/>
+          </a:xfrm>
+          <a:prstGeom prst="roundRect">
+            <a:avLst/>
+          </a:prstGeom>
+          <a:noFill/>
+          <a:ln w="15240">
+            <a:solidFill>
+              <a:schemeClr val="tx1"/>
+            </a:solidFill>
+          </a:ln>
+        </p:spPr>
+        <p:style>
+          <a:lnRef idx="2">
+            <a:schemeClr val="accent1">
+              <a:shade val="50000"/>
+            </a:schemeClr>
+          </a:lnRef>
+          <a:fillRef idx="1">
+            <a:schemeClr val="accent1"/>
+          </a:fillRef>
+          <a:effectRef idx="0">
+            <a:schemeClr val="accent1"/>
+          </a:effectRef>
+          <a:fontRef idx="minor">
+            <a:schemeClr val="lt1"/>
+          </a:fontRef>
+        </p:style>
+        <p:txBody>
+          <a:bodyPr rtlCol="0" anchor="ctr"/>
+          <a:lstStyle/>
+          <a:p>
+            <a:pPr algn="ctr"/>
+            <a:endParaRPr lang="en-GB"/>
+          </a:p>
+        </p:txBody>
+      </p:sp>
+      <p:sp>
+        <p:nvSpPr>
+          <p:cNvPr id="27" name="Rectangle: Rounded Corners 26">
+            <a:extLst>
+              <a:ext uri="{FF2B5EF4-FFF2-40B4-BE49-F238E27FC236}">
+                <a16:creationId xmlns:a16="http://schemas.microsoft.com/office/drawing/2014/main" id="{29527B9A-D721-454E-87E9-F623347D7BEA}"/>
+              </a:ext>
+            </a:extLst>
+          </p:cNvPr>
+          <p:cNvSpPr/>
+          <p:nvPr/>
+        </p:nvSpPr>
+        <p:spPr>
+          <a:xfrm>
+            <a:off x="9082877" y="4278820"/>
+            <a:ext cx="1257929" cy="1257929"/>
+          </a:xfrm>
+          <a:prstGeom prst="roundRect">
+            <a:avLst/>
+          </a:prstGeom>
+          <a:noFill/>
+          <a:ln w="15240">
+            <a:solidFill>
+              <a:schemeClr val="tx1"/>
+            </a:solidFill>
+          </a:ln>
+        </p:spPr>
+        <p:style>
+          <a:lnRef idx="2">
+            <a:schemeClr val="accent1">
+              <a:shade val="50000"/>
+            </a:schemeClr>
+          </a:lnRef>
+          <a:fillRef idx="1">
+            <a:schemeClr val="accent1"/>
+          </a:fillRef>
+          <a:effectRef idx="0">
+            <a:schemeClr val="accent1"/>
+          </a:effectRef>
+          <a:fontRef idx="minor">
+            <a:schemeClr val="lt1"/>
+          </a:fontRef>
+        </p:style>
+        <p:txBody>
+          <a:bodyPr rtlCol="0" anchor="ctr"/>
+          <a:lstStyle/>
+          <a:p>
+            <a:pPr algn="ctr"/>
+            <a:endParaRPr lang="en-GB"/>
+          </a:p>
+        </p:txBody>
+      </p:sp>
+      <p:sp>
+        <p:nvSpPr>
+          <p:cNvPr id="33" name="Rectangle: Rounded Corners 32">
+            <a:extLst>
+              <a:ext uri="{FF2B5EF4-FFF2-40B4-BE49-F238E27FC236}">
+                <a16:creationId xmlns:a16="http://schemas.microsoft.com/office/drawing/2014/main" id="{3AF4BA7E-2227-414E-87FE-33656D160CD4}"/>
+              </a:ext>
+            </a:extLst>
+          </p:cNvPr>
+          <p:cNvSpPr/>
+          <p:nvPr/>
+        </p:nvSpPr>
+        <p:spPr>
+          <a:xfrm>
+            <a:off x="10391145" y="1660664"/>
+            <a:ext cx="1257929" cy="1257929"/>
+          </a:xfrm>
+          <a:prstGeom prst="roundRect">
+            <a:avLst/>
+          </a:prstGeom>
+          <a:noFill/>
+          <a:ln w="15240">
+            <a:solidFill>
+              <a:schemeClr val="tx1"/>
+            </a:solidFill>
+          </a:ln>
+        </p:spPr>
+        <p:style>
+          <a:lnRef idx="2">
+            <a:schemeClr val="accent1">
+              <a:shade val="50000"/>
+            </a:schemeClr>
+          </a:lnRef>
+          <a:fillRef idx="1">
+            <a:schemeClr val="accent1"/>
+          </a:fillRef>
+          <a:effectRef idx="0">
+            <a:schemeClr val="accent1"/>
+          </a:effectRef>
+          <a:fontRef idx="minor">
+            <a:schemeClr val="lt1"/>
+          </a:fontRef>
+        </p:style>
+        <p:txBody>
+          <a:bodyPr rtlCol="0" anchor="ctr"/>
+          <a:lstStyle/>
+          <a:p>
+            <a:pPr algn="ctr"/>
+            <a:endParaRPr lang="en-GB"/>
+          </a:p>
+        </p:txBody>
+      </p:sp>
+      <p:sp>
+        <p:nvSpPr>
+          <p:cNvPr id="34" name="Rectangle: Rounded Corners 33">
+            <a:extLst>
+              <a:ext uri="{FF2B5EF4-FFF2-40B4-BE49-F238E27FC236}">
+                <a16:creationId xmlns:a16="http://schemas.microsoft.com/office/drawing/2014/main" id="{94C9D241-0E11-4BB3-8AE7-C4684710EFA7}"/>
+              </a:ext>
+            </a:extLst>
+          </p:cNvPr>
+          <p:cNvSpPr/>
+          <p:nvPr/>
+        </p:nvSpPr>
+        <p:spPr>
+          <a:xfrm>
+            <a:off x="10391145" y="2969864"/>
+            <a:ext cx="1257929" cy="1257929"/>
+          </a:xfrm>
+          <a:prstGeom prst="roundRect">
+            <a:avLst/>
+          </a:prstGeom>
+          <a:noFill/>
+          <a:ln w="15240">
+            <a:solidFill>
+              <a:schemeClr val="tx1"/>
+            </a:solidFill>
+          </a:ln>
+        </p:spPr>
+        <p:style>
+          <a:lnRef idx="2">
+            <a:schemeClr val="accent1">
+              <a:shade val="50000"/>
+            </a:schemeClr>
+          </a:lnRef>
+          <a:fillRef idx="1">
+            <a:schemeClr val="accent1"/>
+          </a:fillRef>
+          <a:effectRef idx="0">
+            <a:schemeClr val="accent1"/>
+          </a:effectRef>
+          <a:fontRef idx="minor">
+            <a:schemeClr val="lt1"/>
+          </a:fontRef>
+        </p:style>
+        <p:txBody>
+          <a:bodyPr rtlCol="0" anchor="ctr"/>
+          <a:lstStyle/>
+          <a:p>
+            <a:pPr algn="ctr"/>
+            <a:endParaRPr lang="en-GB"/>
+          </a:p>
+        </p:txBody>
+      </p:sp>
+      <p:sp>
+        <p:nvSpPr>
+          <p:cNvPr id="35" name="Rectangle: Rounded Corners 34">
+            <a:extLst>
+              <a:ext uri="{FF2B5EF4-FFF2-40B4-BE49-F238E27FC236}">
+                <a16:creationId xmlns:a16="http://schemas.microsoft.com/office/drawing/2014/main" id="{2BF487D2-0EAF-458A-8F60-478369AE7C72}"/>
+              </a:ext>
+            </a:extLst>
+          </p:cNvPr>
+          <p:cNvSpPr/>
+          <p:nvPr/>
+        </p:nvSpPr>
+        <p:spPr>
+          <a:xfrm>
+            <a:off x="10391145" y="4278820"/>
+            <a:ext cx="1257929" cy="1257929"/>
+          </a:xfrm>
+          <a:prstGeom prst="roundRect">
+            <a:avLst/>
+          </a:prstGeom>
+          <a:noFill/>
+          <a:ln w="15240">
+            <a:solidFill>
+              <a:schemeClr val="tx1"/>
+            </a:solidFill>
+          </a:ln>
+        </p:spPr>
+        <p:style>
+          <a:lnRef idx="2">
+            <a:schemeClr val="accent1">
+              <a:shade val="50000"/>
+            </a:schemeClr>
+          </a:lnRef>
+          <a:fillRef idx="1">
+            <a:schemeClr val="accent1"/>
+          </a:fillRef>
+          <a:effectRef idx="0">
+            <a:schemeClr val="accent1"/>
+          </a:effectRef>
+          <a:fontRef idx="minor">
+            <a:schemeClr val="lt1"/>
+          </a:fontRef>
+        </p:style>
+        <p:txBody>
+          <a:bodyPr rtlCol="0" anchor="ctr"/>
+          <a:lstStyle/>
+          <a:p>
+            <a:pPr algn="ctr"/>
+            <a:endParaRPr lang="en-GB"/>
+          </a:p>
+        </p:txBody>
+      </p:sp>
+      <p:sp>
+        <p:nvSpPr>
+          <p:cNvPr id="43" name="TextBox 42">
+            <a:extLst>
+              <a:ext uri="{FF2B5EF4-FFF2-40B4-BE49-F238E27FC236}">
+                <a16:creationId xmlns:a16="http://schemas.microsoft.com/office/drawing/2014/main" id="{987C3DF1-8DE2-4D9A-B19C-B0799B76F18F}"/>
+              </a:ext>
+            </a:extLst>
+          </p:cNvPr>
+          <p:cNvSpPr txBox="1"/>
+          <p:nvPr/>
+        </p:nvSpPr>
+        <p:spPr>
+          <a:xfrm>
+            <a:off x="9308131" y="2074184"/>
+            <a:ext cx="807420" cy="430887"/>
+          </a:xfrm>
+          <a:prstGeom prst="rect">
+            <a:avLst/>
+          </a:prstGeom>
+          <a:noFill/>
+        </p:spPr>
+        <p:txBody>
+          <a:bodyPr wrap="square" rtlCol="0">
+            <a:spAutoFit/>
+          </a:bodyPr>
+          <a:lstStyle/>
+          <a:p>
+            <a:pPr algn="ctr"/>
+            <a:r>
+              <a:rPr lang="en-GB" sz="2200" dirty="0"/>
+              <a:t>0.9</a:t>
+            </a:r>
+          </a:p>
+        </p:txBody>
+      </p:sp>
+      <p:sp>
+        <p:nvSpPr>
+          <p:cNvPr id="44" name="TextBox 43">
+            <a:extLst>
+              <a:ext uri="{FF2B5EF4-FFF2-40B4-BE49-F238E27FC236}">
+                <a16:creationId xmlns:a16="http://schemas.microsoft.com/office/drawing/2014/main" id="{3E821E05-06D3-4EA9-9B74-967B91D8FCF5}"/>
+              </a:ext>
+            </a:extLst>
+          </p:cNvPr>
+          <p:cNvSpPr txBox="1"/>
+          <p:nvPr/>
+        </p:nvSpPr>
+        <p:spPr>
+          <a:xfrm>
+            <a:off x="10391145" y="1904906"/>
+            <a:ext cx="1257930" cy="769441"/>
+          </a:xfrm>
+          <a:prstGeom prst="rect">
+            <a:avLst/>
+          </a:prstGeom>
+          <a:noFill/>
+        </p:spPr>
+        <p:txBody>
+          <a:bodyPr wrap="square" rtlCol="0">
+            <a:spAutoFit/>
+          </a:bodyPr>
+          <a:lstStyle/>
+          <a:p>
+            <a:pPr algn="ctr"/>
+            <a:r>
+              <a:rPr lang="en-GB" sz="2200" dirty="0"/>
+              <a:t>‘some text’</a:t>
+            </a:r>
+          </a:p>
+        </p:txBody>
+      </p:sp>
+      <p:sp>
+        <p:nvSpPr>
+          <p:cNvPr id="50" name="TextBox 49">
+            <a:extLst>
+              <a:ext uri="{FF2B5EF4-FFF2-40B4-BE49-F238E27FC236}">
+                <a16:creationId xmlns:a16="http://schemas.microsoft.com/office/drawing/2014/main" id="{D0DF4DBF-C048-49FD-B22E-80754C2314DE}"/>
+              </a:ext>
+            </a:extLst>
+          </p:cNvPr>
+          <p:cNvSpPr txBox="1"/>
+          <p:nvPr/>
+        </p:nvSpPr>
+        <p:spPr>
+          <a:xfrm>
+            <a:off x="10616399" y="3383385"/>
+            <a:ext cx="807420" cy="430887"/>
+          </a:xfrm>
+          <a:prstGeom prst="rect">
+            <a:avLst/>
+          </a:prstGeom>
+          <a:noFill/>
+        </p:spPr>
+        <p:txBody>
+          <a:bodyPr wrap="square" rtlCol="0">
+            <a:spAutoFit/>
+          </a:bodyPr>
+          <a:lstStyle/>
+          <a:p>
+            <a:pPr algn="ctr"/>
+            <a:r>
+              <a:rPr lang="en-GB" sz="2200" dirty="0"/>
+              <a:t>-128</a:t>
+            </a:r>
+          </a:p>
+        </p:txBody>
+      </p:sp>
+      <p:sp>
+        <p:nvSpPr>
+          <p:cNvPr id="51" name="TextBox 50">
+            <a:extLst>
+              <a:ext uri="{FF2B5EF4-FFF2-40B4-BE49-F238E27FC236}">
+                <a16:creationId xmlns:a16="http://schemas.microsoft.com/office/drawing/2014/main" id="{907622E2-5BB8-4195-9C44-0D86BE661C73}"/>
+              </a:ext>
+            </a:extLst>
+          </p:cNvPr>
+          <p:cNvSpPr txBox="1"/>
+          <p:nvPr/>
+        </p:nvSpPr>
+        <p:spPr>
+          <a:xfrm>
+            <a:off x="9081609" y="4523063"/>
+            <a:ext cx="1257930" cy="769441"/>
+          </a:xfrm>
+          <a:prstGeom prst="rect">
+            <a:avLst/>
+          </a:prstGeom>
+          <a:noFill/>
+        </p:spPr>
+        <p:txBody>
+          <a:bodyPr wrap="square" rtlCol="0">
+            <a:spAutoFit/>
+          </a:bodyPr>
+          <a:lstStyle/>
+          <a:p>
+            <a:pPr algn="ctr"/>
+            <a:r>
+              <a:rPr lang="en-GB" sz="2200" dirty="0"/>
+              <a:t>‘more stuff’</a:t>
+            </a:r>
+          </a:p>
+        </p:txBody>
+      </p:sp>
+      <p:sp>
+        <p:nvSpPr>
+          <p:cNvPr id="52" name="Rectangle 51">
+            <a:extLst>
+              <a:ext uri="{FF2B5EF4-FFF2-40B4-BE49-F238E27FC236}">
+                <a16:creationId xmlns:a16="http://schemas.microsoft.com/office/drawing/2014/main" id="{81EE5999-3AFA-4C93-AC50-F0ED95333EAE}"/>
+              </a:ext>
+            </a:extLst>
+          </p:cNvPr>
+          <p:cNvSpPr/>
+          <p:nvPr/>
+        </p:nvSpPr>
+        <p:spPr>
+          <a:xfrm>
+            <a:off x="335360" y="4638675"/>
+            <a:ext cx="7382512" cy="1487490"/>
+          </a:xfrm>
+          <a:prstGeom prst="rect">
+            <a:avLst/>
+          </a:prstGeom>
+          <a:solidFill>
+            <a:srgbClr val="FFFFFF">
+              <a:alpha val="89804"/>
+            </a:srgbClr>
+          </a:solidFill>
+          <a:ln>
+            <a:noFill/>
+          </a:ln>
+        </p:spPr>
+        <p:style>
+          <a:lnRef idx="2">
+            <a:schemeClr val="accent1">
+              <a:shade val="50000"/>
+            </a:schemeClr>
+          </a:lnRef>
+          <a:fillRef idx="1">
+            <a:schemeClr val="accent1"/>
+          </a:fillRef>
+          <a:effectRef idx="0">
+            <a:schemeClr val="accent1"/>
+          </a:effectRef>
+          <a:fontRef idx="minor">
+            <a:schemeClr val="lt1"/>
+          </a:fontRef>
+        </p:style>
+        <p:txBody>
+          <a:bodyPr rtlCol="0" anchor="ctr"/>
+          <a:lstStyle/>
+          <a:p>
+            <a:pPr algn="ctr"/>
+            <a:endParaRPr lang="en-GB"/>
           </a:p>
         </p:txBody>
       </p:sp>
     </p:spTree>
     <p:extLst>
       <p:ext uri="{BB962C8B-B14F-4D97-AF65-F5344CB8AC3E}">
-        <p14:creationId xmlns:p14="http://schemas.microsoft.com/office/powerpoint/2010/main" val="322493715"/>
+        <p14:creationId xmlns:p14="http://schemas.microsoft.com/office/powerpoint/2010/main" val="404182656"/>
       </p:ext>
     </p:extLst>
   </p:cSld>

</xml_diff>

<commit_message>
Added more on Bio-Formats
</commit_message>
<xml_diff>
--- a/Session 3 - Advanced data structures/MATLAB Session 3.pptx
+++ b/Session 3 - Advanced data structures/MATLAB Session 3.pptx
@@ -5,7 +5,7 @@
     <p:sldMasterId id="2147483678" r:id="rId1"/>
   </p:sldMasterIdLst>
   <p:notesMasterIdLst>
-    <p:notesMasterId r:id="rId51"/>
+    <p:notesMasterId r:id="rId62"/>
   </p:notesMasterIdLst>
   <p:sldIdLst>
     <p:sldId id="316" r:id="rId2"/>
@@ -53,10 +53,21 @@
     <p:sldId id="487" r:id="rId44"/>
     <p:sldId id="488" r:id="rId45"/>
     <p:sldId id="489" r:id="rId46"/>
-    <p:sldId id="491" r:id="rId47"/>
-    <p:sldId id="447" r:id="rId48"/>
-    <p:sldId id="444" r:id="rId49"/>
-    <p:sldId id="443" r:id="rId50"/>
+    <p:sldId id="492" r:id="rId47"/>
+    <p:sldId id="493" r:id="rId48"/>
+    <p:sldId id="496" r:id="rId49"/>
+    <p:sldId id="497" r:id="rId50"/>
+    <p:sldId id="495" r:id="rId51"/>
+    <p:sldId id="498" r:id="rId52"/>
+    <p:sldId id="499" r:id="rId53"/>
+    <p:sldId id="500" r:id="rId54"/>
+    <p:sldId id="501" r:id="rId55"/>
+    <p:sldId id="502" r:id="rId56"/>
+    <p:sldId id="503" r:id="rId57"/>
+    <p:sldId id="504" r:id="rId58"/>
+    <p:sldId id="505" r:id="rId59"/>
+    <p:sldId id="444" r:id="rId60"/>
+    <p:sldId id="443" r:id="rId61"/>
   </p:sldIdLst>
   <p:sldSz cx="12192000" cy="6858000"/>
   <p:notesSz cx="6669088" cy="9926638"/>
@@ -19572,7 +19583,7 @@
         </p:blipFill>
         <p:spPr>
           <a:xfrm>
-            <a:off x="3410391" y="1233963"/>
+            <a:off x="3120390" y="1233963"/>
             <a:ext cx="5951220" cy="4390073"/>
           </a:xfrm>
           <a:prstGeom prst="rect">
@@ -19861,7 +19872,7 @@
         <p:spPr>
           <a:xfrm>
             <a:off x="335360" y="1196754"/>
-            <a:ext cx="6918879" cy="4929411"/>
+            <a:ext cx="11443685" cy="4929411"/>
           </a:xfrm>
         </p:spPr>
         <p:txBody>
@@ -19894,18 +19905,7 @@
                   <a:srgbClr val="C00000"/>
                 </a:solidFill>
               </a:rPr>
-              <a:t>Opens all series into a cell array</a:t>
-            </a:r>
-          </a:p>
-          <a:p>
-            <a:pPr lvl="1"/>
-            <a:r>
-              <a:rPr lang="en-GB" dirty="0">
-                <a:solidFill>
-                  <a:srgbClr val="C00000"/>
-                </a:solidFill>
-              </a:rPr>
-              <a:t>Need sufficient PC memory for this</a:t>
+              <a:t>Outputs nested cell structure with one row per series</a:t>
             </a:r>
           </a:p>
           <a:p>
@@ -19946,12 +19946,47 @@
           </a:p>
         </p:txBody>
       </p:sp>
+      <p:pic>
+        <p:nvPicPr>
+          <p:cNvPr id="6" name="Picture 5">
+            <a:extLst>
+              <a:ext uri="{FF2B5EF4-FFF2-40B4-BE49-F238E27FC236}">
+                <a16:creationId xmlns:a16="http://schemas.microsoft.com/office/drawing/2014/main" id="{29D6333D-976A-4AFF-9C74-D08F2462B17C}"/>
+              </a:ext>
+            </a:extLst>
+          </p:cNvPr>
+          <p:cNvPicPr>
+            <a:picLocks noChangeAspect="1"/>
+          </p:cNvPicPr>
+          <p:nvPr/>
+        </p:nvPicPr>
+        <p:blipFill>
+          <a:blip r:embed="rId2"/>
+          <a:stretch>
+            <a:fillRect/>
+          </a:stretch>
+        </p:blipFill>
+        <p:spPr>
+          <a:xfrm>
+            <a:off x="1191238" y="3183983"/>
+            <a:ext cx="9809524" cy="2857143"/>
+          </a:xfrm>
+          <a:prstGeom prst="rect">
+            <a:avLst/>
+          </a:prstGeom>
+          <a:ln w="12700">
+            <a:solidFill>
+              <a:srgbClr val="C00000"/>
+            </a:solidFill>
+          </a:ln>
+        </p:spPr>
+      </p:pic>
       <p:sp>
         <p:nvSpPr>
-          <p:cNvPr id="5" name="TextBox 4">
-            <a:extLst>
-              <a:ext uri="{FF2B5EF4-FFF2-40B4-BE49-F238E27FC236}">
-                <a16:creationId xmlns:a16="http://schemas.microsoft.com/office/drawing/2014/main" id="{2B6DBD0E-2E80-4DFD-AC5B-CDB9B8C99E02}"/>
+          <p:cNvPr id="8" name="TextBox 7">
+            <a:extLst>
+              <a:ext uri="{FF2B5EF4-FFF2-40B4-BE49-F238E27FC236}">
+                <a16:creationId xmlns:a16="http://schemas.microsoft.com/office/drawing/2014/main" id="{698A750A-6C9F-4079-8996-E2EBC2D7AA34}"/>
               </a:ext>
             </a:extLst>
           </p:cNvPr>
@@ -19960,8 +19995,8 @@
         </p:nvSpPr>
         <p:spPr>
           <a:xfrm>
-            <a:off x="2899954" y="2838994"/>
-            <a:ext cx="6008915" cy="3139321"/>
+            <a:off x="1043356" y="2550631"/>
+            <a:ext cx="2511845" cy="461665"/>
           </a:xfrm>
           <a:prstGeom prst="rect">
             <a:avLst/>
@@ -19974,160 +20009,118 @@
           </a:bodyPr>
           <a:lstStyle/>
           <a:p>
-            <a:r>
-              <a:rPr lang="en-GB" dirty="0">
+            <a:pPr algn="ctr"/>
+            <a:r>
+              <a:rPr lang="en-GB" sz="2400" dirty="0">
                 <a:solidFill>
                   <a:srgbClr val="FF0000"/>
                 </a:solidFill>
               </a:rPr>
-              <a:t>[Could have screenshots with text overlaid for each step</a:t>
-            </a:r>
-          </a:p>
-          <a:p>
-            <a:pPr marL="285750" indent="-285750">
-              <a:buFontTx/>
-              <a:buChar char="-"/>
-            </a:pPr>
-            <a:r>
-              <a:rPr lang="en-GB" dirty="0">
-                <a:solidFill>
-                  <a:srgbClr val="FF0000"/>
-                </a:solidFill>
-              </a:rPr>
-              <a:t>File loading and showing structure</a:t>
-            </a:r>
-          </a:p>
-          <a:p>
-            <a:pPr marL="285750" indent="-285750">
-              <a:buFontTx/>
-              <a:buChar char="-"/>
-            </a:pPr>
-            <a:r>
-              <a:rPr lang="en-GB" dirty="0">
-                <a:solidFill>
-                  <a:srgbClr val="FF0000"/>
-                </a:solidFill>
-              </a:rPr>
-              <a:t>Each row is a series</a:t>
-            </a:r>
-          </a:p>
-          <a:p>
-            <a:pPr marL="285750" lvl="2" indent="-285750">
-              <a:buFontTx/>
-              <a:buChar char="-"/>
-            </a:pPr>
-            <a:r>
-              <a:rPr lang="en-GB" dirty="0">
-                <a:solidFill>
-                  <a:srgbClr val="FF0000"/>
-                </a:solidFill>
-              </a:rPr>
-              <a:t>First cell is itself a cell with each row as a different image</a:t>
-            </a:r>
-          </a:p>
-          <a:p>
-            <a:pPr marL="285750" lvl="2" indent="-285750">
-              <a:buFontTx/>
-              <a:buChar char="-"/>
-            </a:pPr>
-            <a:r>
-              <a:rPr lang="en-GB" dirty="0">
-                <a:solidFill>
-                  <a:srgbClr val="FF0000"/>
-                </a:solidFill>
-              </a:rPr>
-              <a:t>    Column 1 is the image array</a:t>
-            </a:r>
-          </a:p>
-          <a:p>
-            <a:pPr marL="285750" lvl="2" indent="-285750">
-              <a:buFontTx/>
-              <a:buChar char="-"/>
-            </a:pPr>
-            <a:r>
-              <a:rPr lang="en-GB" dirty="0">
-                <a:solidFill>
-                  <a:srgbClr val="FF0000"/>
-                </a:solidFill>
-              </a:rPr>
-              <a:t>    Column 2 is name of that image (brief description)</a:t>
-            </a:r>
-          </a:p>
-          <a:p>
-            <a:pPr marL="285750" lvl="2" indent="-285750">
-              <a:buFontTx/>
-              <a:buChar char="-"/>
-            </a:pPr>
-            <a:r>
-              <a:rPr lang="en-GB" dirty="0">
-                <a:solidFill>
-                  <a:srgbClr val="FF0000"/>
-                </a:solidFill>
-              </a:rPr>
-              <a:t>Second cell is “raw” metadata structure as Java </a:t>
-            </a:r>
-            <a:r>
-              <a:rPr lang="en-GB" dirty="0" err="1">
-                <a:solidFill>
-                  <a:srgbClr val="FF0000"/>
-                </a:solidFill>
-              </a:rPr>
-              <a:t>HashTable</a:t>
-            </a:r>
-            <a:endParaRPr lang="en-GB" dirty="0">
-              <a:solidFill>
-                <a:srgbClr val="FF0000"/>
-              </a:solidFill>
-            </a:endParaRPr>
-          </a:p>
-          <a:p>
-            <a:pPr marL="285750" lvl="2" indent="-285750">
-              <a:buFontTx/>
-              <a:buChar char="-"/>
-            </a:pPr>
-            <a:r>
-              <a:rPr lang="en-GB" dirty="0">
-                <a:solidFill>
-                  <a:srgbClr val="FF0000"/>
-                </a:solidFill>
-              </a:rPr>
-              <a:t>Third cell contains colour lookup table information</a:t>
-            </a:r>
-          </a:p>
-          <a:p>
-            <a:pPr marL="285750" lvl="2" indent="-285750">
-              <a:buFontTx/>
-              <a:buChar char="-"/>
-            </a:pPr>
-            <a:r>
-              <a:rPr lang="en-GB" dirty="0">
-                <a:solidFill>
-                  <a:srgbClr val="FF0000"/>
-                </a:solidFill>
-              </a:rPr>
-              <a:t>Fourth cell contains OME formatted metadata]</a:t>
-            </a:r>
-          </a:p>
-          <a:p>
-            <a:pPr marL="285750" lvl="2" indent="-285750">
-              <a:buFontTx/>
-              <a:buChar char="-"/>
-            </a:pPr>
-            <a:endParaRPr lang="en-GB" dirty="0"/>
-          </a:p>
-          <a:p>
-            <a:pPr marL="285750" lvl="2" indent="-285750">
-              <a:buFontTx/>
-              <a:buChar char="-"/>
-            </a:pPr>
-            <a:endParaRPr lang="en-GB" dirty="0"/>
+              <a:t>Core image data</a:t>
+            </a:r>
+          </a:p>
+        </p:txBody>
+      </p:sp>
+      <p:cxnSp>
+        <p:nvCxnSpPr>
+          <p:cNvPr id="9" name="Straight Arrow Connector 8">
+            <a:extLst>
+              <a:ext uri="{FF2B5EF4-FFF2-40B4-BE49-F238E27FC236}">
+                <a16:creationId xmlns:a16="http://schemas.microsoft.com/office/drawing/2014/main" id="{722F2C9D-2413-4869-9E3B-6137B27D0593}"/>
+              </a:ext>
+            </a:extLst>
+          </p:cNvPr>
+          <p:cNvCxnSpPr>
+            <a:cxnSpLocks/>
+          </p:cNvCxnSpPr>
+          <p:nvPr/>
+        </p:nvCxnSpPr>
+        <p:spPr>
+          <a:xfrm>
+            <a:off x="2299279" y="3010233"/>
+            <a:ext cx="0" cy="2500230"/>
+          </a:xfrm>
+          <a:prstGeom prst="straightConnector1">
+            <a:avLst/>
+          </a:prstGeom>
+          <a:ln w="28575">
+            <a:solidFill>
+              <a:srgbClr val="FF0000"/>
+            </a:solidFill>
+            <a:tailEnd type="triangle" w="lg" len="lg"/>
+          </a:ln>
+        </p:spPr>
+        <p:style>
+          <a:lnRef idx="1">
+            <a:schemeClr val="accent1"/>
+          </a:lnRef>
+          <a:fillRef idx="0">
+            <a:schemeClr val="accent1"/>
+          </a:fillRef>
+          <a:effectRef idx="0">
+            <a:schemeClr val="accent1"/>
+          </a:effectRef>
+          <a:fontRef idx="minor">
+            <a:schemeClr val="tx1"/>
+          </a:fontRef>
+        </p:style>
+      </p:cxnSp>
+      <p:sp>
+        <p:nvSpPr>
+          <p:cNvPr id="12" name="Rectangle 11">
+            <a:extLst>
+              <a:ext uri="{FF2B5EF4-FFF2-40B4-BE49-F238E27FC236}">
+                <a16:creationId xmlns:a16="http://schemas.microsoft.com/office/drawing/2014/main" id="{5D789864-6F43-4C66-A19B-D5CD905F5167}"/>
+              </a:ext>
+            </a:extLst>
+          </p:cNvPr>
+          <p:cNvSpPr/>
+          <p:nvPr/>
+        </p:nvSpPr>
+        <p:spPr>
+          <a:xfrm>
+            <a:off x="1803978" y="5529516"/>
+            <a:ext cx="990600" cy="228350"/>
+          </a:xfrm>
+          <a:prstGeom prst="rect">
+            <a:avLst/>
+          </a:prstGeom>
+          <a:noFill/>
+          <a:ln>
+            <a:solidFill>
+              <a:srgbClr val="FF0000"/>
+            </a:solidFill>
+          </a:ln>
+        </p:spPr>
+        <p:style>
+          <a:lnRef idx="2">
+            <a:schemeClr val="accent1">
+              <a:shade val="50000"/>
+            </a:schemeClr>
+          </a:lnRef>
+          <a:fillRef idx="1">
+            <a:schemeClr val="accent1"/>
+          </a:fillRef>
+          <a:effectRef idx="0">
+            <a:schemeClr val="accent1"/>
+          </a:effectRef>
+          <a:fontRef idx="minor">
+            <a:schemeClr val="lt1"/>
+          </a:fontRef>
+        </p:style>
+        <p:txBody>
+          <a:bodyPr rtlCol="0" anchor="ctr"/>
+          <a:lstStyle/>
+          <a:p>
+            <a:pPr algn="ctr"/>
+            <a:endParaRPr lang="en-GB"/>
           </a:p>
         </p:txBody>
       </p:sp>
     </p:spTree>
     <p:extLst>
       <p:ext uri="{BB962C8B-B14F-4D97-AF65-F5344CB8AC3E}">
-        <p14:creationId xmlns:p14="http://schemas.microsoft.com/office/powerpoint/2010/main" val="3864254808"/>
+        <p14:creationId xmlns:p14="http://schemas.microsoft.com/office/powerpoint/2010/main" val="150483821"/>
       </p:ext>
     </p:extLst>
   </p:cSld>
@@ -20146,6 +20139,181 @@
       </p:transition>
     </mc:Fallback>
   </mc:AlternateContent>
+  <p:timing>
+    <p:tnLst>
+      <p:par>
+        <p:cTn id="1" dur="indefinite" restart="never" nodeType="tmRoot">
+          <p:childTnLst>
+            <p:seq concurrent="1" nextAc="seek">
+              <p:cTn id="2" dur="indefinite" nodeType="mainSeq">
+                <p:childTnLst>
+                  <p:par>
+                    <p:cTn id="3" fill="hold">
+                      <p:stCondLst>
+                        <p:cond delay="indefinite"/>
+                      </p:stCondLst>
+                      <p:childTnLst>
+                        <p:par>
+                          <p:cTn id="4" fill="hold">
+                            <p:stCondLst>
+                              <p:cond delay="0"/>
+                            </p:stCondLst>
+                            <p:childTnLst>
+                              <p:par>
+                                <p:cTn id="5" presetID="10" presetClass="entr" presetSubtype="0" fill="hold" grpId="0" nodeType="clickEffect">
+                                  <p:stCondLst>
+                                    <p:cond delay="0"/>
+                                  </p:stCondLst>
+                                  <p:childTnLst>
+                                    <p:set>
+                                      <p:cBhvr>
+                                        <p:cTn id="6" dur="1" fill="hold">
+                                          <p:stCondLst>
+                                            <p:cond delay="0"/>
+                                          </p:stCondLst>
+                                        </p:cTn>
+                                        <p:tgtEl>
+                                          <p:spTgt spid="8"/>
+                                        </p:tgtEl>
+                                        <p:attrNameLst>
+                                          <p:attrName>style.visibility</p:attrName>
+                                        </p:attrNameLst>
+                                      </p:cBhvr>
+                                      <p:to>
+                                        <p:strVal val="visible"/>
+                                      </p:to>
+                                    </p:set>
+                                    <p:animEffect transition="in" filter="fade">
+                                      <p:cBhvr>
+                                        <p:cTn id="7" dur="300"/>
+                                        <p:tgtEl>
+                                          <p:spTgt spid="8"/>
+                                        </p:tgtEl>
+                                      </p:cBhvr>
+                                    </p:animEffect>
+                                  </p:childTnLst>
+                                </p:cTn>
+                              </p:par>
+                              <p:par>
+                                <p:cTn id="8" presetID="10" presetClass="entr" presetSubtype="0" fill="hold" nodeType="withEffect">
+                                  <p:stCondLst>
+                                    <p:cond delay="0"/>
+                                  </p:stCondLst>
+                                  <p:childTnLst>
+                                    <p:set>
+                                      <p:cBhvr>
+                                        <p:cTn id="9" dur="1" fill="hold">
+                                          <p:stCondLst>
+                                            <p:cond delay="0"/>
+                                          </p:stCondLst>
+                                        </p:cTn>
+                                        <p:tgtEl>
+                                          <p:spTgt spid="9"/>
+                                        </p:tgtEl>
+                                        <p:attrNameLst>
+                                          <p:attrName>style.visibility</p:attrName>
+                                        </p:attrNameLst>
+                                      </p:cBhvr>
+                                      <p:to>
+                                        <p:strVal val="visible"/>
+                                      </p:to>
+                                    </p:set>
+                                    <p:animEffect transition="in" filter="fade">
+                                      <p:cBhvr>
+                                        <p:cTn id="10" dur="300"/>
+                                        <p:tgtEl>
+                                          <p:spTgt spid="9"/>
+                                        </p:tgtEl>
+                                      </p:cBhvr>
+                                    </p:animEffect>
+                                  </p:childTnLst>
+                                </p:cTn>
+                              </p:par>
+                            </p:childTnLst>
+                          </p:cTn>
+                        </p:par>
+                      </p:childTnLst>
+                    </p:cTn>
+                  </p:par>
+                  <p:par>
+                    <p:cTn id="11" fill="hold">
+                      <p:stCondLst>
+                        <p:cond delay="indefinite"/>
+                      </p:stCondLst>
+                      <p:childTnLst>
+                        <p:par>
+                          <p:cTn id="12" fill="hold">
+                            <p:stCondLst>
+                              <p:cond delay="0"/>
+                            </p:stCondLst>
+                            <p:childTnLst>
+                              <p:par>
+                                <p:cTn id="13" presetID="10" presetClass="entr" presetSubtype="0" fill="hold" grpId="0" nodeType="clickEffect">
+                                  <p:stCondLst>
+                                    <p:cond delay="0"/>
+                                  </p:stCondLst>
+                                  <p:childTnLst>
+                                    <p:set>
+                                      <p:cBhvr>
+                                        <p:cTn id="14" dur="1" fill="hold">
+                                          <p:stCondLst>
+                                            <p:cond delay="0"/>
+                                          </p:stCondLst>
+                                        </p:cTn>
+                                        <p:tgtEl>
+                                          <p:spTgt spid="12"/>
+                                        </p:tgtEl>
+                                        <p:attrNameLst>
+                                          <p:attrName>style.visibility</p:attrName>
+                                        </p:attrNameLst>
+                                      </p:cBhvr>
+                                      <p:to>
+                                        <p:strVal val="visible"/>
+                                      </p:to>
+                                    </p:set>
+                                    <p:animEffect transition="in" filter="fade">
+                                      <p:cBhvr>
+                                        <p:cTn id="15" dur="300"/>
+                                        <p:tgtEl>
+                                          <p:spTgt spid="12"/>
+                                        </p:tgtEl>
+                                      </p:cBhvr>
+                                    </p:animEffect>
+                                  </p:childTnLst>
+                                </p:cTn>
+                              </p:par>
+                            </p:childTnLst>
+                          </p:cTn>
+                        </p:par>
+                      </p:childTnLst>
+                    </p:cTn>
+                  </p:par>
+                </p:childTnLst>
+              </p:cTn>
+              <p:prevCondLst>
+                <p:cond evt="onPrev" delay="0">
+                  <p:tgtEl>
+                    <p:sldTgt/>
+                  </p:tgtEl>
+                </p:cond>
+              </p:prevCondLst>
+              <p:nextCondLst>
+                <p:cond evt="onNext" delay="0">
+                  <p:tgtEl>
+                    <p:sldTgt/>
+                  </p:tgtEl>
+                </p:cond>
+              </p:nextCondLst>
+            </p:seq>
+          </p:childTnLst>
+        </p:cTn>
+      </p:par>
+    </p:tnLst>
+    <p:bldLst>
+      <p:bldP spid="8" grpId="0"/>
+      <p:bldP spid="12" grpId="0" animBg="1"/>
+    </p:bldLst>
+  </p:timing>
 </p:sld>
 </file>
 
@@ -20171,7 +20339,7 @@
           <p:cNvPr id="2" name="Title 1">
             <a:extLst>
               <a:ext uri="{FF2B5EF4-FFF2-40B4-BE49-F238E27FC236}">
-                <a16:creationId xmlns:a16="http://schemas.microsoft.com/office/drawing/2014/main" id="{297C1240-D4CE-4AD2-96B1-DBD7075D8052}"/>
+                <a16:creationId xmlns:a16="http://schemas.microsoft.com/office/drawing/2014/main" id="{FB0D9636-2B3A-4E3D-9B13-904FF3CE8CE3}"/>
               </a:ext>
             </a:extLst>
           </p:cNvPr>
@@ -20187,7 +20355,10 @@
           <a:bodyPr/>
           <a:lstStyle/>
           <a:p>
-            <a:endParaRPr lang="en-GB"/>
+            <a:r>
+              <a:rPr lang="en-GB" dirty="0"/>
+              <a:t>Bio-Formats and MATLAB</a:t>
+            </a:r>
           </a:p>
         </p:txBody>
       </p:sp>
@@ -20196,7 +20367,7 @@
           <p:cNvPr id="3" name="Content Placeholder 2">
             <a:extLst>
               <a:ext uri="{FF2B5EF4-FFF2-40B4-BE49-F238E27FC236}">
-                <a16:creationId xmlns:a16="http://schemas.microsoft.com/office/drawing/2014/main" id="{7E90A914-5E00-4AAB-802D-4C98FA2788C1}"/>
+                <a16:creationId xmlns:a16="http://schemas.microsoft.com/office/drawing/2014/main" id="{DFE43EAF-8F5E-44D2-BF28-45DAFCB5DD96}"/>
               </a:ext>
             </a:extLst>
           </p:cNvPr>
@@ -20207,53 +20378,536 @@
             <p:ph idx="1"/>
           </p:nvPr>
         </p:nvSpPr>
+        <p:spPr>
+          <a:xfrm>
+            <a:off x="335360" y="1196754"/>
+            <a:ext cx="11404356" cy="4929411"/>
+          </a:xfrm>
+        </p:spPr>
+        <p:txBody>
+          <a:bodyPr/>
+          <a:lstStyle/>
+          <a:p>
+            <a:r>
+              <a:rPr lang="en-GB" dirty="0"/>
+              <a:t>Basic image loading with </a:t>
+            </a:r>
+            <a:r>
+              <a:rPr lang="en-GB" i="1" dirty="0" err="1">
+                <a:solidFill>
+                  <a:schemeClr val="accent1"/>
+                </a:solidFill>
+              </a:rPr>
+              <a:t>bfopen</a:t>
+            </a:r>
+            <a:endParaRPr lang="en-GB" i="1" dirty="0">
+              <a:solidFill>
+                <a:schemeClr val="accent1"/>
+              </a:solidFill>
+            </a:endParaRPr>
+          </a:p>
+          <a:p>
+            <a:pPr lvl="1"/>
+            <a:r>
+              <a:rPr lang="en-GB" dirty="0">
+                <a:solidFill>
+                  <a:srgbClr val="C00000"/>
+                </a:solidFill>
+              </a:rPr>
+              <a:t>Outputs nested cell structure with one row per series</a:t>
+            </a:r>
+          </a:p>
+          <a:p>
+            <a:pPr lvl="1"/>
+            <a:endParaRPr lang="en-GB" sz="1200" i="1" dirty="0">
+              <a:solidFill>
+                <a:srgbClr val="C00000"/>
+              </a:solidFill>
+            </a:endParaRPr>
+          </a:p>
+          <a:p>
+            <a:endParaRPr lang="en-GB" i="1" dirty="0">
+              <a:solidFill>
+                <a:srgbClr val="C00000"/>
+              </a:solidFill>
+            </a:endParaRPr>
+          </a:p>
+          <a:p>
+            <a:endParaRPr lang="en-GB" dirty="0">
+              <a:solidFill>
+                <a:srgbClr val="C00000"/>
+              </a:solidFill>
+            </a:endParaRPr>
+          </a:p>
+          <a:p>
+            <a:pPr marL="914400" lvl="2" indent="0">
+              <a:buNone/>
+            </a:pPr>
+            <a:endParaRPr lang="en-GB" dirty="0">
+              <a:solidFill>
+                <a:srgbClr val="C00000"/>
+              </a:solidFill>
+            </a:endParaRPr>
+          </a:p>
+          <a:p>
+            <a:pPr lvl="1"/>
+            <a:endParaRPr lang="en-GB" dirty="0"/>
+          </a:p>
+        </p:txBody>
+      </p:sp>
+      <p:pic>
+        <p:nvPicPr>
+          <p:cNvPr id="4" name="Picture 3">
+            <a:extLst>
+              <a:ext uri="{FF2B5EF4-FFF2-40B4-BE49-F238E27FC236}">
+                <a16:creationId xmlns:a16="http://schemas.microsoft.com/office/drawing/2014/main" id="{0B7C4C01-A85C-4AED-9728-320282EA0375}"/>
+              </a:ext>
+            </a:extLst>
+          </p:cNvPr>
+          <p:cNvPicPr>
+            <a:picLocks noChangeAspect="1"/>
+          </p:cNvPicPr>
+          <p:nvPr/>
+        </p:nvPicPr>
+        <p:blipFill>
+          <a:blip r:embed="rId2"/>
+          <a:stretch>
+            <a:fillRect/>
+          </a:stretch>
+        </p:blipFill>
+        <p:spPr>
+          <a:xfrm>
+            <a:off x="1191238" y="3183983"/>
+            <a:ext cx="9809524" cy="2857143"/>
+          </a:xfrm>
+          <a:prstGeom prst="rect">
+            <a:avLst/>
+          </a:prstGeom>
+          <a:ln w="12700">
+            <a:solidFill>
+              <a:srgbClr val="C00000"/>
+            </a:solidFill>
+          </a:ln>
+        </p:spPr>
+      </p:pic>
+      <p:sp>
+        <p:nvSpPr>
+          <p:cNvPr id="8" name="TextBox 7">
+            <a:extLst>
+              <a:ext uri="{FF2B5EF4-FFF2-40B4-BE49-F238E27FC236}">
+                <a16:creationId xmlns:a16="http://schemas.microsoft.com/office/drawing/2014/main" id="{6BE922B2-67E8-47AC-AF07-F6EA0C29FFFC}"/>
+              </a:ext>
+            </a:extLst>
+          </p:cNvPr>
+          <p:cNvSpPr txBox="1"/>
+          <p:nvPr/>
+        </p:nvSpPr>
+        <p:spPr>
+          <a:xfrm>
+            <a:off x="863094" y="2181299"/>
+            <a:ext cx="3286120" cy="830997"/>
+          </a:xfrm>
+          <a:prstGeom prst="rect">
+            <a:avLst/>
+          </a:prstGeom>
+          <a:noFill/>
+        </p:spPr>
+        <p:txBody>
+          <a:bodyPr wrap="square" rtlCol="0">
+            <a:spAutoFit/>
+          </a:bodyPr>
+          <a:lstStyle/>
+          <a:p>
+            <a:pPr algn="ctr"/>
+            <a:r>
+              <a:rPr lang="en-GB" sz="2400" dirty="0">
+                <a:solidFill>
+                  <a:srgbClr val="FF0000"/>
+                </a:solidFill>
+              </a:rPr>
+              <a:t>Image pixel data</a:t>
+            </a:r>
+          </a:p>
+          <a:p>
+            <a:pPr algn="ctr"/>
+            <a:r>
+              <a:rPr lang="en-GB" sz="2400" dirty="0">
+                <a:solidFill>
+                  <a:srgbClr val="FF0000"/>
+                </a:solidFill>
+              </a:rPr>
+              <a:t>(one row per image)</a:t>
+            </a:r>
+          </a:p>
+        </p:txBody>
+      </p:sp>
+      <p:cxnSp>
+        <p:nvCxnSpPr>
+          <p:cNvPr id="9" name="Straight Arrow Connector 8">
+            <a:extLst>
+              <a:ext uri="{FF2B5EF4-FFF2-40B4-BE49-F238E27FC236}">
+                <a16:creationId xmlns:a16="http://schemas.microsoft.com/office/drawing/2014/main" id="{78EA699F-6C47-4EDB-9CD8-60096D04C7E5}"/>
+              </a:ext>
+            </a:extLst>
+          </p:cNvPr>
+          <p:cNvCxnSpPr>
+            <a:cxnSpLocks/>
+          </p:cNvCxnSpPr>
+          <p:nvPr/>
+        </p:nvCxnSpPr>
+        <p:spPr>
+          <a:xfrm>
+            <a:off x="2506154" y="3010233"/>
+            <a:ext cx="0" cy="1610928"/>
+          </a:xfrm>
+          <a:prstGeom prst="straightConnector1">
+            <a:avLst/>
+          </a:prstGeom>
+          <a:ln w="28575">
+            <a:solidFill>
+              <a:srgbClr val="FF0000"/>
+            </a:solidFill>
+            <a:tailEnd type="triangle" w="lg" len="lg"/>
+          </a:ln>
+        </p:spPr>
+        <p:style>
+          <a:lnRef idx="1">
+            <a:schemeClr val="accent1"/>
+          </a:lnRef>
+          <a:fillRef idx="0">
+            <a:schemeClr val="accent1"/>
+          </a:fillRef>
+          <a:effectRef idx="0">
+            <a:schemeClr val="accent1"/>
+          </a:effectRef>
+          <a:fontRef idx="minor">
+            <a:schemeClr val="tx1"/>
+          </a:fontRef>
+        </p:style>
+      </p:cxnSp>
+    </p:spTree>
+    <p:extLst>
+      <p:ext uri="{BB962C8B-B14F-4D97-AF65-F5344CB8AC3E}">
+        <p14:creationId xmlns:p14="http://schemas.microsoft.com/office/powerpoint/2010/main" val="389907166"/>
+      </p:ext>
+    </p:extLst>
+  </p:cSld>
+  <p:clrMapOvr>
+    <a:masterClrMapping/>
+  </p:clrMapOvr>
+  <mc:AlternateContent xmlns:mc="http://schemas.openxmlformats.org/markup-compatibility/2006" xmlns:p14="http://schemas.microsoft.com/office/powerpoint/2010/main">
+    <mc:Choice Requires="p14">
+      <p:transition p14:dur="300">
+        <p:fade/>
+      </p:transition>
+    </mc:Choice>
+    <mc:Fallback xmlns="">
+      <p:transition>
+        <p:fade/>
+      </p:transition>
+    </mc:Fallback>
+  </mc:AlternateContent>
+  <p:timing>
+    <p:tnLst>
+      <p:par>
+        <p:cTn id="1" dur="indefinite" restart="never" nodeType="tmRoot">
+          <p:childTnLst>
+            <p:seq concurrent="1" nextAc="seek">
+              <p:cTn id="2" dur="indefinite" nodeType="mainSeq">
+                <p:childTnLst>
+                  <p:par>
+                    <p:cTn id="3" fill="hold">
+                      <p:stCondLst>
+                        <p:cond delay="indefinite"/>
+                      </p:stCondLst>
+                      <p:childTnLst>
+                        <p:par>
+                          <p:cTn id="4" fill="hold">
+                            <p:stCondLst>
+                              <p:cond delay="0"/>
+                            </p:stCondLst>
+                            <p:childTnLst>
+                              <p:par>
+                                <p:cTn id="5" presetID="10" presetClass="entr" presetSubtype="0" fill="hold" grpId="0" nodeType="clickEffect">
+                                  <p:stCondLst>
+                                    <p:cond delay="0"/>
+                                  </p:stCondLst>
+                                  <p:childTnLst>
+                                    <p:set>
+                                      <p:cBhvr>
+                                        <p:cTn id="6" dur="1" fill="hold">
+                                          <p:stCondLst>
+                                            <p:cond delay="0"/>
+                                          </p:stCondLst>
+                                        </p:cTn>
+                                        <p:tgtEl>
+                                          <p:spTgt spid="8"/>
+                                        </p:tgtEl>
+                                        <p:attrNameLst>
+                                          <p:attrName>style.visibility</p:attrName>
+                                        </p:attrNameLst>
+                                      </p:cBhvr>
+                                      <p:to>
+                                        <p:strVal val="visible"/>
+                                      </p:to>
+                                    </p:set>
+                                    <p:animEffect transition="in" filter="fade">
+                                      <p:cBhvr>
+                                        <p:cTn id="7" dur="300"/>
+                                        <p:tgtEl>
+                                          <p:spTgt spid="8"/>
+                                        </p:tgtEl>
+                                      </p:cBhvr>
+                                    </p:animEffect>
+                                  </p:childTnLst>
+                                </p:cTn>
+                              </p:par>
+                              <p:par>
+                                <p:cTn id="8" presetID="10" presetClass="entr" presetSubtype="0" fill="hold" nodeType="withEffect">
+                                  <p:stCondLst>
+                                    <p:cond delay="0"/>
+                                  </p:stCondLst>
+                                  <p:childTnLst>
+                                    <p:set>
+                                      <p:cBhvr>
+                                        <p:cTn id="9" dur="1" fill="hold">
+                                          <p:stCondLst>
+                                            <p:cond delay="0"/>
+                                          </p:stCondLst>
+                                        </p:cTn>
+                                        <p:tgtEl>
+                                          <p:spTgt spid="9"/>
+                                        </p:tgtEl>
+                                        <p:attrNameLst>
+                                          <p:attrName>style.visibility</p:attrName>
+                                        </p:attrNameLst>
+                                      </p:cBhvr>
+                                      <p:to>
+                                        <p:strVal val="visible"/>
+                                      </p:to>
+                                    </p:set>
+                                    <p:animEffect transition="in" filter="fade">
+                                      <p:cBhvr>
+                                        <p:cTn id="10" dur="300"/>
+                                        <p:tgtEl>
+                                          <p:spTgt spid="9"/>
+                                        </p:tgtEl>
+                                      </p:cBhvr>
+                                    </p:animEffect>
+                                  </p:childTnLst>
+                                </p:cTn>
+                              </p:par>
+                            </p:childTnLst>
+                          </p:cTn>
+                        </p:par>
+                      </p:childTnLst>
+                    </p:cTn>
+                  </p:par>
+                </p:childTnLst>
+              </p:cTn>
+              <p:prevCondLst>
+                <p:cond evt="onPrev" delay="0">
+                  <p:tgtEl>
+                    <p:sldTgt/>
+                  </p:tgtEl>
+                </p:cond>
+              </p:prevCondLst>
+              <p:nextCondLst>
+                <p:cond evt="onNext" delay="0">
+                  <p:tgtEl>
+                    <p:sldTgt/>
+                  </p:tgtEl>
+                </p:cond>
+              </p:nextCondLst>
+            </p:seq>
+          </p:childTnLst>
+        </p:cTn>
+      </p:par>
+    </p:tnLst>
+    <p:bldLst>
+      <p:bldP spid="8" grpId="0"/>
+    </p:bldLst>
+  </p:timing>
+</p:sld>
+</file>
+
+<file path=ppt/slides/slide48.xml><?xml version="1.0" encoding="utf-8"?>
+<p:sld xmlns:a="http://schemas.openxmlformats.org/drawingml/2006/main" xmlns:r="http://schemas.openxmlformats.org/officeDocument/2006/relationships" xmlns:p="http://schemas.openxmlformats.org/presentationml/2006/main">
+  <p:cSld>
+    <p:spTree>
+      <p:nvGrpSpPr>
+        <p:cNvPr id="1" name=""/>
+        <p:cNvGrpSpPr/>
+        <p:nvPr/>
+      </p:nvGrpSpPr>
+      <p:grpSpPr>
+        <a:xfrm>
+          <a:off x="0" y="0"/>
+          <a:ext cx="0" cy="0"/>
+          <a:chOff x="0" y="0"/>
+          <a:chExt cx="0" cy="0"/>
+        </a:xfrm>
+      </p:grpSpPr>
+      <p:sp>
+        <p:nvSpPr>
+          <p:cNvPr id="2" name="Title 1">
+            <a:extLst>
+              <a:ext uri="{FF2B5EF4-FFF2-40B4-BE49-F238E27FC236}">
+                <a16:creationId xmlns:a16="http://schemas.microsoft.com/office/drawing/2014/main" id="{FB0D9636-2B3A-4E3D-9B13-904FF3CE8CE3}"/>
+              </a:ext>
+            </a:extLst>
+          </p:cNvPr>
+          <p:cNvSpPr>
+            <a:spLocks noGrp="1"/>
+          </p:cNvSpPr>
+          <p:nvPr>
+            <p:ph type="title"/>
+          </p:nvPr>
+        </p:nvSpPr>
         <p:spPr/>
         <p:txBody>
           <a:bodyPr/>
           <a:lstStyle/>
           <a:p>
             <a:r>
-              <a:rPr lang="en-GB" sz="2400" dirty="0"/>
-              <a:t>[Maybe do this after OOP, as BF has OOP format]</a:t>
-            </a:r>
-          </a:p>
-          <a:p>
-            <a:r>
-              <a:rPr lang="en-GB" sz="2400" dirty="0"/>
-              <a:t>Method of getting Bio-Formats to work</a:t>
-            </a:r>
-          </a:p>
-          <a:p>
-            <a:pPr lvl="1"/>
-            <a:r>
-              <a:rPr lang="en-GB" sz="2000" dirty="0"/>
-              <a:t>Running a basic LIF import</a:t>
-            </a:r>
-          </a:p>
-          <a:p>
-            <a:pPr lvl="1"/>
-            <a:r>
-              <a:rPr lang="en-GB" sz="2000" dirty="0"/>
-              <a:t>Dealing with multiple series</a:t>
-            </a:r>
-          </a:p>
-          <a:p>
-            <a:pPr lvl="1"/>
-            <a:r>
-              <a:rPr lang="en-GB" sz="2000" dirty="0"/>
-              <a:t>Dealing with metadata</a:t>
-            </a:r>
-          </a:p>
-          <a:p>
-            <a:pPr lvl="1"/>
-            <a:endParaRPr lang="en-GB" sz="2000" dirty="0"/>
+              <a:rPr lang="en-GB" dirty="0"/>
+              <a:t>Bio-Formats and MATLAB</a:t>
+            </a:r>
           </a:p>
         </p:txBody>
       </p:sp>
+      <p:sp>
+        <p:nvSpPr>
+          <p:cNvPr id="3" name="Content Placeholder 2">
+            <a:extLst>
+              <a:ext uri="{FF2B5EF4-FFF2-40B4-BE49-F238E27FC236}">
+                <a16:creationId xmlns:a16="http://schemas.microsoft.com/office/drawing/2014/main" id="{DFE43EAF-8F5E-44D2-BF28-45DAFCB5DD96}"/>
+              </a:ext>
+            </a:extLst>
+          </p:cNvPr>
+          <p:cNvSpPr>
+            <a:spLocks noGrp="1"/>
+          </p:cNvSpPr>
+          <p:nvPr>
+            <p:ph idx="1"/>
+          </p:nvPr>
+        </p:nvSpPr>
+        <p:spPr>
+          <a:xfrm>
+            <a:off x="335360" y="1196754"/>
+            <a:ext cx="11433853" cy="4929411"/>
+          </a:xfrm>
+        </p:spPr>
+        <p:txBody>
+          <a:bodyPr/>
+          <a:lstStyle/>
+          <a:p>
+            <a:r>
+              <a:rPr lang="en-GB" dirty="0"/>
+              <a:t>Basic image loading with </a:t>
+            </a:r>
+            <a:r>
+              <a:rPr lang="en-GB" i="1" dirty="0" err="1">
+                <a:solidFill>
+                  <a:schemeClr val="accent1"/>
+                </a:solidFill>
+              </a:rPr>
+              <a:t>bfopen</a:t>
+            </a:r>
+            <a:endParaRPr lang="en-GB" i="1" dirty="0">
+              <a:solidFill>
+                <a:schemeClr val="accent1"/>
+              </a:solidFill>
+            </a:endParaRPr>
+          </a:p>
+          <a:p>
+            <a:pPr lvl="1"/>
+            <a:r>
+              <a:rPr lang="en-GB" dirty="0">
+                <a:solidFill>
+                  <a:srgbClr val="C00000"/>
+                </a:solidFill>
+              </a:rPr>
+              <a:t>Outputs nested cell structure with one row per series</a:t>
+            </a:r>
+          </a:p>
+          <a:p>
+            <a:pPr lvl="1"/>
+            <a:endParaRPr lang="en-GB" sz="1200" i="1" dirty="0">
+              <a:solidFill>
+                <a:srgbClr val="C00000"/>
+              </a:solidFill>
+            </a:endParaRPr>
+          </a:p>
+          <a:p>
+            <a:endParaRPr lang="en-GB" i="1" dirty="0">
+              <a:solidFill>
+                <a:srgbClr val="C00000"/>
+              </a:solidFill>
+            </a:endParaRPr>
+          </a:p>
+          <a:p>
+            <a:endParaRPr lang="en-GB" dirty="0">
+              <a:solidFill>
+                <a:srgbClr val="C00000"/>
+              </a:solidFill>
+            </a:endParaRPr>
+          </a:p>
+          <a:p>
+            <a:pPr marL="914400" lvl="2" indent="0">
+              <a:buNone/>
+            </a:pPr>
+            <a:endParaRPr lang="en-GB" dirty="0">
+              <a:solidFill>
+                <a:srgbClr val="C00000"/>
+              </a:solidFill>
+            </a:endParaRPr>
+          </a:p>
+          <a:p>
+            <a:pPr lvl="1"/>
+            <a:endParaRPr lang="en-GB" dirty="0"/>
+          </a:p>
+        </p:txBody>
+      </p:sp>
+      <p:pic>
+        <p:nvPicPr>
+          <p:cNvPr id="13" name="Picture 12">
+            <a:extLst>
+              <a:ext uri="{FF2B5EF4-FFF2-40B4-BE49-F238E27FC236}">
+                <a16:creationId xmlns:a16="http://schemas.microsoft.com/office/drawing/2014/main" id="{D1401F43-13AF-47DC-8482-95D48E32B29B}"/>
+              </a:ext>
+            </a:extLst>
+          </p:cNvPr>
+          <p:cNvPicPr>
+            <a:picLocks noChangeAspect="1"/>
+          </p:cNvPicPr>
+          <p:nvPr/>
+        </p:nvPicPr>
+        <p:blipFill>
+          <a:blip r:embed="rId2"/>
+          <a:stretch>
+            <a:fillRect/>
+          </a:stretch>
+        </p:blipFill>
+        <p:spPr>
+          <a:xfrm>
+            <a:off x="1189940" y="3183227"/>
+            <a:ext cx="9812119" cy="2857899"/>
+          </a:xfrm>
+          <a:prstGeom prst="rect">
+            <a:avLst/>
+          </a:prstGeom>
+          <a:ln w="12700">
+            <a:solidFill>
+              <a:srgbClr val="C00000"/>
+            </a:solidFill>
+          </a:ln>
+        </p:spPr>
+      </p:pic>
     </p:spTree>
     <p:extLst>
       <p:ext uri="{BB962C8B-B14F-4D97-AF65-F5344CB8AC3E}">
-        <p14:creationId xmlns:p14="http://schemas.microsoft.com/office/powerpoint/2010/main" val="677120248"/>
+        <p14:creationId xmlns:p14="http://schemas.microsoft.com/office/powerpoint/2010/main" val="2692703614"/>
       </p:ext>
     </p:extLst>
   </p:cSld>
@@ -20275,7 +20929,3043 @@
 </p:sld>
 </file>
 
-<file path=ppt/slides/slide48.xml><?xml version="1.0" encoding="utf-8"?>
+<file path=ppt/slides/slide49.xml><?xml version="1.0" encoding="utf-8"?>
+<p:sld xmlns:a="http://schemas.openxmlformats.org/drawingml/2006/main" xmlns:r="http://schemas.openxmlformats.org/officeDocument/2006/relationships" xmlns:p="http://schemas.openxmlformats.org/presentationml/2006/main">
+  <p:cSld>
+    <p:spTree>
+      <p:nvGrpSpPr>
+        <p:cNvPr id="1" name=""/>
+        <p:cNvGrpSpPr/>
+        <p:nvPr/>
+      </p:nvGrpSpPr>
+      <p:grpSpPr>
+        <a:xfrm>
+          <a:off x="0" y="0"/>
+          <a:ext cx="0" cy="0"/>
+          <a:chOff x="0" y="0"/>
+          <a:chExt cx="0" cy="0"/>
+        </a:xfrm>
+      </p:grpSpPr>
+      <p:sp>
+        <p:nvSpPr>
+          <p:cNvPr id="2" name="Title 1">
+            <a:extLst>
+              <a:ext uri="{FF2B5EF4-FFF2-40B4-BE49-F238E27FC236}">
+                <a16:creationId xmlns:a16="http://schemas.microsoft.com/office/drawing/2014/main" id="{FB0D9636-2B3A-4E3D-9B13-904FF3CE8CE3}"/>
+              </a:ext>
+            </a:extLst>
+          </p:cNvPr>
+          <p:cNvSpPr>
+            <a:spLocks noGrp="1"/>
+          </p:cNvSpPr>
+          <p:nvPr>
+            <p:ph type="title"/>
+          </p:nvPr>
+        </p:nvSpPr>
+        <p:spPr/>
+        <p:txBody>
+          <a:bodyPr/>
+          <a:lstStyle/>
+          <a:p>
+            <a:r>
+              <a:rPr lang="en-GB" dirty="0"/>
+              <a:t>Bio-Formats and MATLAB</a:t>
+            </a:r>
+          </a:p>
+        </p:txBody>
+      </p:sp>
+      <p:sp>
+        <p:nvSpPr>
+          <p:cNvPr id="3" name="Content Placeholder 2">
+            <a:extLst>
+              <a:ext uri="{FF2B5EF4-FFF2-40B4-BE49-F238E27FC236}">
+                <a16:creationId xmlns:a16="http://schemas.microsoft.com/office/drawing/2014/main" id="{DFE43EAF-8F5E-44D2-BF28-45DAFCB5DD96}"/>
+              </a:ext>
+            </a:extLst>
+          </p:cNvPr>
+          <p:cNvSpPr>
+            <a:spLocks noGrp="1"/>
+          </p:cNvSpPr>
+          <p:nvPr>
+            <p:ph idx="1"/>
+          </p:nvPr>
+        </p:nvSpPr>
+        <p:spPr>
+          <a:xfrm>
+            <a:off x="335360" y="1196754"/>
+            <a:ext cx="11483014" cy="4929411"/>
+          </a:xfrm>
+        </p:spPr>
+        <p:txBody>
+          <a:bodyPr/>
+          <a:lstStyle/>
+          <a:p>
+            <a:r>
+              <a:rPr lang="en-GB" dirty="0"/>
+              <a:t>Basic image loading with </a:t>
+            </a:r>
+            <a:r>
+              <a:rPr lang="en-GB" i="1" dirty="0" err="1">
+                <a:solidFill>
+                  <a:schemeClr val="accent1"/>
+                </a:solidFill>
+              </a:rPr>
+              <a:t>bfopen</a:t>
+            </a:r>
+            <a:endParaRPr lang="en-GB" i="1" dirty="0">
+              <a:solidFill>
+                <a:schemeClr val="accent1"/>
+              </a:solidFill>
+            </a:endParaRPr>
+          </a:p>
+          <a:p>
+            <a:pPr lvl="1"/>
+            <a:r>
+              <a:rPr lang="en-GB" dirty="0">
+                <a:solidFill>
+                  <a:srgbClr val="C00000"/>
+                </a:solidFill>
+              </a:rPr>
+              <a:t>Outputs nested cell structure with one row per series</a:t>
+            </a:r>
+          </a:p>
+          <a:p>
+            <a:pPr lvl="1"/>
+            <a:endParaRPr lang="en-GB" sz="1200" i="1" dirty="0">
+              <a:solidFill>
+                <a:srgbClr val="C00000"/>
+              </a:solidFill>
+            </a:endParaRPr>
+          </a:p>
+          <a:p>
+            <a:endParaRPr lang="en-GB" i="1" dirty="0">
+              <a:solidFill>
+                <a:srgbClr val="C00000"/>
+              </a:solidFill>
+            </a:endParaRPr>
+          </a:p>
+          <a:p>
+            <a:endParaRPr lang="en-GB" dirty="0">
+              <a:solidFill>
+                <a:srgbClr val="C00000"/>
+              </a:solidFill>
+            </a:endParaRPr>
+          </a:p>
+          <a:p>
+            <a:pPr marL="914400" lvl="2" indent="0">
+              <a:buNone/>
+            </a:pPr>
+            <a:endParaRPr lang="en-GB" dirty="0">
+              <a:solidFill>
+                <a:srgbClr val="C00000"/>
+              </a:solidFill>
+            </a:endParaRPr>
+          </a:p>
+          <a:p>
+            <a:pPr lvl="1"/>
+            <a:endParaRPr lang="en-GB" dirty="0"/>
+          </a:p>
+        </p:txBody>
+      </p:sp>
+      <p:pic>
+        <p:nvPicPr>
+          <p:cNvPr id="6" name="Picture 5">
+            <a:extLst>
+              <a:ext uri="{FF2B5EF4-FFF2-40B4-BE49-F238E27FC236}">
+                <a16:creationId xmlns:a16="http://schemas.microsoft.com/office/drawing/2014/main" id="{39BC66F3-F19A-400A-8C3C-37382DBA86C5}"/>
+              </a:ext>
+            </a:extLst>
+          </p:cNvPr>
+          <p:cNvPicPr>
+            <a:picLocks noChangeAspect="1"/>
+          </p:cNvPicPr>
+          <p:nvPr/>
+        </p:nvPicPr>
+        <p:blipFill>
+          <a:blip r:embed="rId2"/>
+          <a:stretch>
+            <a:fillRect/>
+          </a:stretch>
+        </p:blipFill>
+        <p:spPr>
+          <a:xfrm>
+            <a:off x="1189940" y="2325858"/>
+            <a:ext cx="9812119" cy="3715268"/>
+          </a:xfrm>
+          <a:prstGeom prst="rect">
+            <a:avLst/>
+          </a:prstGeom>
+          <a:ln w="12700">
+            <a:solidFill>
+              <a:srgbClr val="C00000"/>
+            </a:solidFill>
+          </a:ln>
+        </p:spPr>
+      </p:pic>
+    </p:spTree>
+    <p:extLst>
+      <p:ext uri="{BB962C8B-B14F-4D97-AF65-F5344CB8AC3E}">
+        <p14:creationId xmlns:p14="http://schemas.microsoft.com/office/powerpoint/2010/main" val="1005953448"/>
+      </p:ext>
+    </p:extLst>
+  </p:cSld>
+  <p:clrMapOvr>
+    <a:masterClrMapping/>
+  </p:clrMapOvr>
+  <mc:AlternateContent xmlns:mc="http://schemas.openxmlformats.org/markup-compatibility/2006" xmlns:p14="http://schemas.microsoft.com/office/powerpoint/2010/main">
+    <mc:Choice Requires="p14">
+      <p:transition p14:dur="300">
+        <p:fade/>
+      </p:transition>
+    </mc:Choice>
+    <mc:Fallback xmlns="">
+      <p:transition>
+        <p:fade/>
+      </p:transition>
+    </mc:Fallback>
+  </mc:AlternateContent>
+</p:sld>
+</file>
+
+<file path=ppt/slides/slide5.xml><?xml version="1.0" encoding="utf-8"?>
+<p:sld xmlns:a="http://schemas.openxmlformats.org/drawingml/2006/main" xmlns:r="http://schemas.openxmlformats.org/officeDocument/2006/relationships" xmlns:p="http://schemas.openxmlformats.org/presentationml/2006/main">
+  <p:cSld>
+    <p:spTree>
+      <p:nvGrpSpPr>
+        <p:cNvPr id="1" name=""/>
+        <p:cNvGrpSpPr/>
+        <p:nvPr/>
+      </p:nvGrpSpPr>
+      <p:grpSpPr>
+        <a:xfrm>
+          <a:off x="0" y="0"/>
+          <a:ext cx="0" cy="0"/>
+          <a:chOff x="0" y="0"/>
+          <a:chExt cx="0" cy="0"/>
+        </a:xfrm>
+      </p:grpSpPr>
+      <p:sp>
+        <p:nvSpPr>
+          <p:cNvPr id="2" name="Title 1">
+            <a:extLst>
+              <a:ext uri="{FF2B5EF4-FFF2-40B4-BE49-F238E27FC236}">
+                <a16:creationId xmlns:a16="http://schemas.microsoft.com/office/drawing/2014/main" id="{FB0D9636-2B3A-4E3D-9B13-904FF3CE8CE3}"/>
+              </a:ext>
+            </a:extLst>
+          </p:cNvPr>
+          <p:cNvSpPr>
+            <a:spLocks noGrp="1"/>
+          </p:cNvSpPr>
+          <p:nvPr>
+            <p:ph type="title"/>
+          </p:nvPr>
+        </p:nvSpPr>
+        <p:spPr/>
+        <p:txBody>
+          <a:bodyPr/>
+          <a:lstStyle/>
+          <a:p>
+            <a:r>
+              <a:rPr lang="en-GB" dirty="0"/>
+              <a:t>Advanced data structures</a:t>
+            </a:r>
+          </a:p>
+        </p:txBody>
+      </p:sp>
+      <p:sp>
+        <p:nvSpPr>
+          <p:cNvPr id="3" name="Content Placeholder 2">
+            <a:extLst>
+              <a:ext uri="{FF2B5EF4-FFF2-40B4-BE49-F238E27FC236}">
+                <a16:creationId xmlns:a16="http://schemas.microsoft.com/office/drawing/2014/main" id="{DFE43EAF-8F5E-44D2-BF28-45DAFCB5DD96}"/>
+              </a:ext>
+            </a:extLst>
+          </p:cNvPr>
+          <p:cNvSpPr>
+            <a:spLocks noGrp="1"/>
+          </p:cNvSpPr>
+          <p:nvPr>
+            <p:ph idx="1"/>
+          </p:nvPr>
+        </p:nvSpPr>
+        <p:spPr/>
+        <p:txBody>
+          <a:bodyPr/>
+          <a:lstStyle/>
+          <a:p>
+            <a:r>
+              <a:rPr lang="en-GB" dirty="0"/>
+              <a:t>Arrays and matrices recap</a:t>
+            </a:r>
+          </a:p>
+          <a:p>
+            <a:pPr lvl="1"/>
+            <a:r>
+              <a:rPr lang="en-GB" dirty="0"/>
+              <a:t>Arrays are a regular grid of numbers in N dimensions</a:t>
+            </a:r>
+          </a:p>
+          <a:p>
+            <a:pPr lvl="1"/>
+            <a:r>
+              <a:rPr lang="en-GB" dirty="0"/>
+              <a:t>Vectors are 1D arrays, matrices are 2D arrays</a:t>
+            </a:r>
+          </a:p>
+          <a:p>
+            <a:pPr lvl="1"/>
+            <a:r>
+              <a:rPr lang="en-GB" dirty="0">
+                <a:sym typeface="Wingdings" panose="05000000000000000000" pitchFamily="2" charset="2"/>
+              </a:rPr>
+              <a:t> </a:t>
+            </a:r>
+            <a:r>
+              <a:rPr lang="en-GB" dirty="0"/>
+              <a:t>Fast access to subsets via indexing</a:t>
+            </a:r>
+          </a:p>
+          <a:p>
+            <a:pPr lvl="1"/>
+            <a:r>
+              <a:rPr lang="en-GB" dirty="0">
+                <a:sym typeface="Wingdings" panose="05000000000000000000" pitchFamily="2" charset="2"/>
+              </a:rPr>
+              <a:t> </a:t>
+            </a:r>
+            <a:r>
+              <a:rPr lang="en-GB" dirty="0"/>
+              <a:t>Fast calculations on all values</a:t>
+            </a:r>
+          </a:p>
+          <a:p>
+            <a:pPr lvl="1"/>
+            <a:r>
+              <a:rPr lang="en-GB" dirty="0">
+                <a:sym typeface="Wingdings" panose="05000000000000000000" pitchFamily="2" charset="2"/>
+              </a:rPr>
+              <a:t> </a:t>
+            </a:r>
+            <a:r>
+              <a:rPr lang="en-GB" dirty="0"/>
+              <a:t>Can only store numeric values</a:t>
+            </a:r>
+          </a:p>
+          <a:p>
+            <a:pPr lvl="1"/>
+            <a:endParaRPr lang="en-GB" sz="1200" dirty="0"/>
+          </a:p>
+          <a:p>
+            <a:r>
+              <a:rPr lang="en-GB" dirty="0"/>
+              <a:t>Alternatives for mixed data types</a:t>
+            </a:r>
+          </a:p>
+          <a:p>
+            <a:pPr lvl="1"/>
+            <a:r>
+              <a:rPr lang="en-GB" dirty="0"/>
+              <a:t>Cell arrays</a:t>
+            </a:r>
+          </a:p>
+          <a:p>
+            <a:pPr lvl="1"/>
+            <a:r>
+              <a:rPr lang="en-GB" dirty="0"/>
+              <a:t>Tables</a:t>
+            </a:r>
+          </a:p>
+          <a:p>
+            <a:pPr lvl="1"/>
+            <a:r>
+              <a:rPr lang="en-GB" dirty="0"/>
+              <a:t>Structure arrays (aka “structs”)</a:t>
+            </a:r>
+          </a:p>
+          <a:p>
+            <a:pPr marL="457200" lvl="1" indent="0">
+              <a:buNone/>
+            </a:pPr>
+            <a:endParaRPr lang="en-GB" dirty="0"/>
+          </a:p>
+          <a:p>
+            <a:pPr lvl="1"/>
+            <a:endParaRPr lang="en-GB" dirty="0"/>
+          </a:p>
+          <a:p>
+            <a:pPr lvl="1"/>
+            <a:endParaRPr lang="en-GB" dirty="0"/>
+          </a:p>
+        </p:txBody>
+      </p:sp>
+    </p:spTree>
+    <p:extLst>
+      <p:ext uri="{BB962C8B-B14F-4D97-AF65-F5344CB8AC3E}">
+        <p14:creationId xmlns:p14="http://schemas.microsoft.com/office/powerpoint/2010/main" val="875391173"/>
+      </p:ext>
+    </p:extLst>
+  </p:cSld>
+  <p:clrMapOvr>
+    <a:masterClrMapping/>
+  </p:clrMapOvr>
+  <mc:AlternateContent xmlns:mc="http://schemas.openxmlformats.org/markup-compatibility/2006" xmlns:p14="http://schemas.microsoft.com/office/powerpoint/2010/main">
+    <mc:Choice Requires="p14">
+      <p:transition p14:dur="300">
+        <p:fade/>
+      </p:transition>
+    </mc:Choice>
+    <mc:Fallback xmlns="">
+      <p:transition>
+        <p:fade/>
+      </p:transition>
+    </mc:Fallback>
+  </mc:AlternateContent>
+</p:sld>
+</file>
+
+<file path=ppt/slides/slide50.xml><?xml version="1.0" encoding="utf-8"?>
+<p:sld xmlns:a="http://schemas.openxmlformats.org/drawingml/2006/main" xmlns:r="http://schemas.openxmlformats.org/officeDocument/2006/relationships" xmlns:p="http://schemas.openxmlformats.org/presentationml/2006/main">
+  <p:cSld>
+    <p:spTree>
+      <p:nvGrpSpPr>
+        <p:cNvPr id="1" name=""/>
+        <p:cNvGrpSpPr/>
+        <p:nvPr/>
+      </p:nvGrpSpPr>
+      <p:grpSpPr>
+        <a:xfrm>
+          <a:off x="0" y="0"/>
+          <a:ext cx="0" cy="0"/>
+          <a:chOff x="0" y="0"/>
+          <a:chExt cx="0" cy="0"/>
+        </a:xfrm>
+      </p:grpSpPr>
+      <p:sp>
+        <p:nvSpPr>
+          <p:cNvPr id="2" name="Title 1">
+            <a:extLst>
+              <a:ext uri="{FF2B5EF4-FFF2-40B4-BE49-F238E27FC236}">
+                <a16:creationId xmlns:a16="http://schemas.microsoft.com/office/drawing/2014/main" id="{FB0D9636-2B3A-4E3D-9B13-904FF3CE8CE3}"/>
+              </a:ext>
+            </a:extLst>
+          </p:cNvPr>
+          <p:cNvSpPr>
+            <a:spLocks noGrp="1"/>
+          </p:cNvSpPr>
+          <p:nvPr>
+            <p:ph type="title"/>
+          </p:nvPr>
+        </p:nvSpPr>
+        <p:spPr/>
+        <p:txBody>
+          <a:bodyPr/>
+          <a:lstStyle/>
+          <a:p>
+            <a:r>
+              <a:rPr lang="en-GB" dirty="0"/>
+              <a:t>Bio-Formats and MATLAB</a:t>
+            </a:r>
+          </a:p>
+        </p:txBody>
+      </p:sp>
+      <p:sp>
+        <p:nvSpPr>
+          <p:cNvPr id="3" name="Content Placeholder 2">
+            <a:extLst>
+              <a:ext uri="{FF2B5EF4-FFF2-40B4-BE49-F238E27FC236}">
+                <a16:creationId xmlns:a16="http://schemas.microsoft.com/office/drawing/2014/main" id="{DFE43EAF-8F5E-44D2-BF28-45DAFCB5DD96}"/>
+              </a:ext>
+            </a:extLst>
+          </p:cNvPr>
+          <p:cNvSpPr>
+            <a:spLocks noGrp="1"/>
+          </p:cNvSpPr>
+          <p:nvPr>
+            <p:ph idx="1"/>
+          </p:nvPr>
+        </p:nvSpPr>
+        <p:spPr>
+          <a:xfrm>
+            <a:off x="335360" y="1196754"/>
+            <a:ext cx="11483014" cy="4929411"/>
+          </a:xfrm>
+        </p:spPr>
+        <p:txBody>
+          <a:bodyPr/>
+          <a:lstStyle/>
+          <a:p>
+            <a:r>
+              <a:rPr lang="en-GB" dirty="0"/>
+              <a:t>Basic image loading with </a:t>
+            </a:r>
+            <a:r>
+              <a:rPr lang="en-GB" i="1" dirty="0" err="1">
+                <a:solidFill>
+                  <a:schemeClr val="accent1"/>
+                </a:solidFill>
+              </a:rPr>
+              <a:t>bfopen</a:t>
+            </a:r>
+            <a:endParaRPr lang="en-GB" i="1" dirty="0">
+              <a:solidFill>
+                <a:schemeClr val="accent1"/>
+              </a:solidFill>
+            </a:endParaRPr>
+          </a:p>
+          <a:p>
+            <a:pPr lvl="1"/>
+            <a:r>
+              <a:rPr lang="en-GB" dirty="0">
+                <a:solidFill>
+                  <a:srgbClr val="C00000"/>
+                </a:solidFill>
+              </a:rPr>
+              <a:t>Outputs nested cell structure with one row per series</a:t>
+            </a:r>
+          </a:p>
+          <a:p>
+            <a:pPr lvl="1"/>
+            <a:endParaRPr lang="en-GB" sz="1200" i="1" dirty="0">
+              <a:solidFill>
+                <a:srgbClr val="C00000"/>
+              </a:solidFill>
+            </a:endParaRPr>
+          </a:p>
+          <a:p>
+            <a:endParaRPr lang="en-GB" i="1" dirty="0">
+              <a:solidFill>
+                <a:srgbClr val="C00000"/>
+              </a:solidFill>
+            </a:endParaRPr>
+          </a:p>
+          <a:p>
+            <a:endParaRPr lang="en-GB" dirty="0">
+              <a:solidFill>
+                <a:srgbClr val="C00000"/>
+              </a:solidFill>
+            </a:endParaRPr>
+          </a:p>
+          <a:p>
+            <a:pPr marL="914400" lvl="2" indent="0">
+              <a:buNone/>
+            </a:pPr>
+            <a:endParaRPr lang="en-GB" dirty="0">
+              <a:solidFill>
+                <a:srgbClr val="C00000"/>
+              </a:solidFill>
+            </a:endParaRPr>
+          </a:p>
+          <a:p>
+            <a:pPr lvl="1"/>
+            <a:endParaRPr lang="en-GB" dirty="0"/>
+          </a:p>
+        </p:txBody>
+      </p:sp>
+      <p:pic>
+        <p:nvPicPr>
+          <p:cNvPr id="4" name="Picture 3">
+            <a:extLst>
+              <a:ext uri="{FF2B5EF4-FFF2-40B4-BE49-F238E27FC236}">
+                <a16:creationId xmlns:a16="http://schemas.microsoft.com/office/drawing/2014/main" id="{0B7C4C01-A85C-4AED-9728-320282EA0375}"/>
+              </a:ext>
+            </a:extLst>
+          </p:cNvPr>
+          <p:cNvPicPr>
+            <a:picLocks noChangeAspect="1"/>
+          </p:cNvPicPr>
+          <p:nvPr/>
+        </p:nvPicPr>
+        <p:blipFill>
+          <a:blip r:embed="rId2"/>
+          <a:stretch>
+            <a:fillRect/>
+          </a:stretch>
+        </p:blipFill>
+        <p:spPr>
+          <a:xfrm>
+            <a:off x="1191238" y="3183983"/>
+            <a:ext cx="9809524" cy="2857143"/>
+          </a:xfrm>
+          <a:prstGeom prst="rect">
+            <a:avLst/>
+          </a:prstGeom>
+          <a:ln w="12700">
+            <a:solidFill>
+              <a:srgbClr val="C00000"/>
+            </a:solidFill>
+          </a:ln>
+        </p:spPr>
+      </p:pic>
+      <p:sp>
+        <p:nvSpPr>
+          <p:cNvPr id="11" name="TextBox 10">
+            <a:extLst>
+              <a:ext uri="{FF2B5EF4-FFF2-40B4-BE49-F238E27FC236}">
+                <a16:creationId xmlns:a16="http://schemas.microsoft.com/office/drawing/2014/main" id="{6AD838A8-CE80-4A24-A1F0-B68CD81EEBC4}"/>
+              </a:ext>
+            </a:extLst>
+          </p:cNvPr>
+          <p:cNvSpPr txBox="1"/>
+          <p:nvPr/>
+        </p:nvSpPr>
+        <p:spPr>
+          <a:xfrm>
+            <a:off x="4437743" y="2548568"/>
+            <a:ext cx="2511845" cy="461665"/>
+          </a:xfrm>
+          <a:prstGeom prst="rect">
+            <a:avLst/>
+          </a:prstGeom>
+          <a:noFill/>
+        </p:spPr>
+        <p:txBody>
+          <a:bodyPr wrap="square" rtlCol="0">
+            <a:spAutoFit/>
+          </a:bodyPr>
+          <a:lstStyle/>
+          <a:p>
+            <a:pPr algn="ctr"/>
+            <a:r>
+              <a:rPr lang="en-GB" sz="2400" dirty="0">
+                <a:solidFill>
+                  <a:srgbClr val="FF0000"/>
+                </a:solidFill>
+              </a:rPr>
+              <a:t>Image description</a:t>
+            </a:r>
+          </a:p>
+        </p:txBody>
+      </p:sp>
+      <p:cxnSp>
+        <p:nvCxnSpPr>
+          <p:cNvPr id="12" name="Straight Arrow Connector 11">
+            <a:extLst>
+              <a:ext uri="{FF2B5EF4-FFF2-40B4-BE49-F238E27FC236}">
+                <a16:creationId xmlns:a16="http://schemas.microsoft.com/office/drawing/2014/main" id="{31E18EA5-AE6D-44C9-B016-5158DDC4E720}"/>
+              </a:ext>
+            </a:extLst>
+          </p:cNvPr>
+          <p:cNvCxnSpPr>
+            <a:cxnSpLocks/>
+          </p:cNvCxnSpPr>
+          <p:nvPr/>
+        </p:nvCxnSpPr>
+        <p:spPr>
+          <a:xfrm>
+            <a:off x="5693666" y="3008170"/>
+            <a:ext cx="0" cy="1610928"/>
+          </a:xfrm>
+          <a:prstGeom prst="straightConnector1">
+            <a:avLst/>
+          </a:prstGeom>
+          <a:ln w="28575">
+            <a:solidFill>
+              <a:srgbClr val="FF0000"/>
+            </a:solidFill>
+            <a:tailEnd type="triangle" w="lg" len="lg"/>
+          </a:ln>
+        </p:spPr>
+        <p:style>
+          <a:lnRef idx="1">
+            <a:schemeClr val="accent1"/>
+          </a:lnRef>
+          <a:fillRef idx="0">
+            <a:schemeClr val="accent1"/>
+          </a:fillRef>
+          <a:effectRef idx="0">
+            <a:schemeClr val="accent1"/>
+          </a:effectRef>
+          <a:fontRef idx="minor">
+            <a:schemeClr val="tx1"/>
+          </a:fontRef>
+        </p:style>
+      </p:cxnSp>
+    </p:spTree>
+    <p:extLst>
+      <p:ext uri="{BB962C8B-B14F-4D97-AF65-F5344CB8AC3E}">
+        <p14:creationId xmlns:p14="http://schemas.microsoft.com/office/powerpoint/2010/main" val="3808713253"/>
+      </p:ext>
+    </p:extLst>
+  </p:cSld>
+  <p:clrMapOvr>
+    <a:masterClrMapping/>
+  </p:clrMapOvr>
+  <mc:AlternateContent xmlns:mc="http://schemas.openxmlformats.org/markup-compatibility/2006" xmlns:p14="http://schemas.microsoft.com/office/powerpoint/2010/main">
+    <mc:Choice Requires="p14">
+      <p:transition p14:dur="300">
+        <p:fade/>
+      </p:transition>
+    </mc:Choice>
+    <mc:Fallback xmlns="">
+      <p:transition>
+        <p:fade/>
+      </p:transition>
+    </mc:Fallback>
+  </mc:AlternateContent>
+</p:sld>
+</file>
+
+<file path=ppt/slides/slide51.xml><?xml version="1.0" encoding="utf-8"?>
+<p:sld xmlns:a="http://schemas.openxmlformats.org/drawingml/2006/main" xmlns:r="http://schemas.openxmlformats.org/officeDocument/2006/relationships" xmlns:p="http://schemas.openxmlformats.org/presentationml/2006/main">
+  <p:cSld>
+    <p:spTree>
+      <p:nvGrpSpPr>
+        <p:cNvPr id="1" name=""/>
+        <p:cNvGrpSpPr/>
+        <p:nvPr/>
+      </p:nvGrpSpPr>
+      <p:grpSpPr>
+        <a:xfrm>
+          <a:off x="0" y="0"/>
+          <a:ext cx="0" cy="0"/>
+          <a:chOff x="0" y="0"/>
+          <a:chExt cx="0" cy="0"/>
+        </a:xfrm>
+      </p:grpSpPr>
+      <p:sp>
+        <p:nvSpPr>
+          <p:cNvPr id="10" name="TextBox 9">
+            <a:extLst>
+              <a:ext uri="{FF2B5EF4-FFF2-40B4-BE49-F238E27FC236}">
+                <a16:creationId xmlns:a16="http://schemas.microsoft.com/office/drawing/2014/main" id="{9352C15A-C06C-4D14-84AB-04063CF017C2}"/>
+              </a:ext>
+            </a:extLst>
+          </p:cNvPr>
+          <p:cNvSpPr txBox="1"/>
+          <p:nvPr/>
+        </p:nvSpPr>
+        <p:spPr>
+          <a:xfrm>
+            <a:off x="2629032" y="2181299"/>
+            <a:ext cx="3466968" cy="830997"/>
+          </a:xfrm>
+          <a:prstGeom prst="rect">
+            <a:avLst/>
+          </a:prstGeom>
+          <a:noFill/>
+        </p:spPr>
+        <p:txBody>
+          <a:bodyPr wrap="square" rtlCol="0">
+            <a:spAutoFit/>
+          </a:bodyPr>
+          <a:lstStyle/>
+          <a:p>
+            <a:pPr algn="ctr"/>
+            <a:r>
+              <a:rPr lang="en-GB" sz="2400" dirty="0">
+                <a:solidFill>
+                  <a:srgbClr val="FF0000"/>
+                </a:solidFill>
+              </a:rPr>
+              <a:t>Raw metadata</a:t>
+            </a:r>
+          </a:p>
+          <a:p>
+            <a:pPr algn="ctr"/>
+            <a:r>
+              <a:rPr lang="en-GB" sz="2400" dirty="0">
+                <a:solidFill>
+                  <a:srgbClr val="FF0000"/>
+                </a:solidFill>
+              </a:rPr>
+              <a:t>(Java </a:t>
+            </a:r>
+            <a:r>
+              <a:rPr lang="en-GB" sz="2400" dirty="0" err="1">
+                <a:solidFill>
+                  <a:srgbClr val="FF0000"/>
+                </a:solidFill>
+              </a:rPr>
+              <a:t>HashTable</a:t>
+            </a:r>
+            <a:r>
+              <a:rPr lang="en-GB" sz="2400" dirty="0">
+                <a:solidFill>
+                  <a:srgbClr val="FF0000"/>
+                </a:solidFill>
+              </a:rPr>
+              <a:t> object)</a:t>
+            </a:r>
+          </a:p>
+        </p:txBody>
+      </p:sp>
+      <p:sp>
+        <p:nvSpPr>
+          <p:cNvPr id="2" name="Title 1">
+            <a:extLst>
+              <a:ext uri="{FF2B5EF4-FFF2-40B4-BE49-F238E27FC236}">
+                <a16:creationId xmlns:a16="http://schemas.microsoft.com/office/drawing/2014/main" id="{FB0D9636-2B3A-4E3D-9B13-904FF3CE8CE3}"/>
+              </a:ext>
+            </a:extLst>
+          </p:cNvPr>
+          <p:cNvSpPr>
+            <a:spLocks noGrp="1"/>
+          </p:cNvSpPr>
+          <p:nvPr>
+            <p:ph type="title"/>
+          </p:nvPr>
+        </p:nvSpPr>
+        <p:spPr/>
+        <p:txBody>
+          <a:bodyPr/>
+          <a:lstStyle/>
+          <a:p>
+            <a:r>
+              <a:rPr lang="en-GB" dirty="0"/>
+              <a:t>Bio-Formats and MATLAB</a:t>
+            </a:r>
+          </a:p>
+        </p:txBody>
+      </p:sp>
+      <p:sp>
+        <p:nvSpPr>
+          <p:cNvPr id="3" name="Content Placeholder 2">
+            <a:extLst>
+              <a:ext uri="{FF2B5EF4-FFF2-40B4-BE49-F238E27FC236}">
+                <a16:creationId xmlns:a16="http://schemas.microsoft.com/office/drawing/2014/main" id="{DFE43EAF-8F5E-44D2-BF28-45DAFCB5DD96}"/>
+              </a:ext>
+            </a:extLst>
+          </p:cNvPr>
+          <p:cNvSpPr>
+            <a:spLocks noGrp="1"/>
+          </p:cNvSpPr>
+          <p:nvPr>
+            <p:ph idx="1"/>
+          </p:nvPr>
+        </p:nvSpPr>
+        <p:spPr>
+          <a:xfrm>
+            <a:off x="335360" y="1196754"/>
+            <a:ext cx="11473182" cy="4929411"/>
+          </a:xfrm>
+        </p:spPr>
+        <p:txBody>
+          <a:bodyPr/>
+          <a:lstStyle/>
+          <a:p>
+            <a:r>
+              <a:rPr lang="en-GB" dirty="0"/>
+              <a:t>Basic image loading with </a:t>
+            </a:r>
+            <a:r>
+              <a:rPr lang="en-GB" i="1" dirty="0" err="1">
+                <a:solidFill>
+                  <a:schemeClr val="accent1"/>
+                </a:solidFill>
+              </a:rPr>
+              <a:t>bfopen</a:t>
+            </a:r>
+            <a:endParaRPr lang="en-GB" i="1" dirty="0">
+              <a:solidFill>
+                <a:schemeClr val="accent1"/>
+              </a:solidFill>
+            </a:endParaRPr>
+          </a:p>
+          <a:p>
+            <a:pPr lvl="1"/>
+            <a:r>
+              <a:rPr lang="en-GB" dirty="0">
+                <a:solidFill>
+                  <a:srgbClr val="C00000"/>
+                </a:solidFill>
+              </a:rPr>
+              <a:t>Outputs nested cell structure with one row per series</a:t>
+            </a:r>
+          </a:p>
+          <a:p>
+            <a:pPr lvl="1"/>
+            <a:endParaRPr lang="en-GB" sz="1200" i="1" dirty="0">
+              <a:solidFill>
+                <a:srgbClr val="C00000"/>
+              </a:solidFill>
+            </a:endParaRPr>
+          </a:p>
+          <a:p>
+            <a:endParaRPr lang="en-GB" i="1" dirty="0">
+              <a:solidFill>
+                <a:srgbClr val="C00000"/>
+              </a:solidFill>
+            </a:endParaRPr>
+          </a:p>
+          <a:p>
+            <a:endParaRPr lang="en-GB" dirty="0">
+              <a:solidFill>
+                <a:srgbClr val="C00000"/>
+              </a:solidFill>
+            </a:endParaRPr>
+          </a:p>
+          <a:p>
+            <a:pPr marL="914400" lvl="2" indent="0">
+              <a:buNone/>
+            </a:pPr>
+            <a:endParaRPr lang="en-GB" dirty="0">
+              <a:solidFill>
+                <a:srgbClr val="C00000"/>
+              </a:solidFill>
+            </a:endParaRPr>
+          </a:p>
+          <a:p>
+            <a:pPr lvl="1"/>
+            <a:endParaRPr lang="en-GB" dirty="0"/>
+          </a:p>
+        </p:txBody>
+      </p:sp>
+      <p:pic>
+        <p:nvPicPr>
+          <p:cNvPr id="6" name="Picture 5">
+            <a:extLst>
+              <a:ext uri="{FF2B5EF4-FFF2-40B4-BE49-F238E27FC236}">
+                <a16:creationId xmlns:a16="http://schemas.microsoft.com/office/drawing/2014/main" id="{29D6333D-976A-4AFF-9C74-D08F2462B17C}"/>
+              </a:ext>
+            </a:extLst>
+          </p:cNvPr>
+          <p:cNvPicPr>
+            <a:picLocks noChangeAspect="1"/>
+          </p:cNvPicPr>
+          <p:nvPr/>
+        </p:nvPicPr>
+        <p:blipFill>
+          <a:blip r:embed="rId2"/>
+          <a:stretch>
+            <a:fillRect/>
+          </a:stretch>
+        </p:blipFill>
+        <p:spPr>
+          <a:xfrm>
+            <a:off x="1191238" y="3183983"/>
+            <a:ext cx="9809524" cy="2857143"/>
+          </a:xfrm>
+          <a:prstGeom prst="rect">
+            <a:avLst/>
+          </a:prstGeom>
+          <a:ln w="12700">
+            <a:solidFill>
+              <a:srgbClr val="C00000"/>
+            </a:solidFill>
+          </a:ln>
+        </p:spPr>
+      </p:pic>
+      <p:cxnSp>
+        <p:nvCxnSpPr>
+          <p:cNvPr id="9" name="Straight Arrow Connector 8">
+            <a:extLst>
+              <a:ext uri="{FF2B5EF4-FFF2-40B4-BE49-F238E27FC236}">
+                <a16:creationId xmlns:a16="http://schemas.microsoft.com/office/drawing/2014/main" id="{722F2C9D-2413-4869-9E3B-6137B27D0593}"/>
+              </a:ext>
+            </a:extLst>
+          </p:cNvPr>
+          <p:cNvCxnSpPr>
+            <a:cxnSpLocks/>
+          </p:cNvCxnSpPr>
+          <p:nvPr/>
+        </p:nvCxnSpPr>
+        <p:spPr>
+          <a:xfrm>
+            <a:off x="4352992" y="3010233"/>
+            <a:ext cx="0" cy="2500230"/>
+          </a:xfrm>
+          <a:prstGeom prst="straightConnector1">
+            <a:avLst/>
+          </a:prstGeom>
+          <a:ln w="28575">
+            <a:solidFill>
+              <a:srgbClr val="FF0000"/>
+            </a:solidFill>
+            <a:tailEnd type="triangle" w="lg" len="lg"/>
+          </a:ln>
+        </p:spPr>
+        <p:style>
+          <a:lnRef idx="1">
+            <a:schemeClr val="accent1"/>
+          </a:lnRef>
+          <a:fillRef idx="0">
+            <a:schemeClr val="accent1"/>
+          </a:fillRef>
+          <a:effectRef idx="0">
+            <a:schemeClr val="accent1"/>
+          </a:effectRef>
+          <a:fontRef idx="minor">
+            <a:schemeClr val="tx1"/>
+          </a:fontRef>
+        </p:style>
+      </p:cxnSp>
+    </p:spTree>
+    <p:extLst>
+      <p:ext uri="{BB962C8B-B14F-4D97-AF65-F5344CB8AC3E}">
+        <p14:creationId xmlns:p14="http://schemas.microsoft.com/office/powerpoint/2010/main" val="2949254122"/>
+      </p:ext>
+    </p:extLst>
+  </p:cSld>
+  <p:clrMapOvr>
+    <a:masterClrMapping/>
+  </p:clrMapOvr>
+  <mc:AlternateContent xmlns:mc="http://schemas.openxmlformats.org/markup-compatibility/2006" xmlns:p14="http://schemas.microsoft.com/office/powerpoint/2010/main">
+    <mc:Choice Requires="p14">
+      <p:transition p14:dur="300">
+        <p:fade/>
+      </p:transition>
+    </mc:Choice>
+    <mc:Fallback xmlns="">
+      <p:transition>
+        <p:fade/>
+      </p:transition>
+    </mc:Fallback>
+  </mc:AlternateContent>
+</p:sld>
+</file>
+
+<file path=ppt/slides/slide52.xml><?xml version="1.0" encoding="utf-8"?>
+<p:sld xmlns:a="http://schemas.openxmlformats.org/drawingml/2006/main" xmlns:r="http://schemas.openxmlformats.org/officeDocument/2006/relationships" xmlns:p="http://schemas.openxmlformats.org/presentationml/2006/main">
+  <p:cSld>
+    <p:spTree>
+      <p:nvGrpSpPr>
+        <p:cNvPr id="1" name=""/>
+        <p:cNvGrpSpPr/>
+        <p:nvPr/>
+      </p:nvGrpSpPr>
+      <p:grpSpPr>
+        <a:xfrm>
+          <a:off x="0" y="0"/>
+          <a:ext cx="0" cy="0"/>
+          <a:chOff x="0" y="0"/>
+          <a:chExt cx="0" cy="0"/>
+        </a:xfrm>
+      </p:grpSpPr>
+      <p:sp>
+        <p:nvSpPr>
+          <p:cNvPr id="10" name="TextBox 9">
+            <a:extLst>
+              <a:ext uri="{FF2B5EF4-FFF2-40B4-BE49-F238E27FC236}">
+                <a16:creationId xmlns:a16="http://schemas.microsoft.com/office/drawing/2014/main" id="{9352C15A-C06C-4D14-84AB-04063CF017C2}"/>
+              </a:ext>
+            </a:extLst>
+          </p:cNvPr>
+          <p:cNvSpPr txBox="1"/>
+          <p:nvPr/>
+        </p:nvSpPr>
+        <p:spPr>
+          <a:xfrm>
+            <a:off x="4676907" y="2550631"/>
+            <a:ext cx="3466968" cy="461665"/>
+          </a:xfrm>
+          <a:prstGeom prst="rect">
+            <a:avLst/>
+          </a:prstGeom>
+          <a:noFill/>
+        </p:spPr>
+        <p:txBody>
+          <a:bodyPr wrap="square" rtlCol="0">
+            <a:spAutoFit/>
+          </a:bodyPr>
+          <a:lstStyle/>
+          <a:p>
+            <a:pPr algn="ctr"/>
+            <a:r>
+              <a:rPr lang="en-GB" sz="2400" dirty="0">
+                <a:solidFill>
+                  <a:srgbClr val="FF0000"/>
+                </a:solidFill>
+              </a:rPr>
+              <a:t>Colourmap data</a:t>
+            </a:r>
+          </a:p>
+        </p:txBody>
+      </p:sp>
+      <p:sp>
+        <p:nvSpPr>
+          <p:cNvPr id="2" name="Title 1">
+            <a:extLst>
+              <a:ext uri="{FF2B5EF4-FFF2-40B4-BE49-F238E27FC236}">
+                <a16:creationId xmlns:a16="http://schemas.microsoft.com/office/drawing/2014/main" id="{FB0D9636-2B3A-4E3D-9B13-904FF3CE8CE3}"/>
+              </a:ext>
+            </a:extLst>
+          </p:cNvPr>
+          <p:cNvSpPr>
+            <a:spLocks noGrp="1"/>
+          </p:cNvSpPr>
+          <p:nvPr>
+            <p:ph type="title"/>
+          </p:nvPr>
+        </p:nvSpPr>
+        <p:spPr/>
+        <p:txBody>
+          <a:bodyPr/>
+          <a:lstStyle/>
+          <a:p>
+            <a:r>
+              <a:rPr lang="en-GB" dirty="0"/>
+              <a:t>Bio-Formats and MATLAB</a:t>
+            </a:r>
+          </a:p>
+        </p:txBody>
+      </p:sp>
+      <p:sp>
+        <p:nvSpPr>
+          <p:cNvPr id="3" name="Content Placeholder 2">
+            <a:extLst>
+              <a:ext uri="{FF2B5EF4-FFF2-40B4-BE49-F238E27FC236}">
+                <a16:creationId xmlns:a16="http://schemas.microsoft.com/office/drawing/2014/main" id="{DFE43EAF-8F5E-44D2-BF28-45DAFCB5DD96}"/>
+              </a:ext>
+            </a:extLst>
+          </p:cNvPr>
+          <p:cNvSpPr>
+            <a:spLocks noGrp="1"/>
+          </p:cNvSpPr>
+          <p:nvPr>
+            <p:ph idx="1"/>
+          </p:nvPr>
+        </p:nvSpPr>
+        <p:spPr>
+          <a:xfrm>
+            <a:off x="335360" y="1196754"/>
+            <a:ext cx="11492846" cy="4929411"/>
+          </a:xfrm>
+        </p:spPr>
+        <p:txBody>
+          <a:bodyPr/>
+          <a:lstStyle/>
+          <a:p>
+            <a:r>
+              <a:rPr lang="en-GB" dirty="0"/>
+              <a:t>Basic image loading with </a:t>
+            </a:r>
+            <a:r>
+              <a:rPr lang="en-GB" i="1" dirty="0" err="1">
+                <a:solidFill>
+                  <a:schemeClr val="accent1"/>
+                </a:solidFill>
+              </a:rPr>
+              <a:t>bfopen</a:t>
+            </a:r>
+            <a:endParaRPr lang="en-GB" i="1" dirty="0">
+              <a:solidFill>
+                <a:schemeClr val="accent1"/>
+              </a:solidFill>
+            </a:endParaRPr>
+          </a:p>
+          <a:p>
+            <a:pPr lvl="1"/>
+            <a:r>
+              <a:rPr lang="en-GB" dirty="0">
+                <a:solidFill>
+                  <a:srgbClr val="C00000"/>
+                </a:solidFill>
+              </a:rPr>
+              <a:t>Outputs nested cell structure with one row per series</a:t>
+            </a:r>
+          </a:p>
+          <a:p>
+            <a:pPr lvl="1"/>
+            <a:endParaRPr lang="en-GB" sz="1200" i="1" dirty="0">
+              <a:solidFill>
+                <a:srgbClr val="C00000"/>
+              </a:solidFill>
+            </a:endParaRPr>
+          </a:p>
+          <a:p>
+            <a:endParaRPr lang="en-GB" i="1" dirty="0">
+              <a:solidFill>
+                <a:srgbClr val="C00000"/>
+              </a:solidFill>
+            </a:endParaRPr>
+          </a:p>
+          <a:p>
+            <a:endParaRPr lang="en-GB" dirty="0">
+              <a:solidFill>
+                <a:srgbClr val="C00000"/>
+              </a:solidFill>
+            </a:endParaRPr>
+          </a:p>
+          <a:p>
+            <a:pPr marL="914400" lvl="2" indent="0">
+              <a:buNone/>
+            </a:pPr>
+            <a:endParaRPr lang="en-GB" dirty="0">
+              <a:solidFill>
+                <a:srgbClr val="C00000"/>
+              </a:solidFill>
+            </a:endParaRPr>
+          </a:p>
+          <a:p>
+            <a:pPr lvl="1"/>
+            <a:endParaRPr lang="en-GB" dirty="0"/>
+          </a:p>
+        </p:txBody>
+      </p:sp>
+      <p:pic>
+        <p:nvPicPr>
+          <p:cNvPr id="6" name="Picture 5">
+            <a:extLst>
+              <a:ext uri="{FF2B5EF4-FFF2-40B4-BE49-F238E27FC236}">
+                <a16:creationId xmlns:a16="http://schemas.microsoft.com/office/drawing/2014/main" id="{29D6333D-976A-4AFF-9C74-D08F2462B17C}"/>
+              </a:ext>
+            </a:extLst>
+          </p:cNvPr>
+          <p:cNvPicPr>
+            <a:picLocks noChangeAspect="1"/>
+          </p:cNvPicPr>
+          <p:nvPr/>
+        </p:nvPicPr>
+        <p:blipFill>
+          <a:blip r:embed="rId2"/>
+          <a:stretch>
+            <a:fillRect/>
+          </a:stretch>
+        </p:blipFill>
+        <p:spPr>
+          <a:xfrm>
+            <a:off x="1191238" y="3183983"/>
+            <a:ext cx="9809524" cy="2857143"/>
+          </a:xfrm>
+          <a:prstGeom prst="rect">
+            <a:avLst/>
+          </a:prstGeom>
+          <a:ln w="12700">
+            <a:solidFill>
+              <a:srgbClr val="C00000"/>
+            </a:solidFill>
+          </a:ln>
+        </p:spPr>
+      </p:pic>
+      <p:cxnSp>
+        <p:nvCxnSpPr>
+          <p:cNvPr id="9" name="Straight Arrow Connector 8">
+            <a:extLst>
+              <a:ext uri="{FF2B5EF4-FFF2-40B4-BE49-F238E27FC236}">
+                <a16:creationId xmlns:a16="http://schemas.microsoft.com/office/drawing/2014/main" id="{722F2C9D-2413-4869-9E3B-6137B27D0593}"/>
+              </a:ext>
+            </a:extLst>
+          </p:cNvPr>
+          <p:cNvCxnSpPr>
+            <a:cxnSpLocks/>
+          </p:cNvCxnSpPr>
+          <p:nvPr/>
+        </p:nvCxnSpPr>
+        <p:spPr>
+          <a:xfrm>
+            <a:off x="6400867" y="3010233"/>
+            <a:ext cx="0" cy="2500230"/>
+          </a:xfrm>
+          <a:prstGeom prst="straightConnector1">
+            <a:avLst/>
+          </a:prstGeom>
+          <a:ln w="28575">
+            <a:solidFill>
+              <a:srgbClr val="FF0000"/>
+            </a:solidFill>
+            <a:tailEnd type="triangle" w="lg" len="lg"/>
+          </a:ln>
+        </p:spPr>
+        <p:style>
+          <a:lnRef idx="1">
+            <a:schemeClr val="accent1"/>
+          </a:lnRef>
+          <a:fillRef idx="0">
+            <a:schemeClr val="accent1"/>
+          </a:fillRef>
+          <a:effectRef idx="0">
+            <a:schemeClr val="accent1"/>
+          </a:effectRef>
+          <a:fontRef idx="minor">
+            <a:schemeClr val="tx1"/>
+          </a:fontRef>
+        </p:style>
+      </p:cxnSp>
+    </p:spTree>
+    <p:extLst>
+      <p:ext uri="{BB962C8B-B14F-4D97-AF65-F5344CB8AC3E}">
+        <p14:creationId xmlns:p14="http://schemas.microsoft.com/office/powerpoint/2010/main" val="956024667"/>
+      </p:ext>
+    </p:extLst>
+  </p:cSld>
+  <p:clrMapOvr>
+    <a:masterClrMapping/>
+  </p:clrMapOvr>
+  <mc:AlternateContent xmlns:mc="http://schemas.openxmlformats.org/markup-compatibility/2006" xmlns:p14="http://schemas.microsoft.com/office/powerpoint/2010/main">
+    <mc:Choice Requires="p14">
+      <p:transition p14:dur="300">
+        <p:fade/>
+      </p:transition>
+    </mc:Choice>
+    <mc:Fallback xmlns="">
+      <p:transition>
+        <p:fade/>
+      </p:transition>
+    </mc:Fallback>
+  </mc:AlternateContent>
+</p:sld>
+</file>
+
+<file path=ppt/slides/slide53.xml><?xml version="1.0" encoding="utf-8"?>
+<p:sld xmlns:a="http://schemas.openxmlformats.org/drawingml/2006/main" xmlns:r="http://schemas.openxmlformats.org/officeDocument/2006/relationships" xmlns:p="http://schemas.openxmlformats.org/presentationml/2006/main">
+  <p:cSld>
+    <p:spTree>
+      <p:nvGrpSpPr>
+        <p:cNvPr id="1" name=""/>
+        <p:cNvGrpSpPr/>
+        <p:nvPr/>
+      </p:nvGrpSpPr>
+      <p:grpSpPr>
+        <a:xfrm>
+          <a:off x="0" y="0"/>
+          <a:ext cx="0" cy="0"/>
+          <a:chOff x="0" y="0"/>
+          <a:chExt cx="0" cy="0"/>
+        </a:xfrm>
+      </p:grpSpPr>
+      <p:sp>
+        <p:nvSpPr>
+          <p:cNvPr id="2" name="Title 1">
+            <a:extLst>
+              <a:ext uri="{FF2B5EF4-FFF2-40B4-BE49-F238E27FC236}">
+                <a16:creationId xmlns:a16="http://schemas.microsoft.com/office/drawing/2014/main" id="{FB0D9636-2B3A-4E3D-9B13-904FF3CE8CE3}"/>
+              </a:ext>
+            </a:extLst>
+          </p:cNvPr>
+          <p:cNvSpPr>
+            <a:spLocks noGrp="1"/>
+          </p:cNvSpPr>
+          <p:nvPr>
+            <p:ph type="title"/>
+          </p:nvPr>
+        </p:nvSpPr>
+        <p:spPr/>
+        <p:txBody>
+          <a:bodyPr/>
+          <a:lstStyle/>
+          <a:p>
+            <a:r>
+              <a:rPr lang="en-GB" dirty="0"/>
+              <a:t>Bio-Formats and MATLAB</a:t>
+            </a:r>
+          </a:p>
+        </p:txBody>
+      </p:sp>
+      <p:sp>
+        <p:nvSpPr>
+          <p:cNvPr id="3" name="Content Placeholder 2">
+            <a:extLst>
+              <a:ext uri="{FF2B5EF4-FFF2-40B4-BE49-F238E27FC236}">
+                <a16:creationId xmlns:a16="http://schemas.microsoft.com/office/drawing/2014/main" id="{DFE43EAF-8F5E-44D2-BF28-45DAFCB5DD96}"/>
+              </a:ext>
+            </a:extLst>
+          </p:cNvPr>
+          <p:cNvSpPr>
+            <a:spLocks noGrp="1"/>
+          </p:cNvSpPr>
+          <p:nvPr>
+            <p:ph idx="1"/>
+          </p:nvPr>
+        </p:nvSpPr>
+        <p:spPr>
+          <a:xfrm>
+            <a:off x="335360" y="1196754"/>
+            <a:ext cx="11473182" cy="4929411"/>
+          </a:xfrm>
+        </p:spPr>
+        <p:txBody>
+          <a:bodyPr/>
+          <a:lstStyle/>
+          <a:p>
+            <a:r>
+              <a:rPr lang="en-GB" dirty="0"/>
+              <a:t>Basic image loading with </a:t>
+            </a:r>
+            <a:r>
+              <a:rPr lang="en-GB" i="1" dirty="0" err="1">
+                <a:solidFill>
+                  <a:schemeClr val="accent1"/>
+                </a:solidFill>
+              </a:rPr>
+              <a:t>bfopen</a:t>
+            </a:r>
+            <a:endParaRPr lang="en-GB" i="1" dirty="0">
+              <a:solidFill>
+                <a:schemeClr val="accent1"/>
+              </a:solidFill>
+            </a:endParaRPr>
+          </a:p>
+          <a:p>
+            <a:pPr lvl="1"/>
+            <a:r>
+              <a:rPr lang="en-GB" dirty="0">
+                <a:solidFill>
+                  <a:srgbClr val="C00000"/>
+                </a:solidFill>
+              </a:rPr>
+              <a:t>Outputs nested cell structure with one row per series</a:t>
+            </a:r>
+          </a:p>
+          <a:p>
+            <a:pPr lvl="1"/>
+            <a:endParaRPr lang="en-GB" sz="1200" i="1" dirty="0">
+              <a:solidFill>
+                <a:srgbClr val="C00000"/>
+              </a:solidFill>
+            </a:endParaRPr>
+          </a:p>
+          <a:p>
+            <a:endParaRPr lang="en-GB" i="1" dirty="0">
+              <a:solidFill>
+                <a:srgbClr val="C00000"/>
+              </a:solidFill>
+            </a:endParaRPr>
+          </a:p>
+          <a:p>
+            <a:endParaRPr lang="en-GB" dirty="0">
+              <a:solidFill>
+                <a:srgbClr val="C00000"/>
+              </a:solidFill>
+            </a:endParaRPr>
+          </a:p>
+          <a:p>
+            <a:pPr marL="914400" lvl="2" indent="0">
+              <a:buNone/>
+            </a:pPr>
+            <a:endParaRPr lang="en-GB" dirty="0">
+              <a:solidFill>
+                <a:srgbClr val="C00000"/>
+              </a:solidFill>
+            </a:endParaRPr>
+          </a:p>
+          <a:p>
+            <a:pPr lvl="1"/>
+            <a:endParaRPr lang="en-GB" dirty="0"/>
+          </a:p>
+        </p:txBody>
+      </p:sp>
+      <p:pic>
+        <p:nvPicPr>
+          <p:cNvPr id="6" name="Picture 5">
+            <a:extLst>
+              <a:ext uri="{FF2B5EF4-FFF2-40B4-BE49-F238E27FC236}">
+                <a16:creationId xmlns:a16="http://schemas.microsoft.com/office/drawing/2014/main" id="{29D6333D-976A-4AFF-9C74-D08F2462B17C}"/>
+              </a:ext>
+            </a:extLst>
+          </p:cNvPr>
+          <p:cNvPicPr>
+            <a:picLocks noChangeAspect="1"/>
+          </p:cNvPicPr>
+          <p:nvPr/>
+        </p:nvPicPr>
+        <p:blipFill>
+          <a:blip r:embed="rId2"/>
+          <a:stretch>
+            <a:fillRect/>
+          </a:stretch>
+        </p:blipFill>
+        <p:spPr>
+          <a:xfrm>
+            <a:off x="1191238" y="3183983"/>
+            <a:ext cx="9809524" cy="2857143"/>
+          </a:xfrm>
+          <a:prstGeom prst="rect">
+            <a:avLst/>
+          </a:prstGeom>
+          <a:ln w="12700">
+            <a:solidFill>
+              <a:srgbClr val="C00000"/>
+            </a:solidFill>
+          </a:ln>
+        </p:spPr>
+      </p:pic>
+      <p:sp>
+        <p:nvSpPr>
+          <p:cNvPr id="7" name="TextBox 6">
+            <a:extLst>
+              <a:ext uri="{FF2B5EF4-FFF2-40B4-BE49-F238E27FC236}">
+                <a16:creationId xmlns:a16="http://schemas.microsoft.com/office/drawing/2014/main" id="{53A95EC2-5DF9-48B5-9E1B-1A7B2BF74F58}"/>
+              </a:ext>
+            </a:extLst>
+          </p:cNvPr>
+          <p:cNvSpPr txBox="1"/>
+          <p:nvPr/>
+        </p:nvSpPr>
+        <p:spPr>
+          <a:xfrm>
+            <a:off x="7017803" y="2181299"/>
+            <a:ext cx="4113442" cy="830997"/>
+          </a:xfrm>
+          <a:prstGeom prst="rect">
+            <a:avLst/>
+          </a:prstGeom>
+          <a:noFill/>
+        </p:spPr>
+        <p:txBody>
+          <a:bodyPr wrap="square" rtlCol="0">
+            <a:spAutoFit/>
+          </a:bodyPr>
+          <a:lstStyle/>
+          <a:p>
+            <a:pPr algn="ctr"/>
+            <a:r>
+              <a:rPr lang="en-GB" sz="2400" dirty="0">
+                <a:solidFill>
+                  <a:srgbClr val="FF0000"/>
+                </a:solidFill>
+              </a:rPr>
+              <a:t>OME metadata structure</a:t>
+            </a:r>
+          </a:p>
+          <a:p>
+            <a:pPr algn="ctr"/>
+            <a:r>
+              <a:rPr lang="en-GB" sz="2400" dirty="0">
+                <a:solidFill>
+                  <a:srgbClr val="FF0000"/>
+                </a:solidFill>
+              </a:rPr>
+              <a:t>(this is an object)</a:t>
+            </a:r>
+          </a:p>
+        </p:txBody>
+      </p:sp>
+      <p:cxnSp>
+        <p:nvCxnSpPr>
+          <p:cNvPr id="8" name="Straight Arrow Connector 7">
+            <a:extLst>
+              <a:ext uri="{FF2B5EF4-FFF2-40B4-BE49-F238E27FC236}">
+                <a16:creationId xmlns:a16="http://schemas.microsoft.com/office/drawing/2014/main" id="{C94817C6-3586-4FA1-9E9D-345FAE6F0606}"/>
+              </a:ext>
+            </a:extLst>
+          </p:cNvPr>
+          <p:cNvCxnSpPr>
+            <a:cxnSpLocks/>
+          </p:cNvCxnSpPr>
+          <p:nvPr/>
+        </p:nvCxnSpPr>
+        <p:spPr>
+          <a:xfrm>
+            <a:off x="9064692" y="3008170"/>
+            <a:ext cx="0" cy="2500230"/>
+          </a:xfrm>
+          <a:prstGeom prst="straightConnector1">
+            <a:avLst/>
+          </a:prstGeom>
+          <a:ln w="28575">
+            <a:solidFill>
+              <a:srgbClr val="FF0000"/>
+            </a:solidFill>
+            <a:tailEnd type="triangle" w="lg" len="lg"/>
+          </a:ln>
+        </p:spPr>
+        <p:style>
+          <a:lnRef idx="1">
+            <a:schemeClr val="accent1"/>
+          </a:lnRef>
+          <a:fillRef idx="0">
+            <a:schemeClr val="accent1"/>
+          </a:fillRef>
+          <a:effectRef idx="0">
+            <a:schemeClr val="accent1"/>
+          </a:effectRef>
+          <a:fontRef idx="minor">
+            <a:schemeClr val="tx1"/>
+          </a:fontRef>
+        </p:style>
+      </p:cxnSp>
+      <p:sp>
+        <p:nvSpPr>
+          <p:cNvPr id="11" name="Rectangle 10">
+            <a:extLst>
+              <a:ext uri="{FF2B5EF4-FFF2-40B4-BE49-F238E27FC236}">
+                <a16:creationId xmlns:a16="http://schemas.microsoft.com/office/drawing/2014/main" id="{EC2DCE77-54A6-4B90-A986-FACA1BB48EE3}"/>
+              </a:ext>
+            </a:extLst>
+          </p:cNvPr>
+          <p:cNvSpPr/>
+          <p:nvPr/>
+        </p:nvSpPr>
+        <p:spPr>
+          <a:xfrm>
+            <a:off x="7213734" y="5527453"/>
+            <a:ext cx="3701914" cy="228350"/>
+          </a:xfrm>
+          <a:prstGeom prst="rect">
+            <a:avLst/>
+          </a:prstGeom>
+          <a:noFill/>
+          <a:ln>
+            <a:solidFill>
+              <a:srgbClr val="FF0000"/>
+            </a:solidFill>
+          </a:ln>
+        </p:spPr>
+        <p:style>
+          <a:lnRef idx="2">
+            <a:schemeClr val="accent1">
+              <a:shade val="50000"/>
+            </a:schemeClr>
+          </a:lnRef>
+          <a:fillRef idx="1">
+            <a:schemeClr val="accent1"/>
+          </a:fillRef>
+          <a:effectRef idx="0">
+            <a:schemeClr val="accent1"/>
+          </a:effectRef>
+          <a:fontRef idx="minor">
+            <a:schemeClr val="lt1"/>
+          </a:fontRef>
+        </p:style>
+        <p:txBody>
+          <a:bodyPr rtlCol="0" anchor="ctr"/>
+          <a:lstStyle/>
+          <a:p>
+            <a:pPr algn="ctr"/>
+            <a:endParaRPr lang="en-GB"/>
+          </a:p>
+        </p:txBody>
+      </p:sp>
+    </p:spTree>
+    <p:extLst>
+      <p:ext uri="{BB962C8B-B14F-4D97-AF65-F5344CB8AC3E}">
+        <p14:creationId xmlns:p14="http://schemas.microsoft.com/office/powerpoint/2010/main" val="4066529059"/>
+      </p:ext>
+    </p:extLst>
+  </p:cSld>
+  <p:clrMapOvr>
+    <a:masterClrMapping/>
+  </p:clrMapOvr>
+  <mc:AlternateContent xmlns:mc="http://schemas.openxmlformats.org/markup-compatibility/2006" xmlns:p14="http://schemas.microsoft.com/office/powerpoint/2010/main">
+    <mc:Choice Requires="p14">
+      <p:transition p14:dur="300">
+        <p:fade/>
+      </p:transition>
+    </mc:Choice>
+    <mc:Fallback xmlns="">
+      <p:transition>
+        <p:fade/>
+      </p:transition>
+    </mc:Fallback>
+  </mc:AlternateContent>
+  <p:timing>
+    <p:tnLst>
+      <p:par>
+        <p:cTn id="1" dur="indefinite" restart="never" nodeType="tmRoot">
+          <p:childTnLst>
+            <p:seq concurrent="1" nextAc="seek">
+              <p:cTn id="2" dur="indefinite" nodeType="mainSeq">
+                <p:childTnLst>
+                  <p:par>
+                    <p:cTn id="3" fill="hold">
+                      <p:stCondLst>
+                        <p:cond delay="indefinite"/>
+                      </p:stCondLst>
+                      <p:childTnLst>
+                        <p:par>
+                          <p:cTn id="4" fill="hold">
+                            <p:stCondLst>
+                              <p:cond delay="0"/>
+                            </p:stCondLst>
+                            <p:childTnLst>
+                              <p:par>
+                                <p:cTn id="5" presetID="10" presetClass="entr" presetSubtype="0" fill="hold" grpId="0" nodeType="clickEffect">
+                                  <p:stCondLst>
+                                    <p:cond delay="0"/>
+                                  </p:stCondLst>
+                                  <p:childTnLst>
+                                    <p:set>
+                                      <p:cBhvr>
+                                        <p:cTn id="6" dur="1" fill="hold">
+                                          <p:stCondLst>
+                                            <p:cond delay="0"/>
+                                          </p:stCondLst>
+                                        </p:cTn>
+                                        <p:tgtEl>
+                                          <p:spTgt spid="11"/>
+                                        </p:tgtEl>
+                                        <p:attrNameLst>
+                                          <p:attrName>style.visibility</p:attrName>
+                                        </p:attrNameLst>
+                                      </p:cBhvr>
+                                      <p:to>
+                                        <p:strVal val="visible"/>
+                                      </p:to>
+                                    </p:set>
+                                    <p:animEffect transition="in" filter="fade">
+                                      <p:cBhvr>
+                                        <p:cTn id="7" dur="300"/>
+                                        <p:tgtEl>
+                                          <p:spTgt spid="11"/>
+                                        </p:tgtEl>
+                                      </p:cBhvr>
+                                    </p:animEffect>
+                                  </p:childTnLst>
+                                </p:cTn>
+                              </p:par>
+                            </p:childTnLst>
+                          </p:cTn>
+                        </p:par>
+                      </p:childTnLst>
+                    </p:cTn>
+                  </p:par>
+                </p:childTnLst>
+              </p:cTn>
+              <p:prevCondLst>
+                <p:cond evt="onPrev" delay="0">
+                  <p:tgtEl>
+                    <p:sldTgt/>
+                  </p:tgtEl>
+                </p:cond>
+              </p:prevCondLst>
+              <p:nextCondLst>
+                <p:cond evt="onNext" delay="0">
+                  <p:tgtEl>
+                    <p:sldTgt/>
+                  </p:tgtEl>
+                </p:cond>
+              </p:nextCondLst>
+            </p:seq>
+          </p:childTnLst>
+        </p:cTn>
+      </p:par>
+    </p:tnLst>
+    <p:bldLst>
+      <p:bldP spid="11" grpId="0" animBg="1"/>
+    </p:bldLst>
+  </p:timing>
+</p:sld>
+</file>
+
+<file path=ppt/slides/slide54.xml><?xml version="1.0" encoding="utf-8"?>
+<p:sld xmlns:a="http://schemas.openxmlformats.org/drawingml/2006/main" xmlns:r="http://schemas.openxmlformats.org/officeDocument/2006/relationships" xmlns:p="http://schemas.openxmlformats.org/presentationml/2006/main">
+  <p:cSld>
+    <p:spTree>
+      <p:nvGrpSpPr>
+        <p:cNvPr id="1" name=""/>
+        <p:cNvGrpSpPr/>
+        <p:nvPr/>
+      </p:nvGrpSpPr>
+      <p:grpSpPr>
+        <a:xfrm>
+          <a:off x="0" y="0"/>
+          <a:ext cx="0" cy="0"/>
+          <a:chOff x="0" y="0"/>
+          <a:chExt cx="0" cy="0"/>
+        </a:xfrm>
+      </p:grpSpPr>
+      <p:pic>
+        <p:nvPicPr>
+          <p:cNvPr id="4" name="Picture 3">
+            <a:extLst>
+              <a:ext uri="{FF2B5EF4-FFF2-40B4-BE49-F238E27FC236}">
+                <a16:creationId xmlns:a16="http://schemas.microsoft.com/office/drawing/2014/main" id="{C2A0FC10-8862-4451-BBFA-C15FC5D49676}"/>
+              </a:ext>
+            </a:extLst>
+          </p:cNvPr>
+          <p:cNvPicPr>
+            <a:picLocks noChangeAspect="1"/>
+          </p:cNvPicPr>
+          <p:nvPr/>
+        </p:nvPicPr>
+        <p:blipFill>
+          <a:blip r:embed="rId2"/>
+          <a:stretch>
+            <a:fillRect/>
+          </a:stretch>
+        </p:blipFill>
+        <p:spPr>
+          <a:xfrm>
+            <a:off x="1191238" y="3183983"/>
+            <a:ext cx="9809524" cy="2857143"/>
+          </a:xfrm>
+          <a:prstGeom prst="rect">
+            <a:avLst/>
+          </a:prstGeom>
+          <a:ln w="12700">
+            <a:solidFill>
+              <a:srgbClr val="C00000"/>
+            </a:solidFill>
+          </a:ln>
+        </p:spPr>
+      </p:pic>
+      <p:sp>
+        <p:nvSpPr>
+          <p:cNvPr id="2" name="Title 1">
+            <a:extLst>
+              <a:ext uri="{FF2B5EF4-FFF2-40B4-BE49-F238E27FC236}">
+                <a16:creationId xmlns:a16="http://schemas.microsoft.com/office/drawing/2014/main" id="{FB0D9636-2B3A-4E3D-9B13-904FF3CE8CE3}"/>
+              </a:ext>
+            </a:extLst>
+          </p:cNvPr>
+          <p:cNvSpPr>
+            <a:spLocks noGrp="1"/>
+          </p:cNvSpPr>
+          <p:nvPr>
+            <p:ph type="title"/>
+          </p:nvPr>
+        </p:nvSpPr>
+        <p:spPr/>
+        <p:txBody>
+          <a:bodyPr/>
+          <a:lstStyle/>
+          <a:p>
+            <a:r>
+              <a:rPr lang="en-GB" dirty="0"/>
+              <a:t>Bio-Formats and MATLAB</a:t>
+            </a:r>
+          </a:p>
+        </p:txBody>
+      </p:sp>
+      <p:sp>
+        <p:nvSpPr>
+          <p:cNvPr id="3" name="Content Placeholder 2">
+            <a:extLst>
+              <a:ext uri="{FF2B5EF4-FFF2-40B4-BE49-F238E27FC236}">
+                <a16:creationId xmlns:a16="http://schemas.microsoft.com/office/drawing/2014/main" id="{DFE43EAF-8F5E-44D2-BF28-45DAFCB5DD96}"/>
+              </a:ext>
+            </a:extLst>
+          </p:cNvPr>
+          <p:cNvSpPr>
+            <a:spLocks noGrp="1"/>
+          </p:cNvSpPr>
+          <p:nvPr>
+            <p:ph idx="1"/>
+          </p:nvPr>
+        </p:nvSpPr>
+        <p:spPr>
+          <a:xfrm>
+            <a:off x="335360" y="1196754"/>
+            <a:ext cx="11463350" cy="4929411"/>
+          </a:xfrm>
+        </p:spPr>
+        <p:txBody>
+          <a:bodyPr/>
+          <a:lstStyle/>
+          <a:p>
+            <a:r>
+              <a:rPr lang="en-GB" dirty="0"/>
+              <a:t>Basic image loading with </a:t>
+            </a:r>
+            <a:r>
+              <a:rPr lang="en-GB" i="1" dirty="0" err="1">
+                <a:solidFill>
+                  <a:schemeClr val="accent1"/>
+                </a:solidFill>
+              </a:rPr>
+              <a:t>bfopen</a:t>
+            </a:r>
+            <a:endParaRPr lang="en-GB" i="1" dirty="0">
+              <a:solidFill>
+                <a:schemeClr val="accent1"/>
+              </a:solidFill>
+            </a:endParaRPr>
+          </a:p>
+          <a:p>
+            <a:pPr lvl="1"/>
+            <a:r>
+              <a:rPr lang="en-GB" dirty="0">
+                <a:solidFill>
+                  <a:srgbClr val="C00000"/>
+                </a:solidFill>
+              </a:rPr>
+              <a:t>Outputs nested cell structure with one row per series</a:t>
+            </a:r>
+          </a:p>
+          <a:p>
+            <a:pPr lvl="1"/>
+            <a:endParaRPr lang="en-GB" sz="1200" i="1" dirty="0">
+              <a:solidFill>
+                <a:srgbClr val="C00000"/>
+              </a:solidFill>
+            </a:endParaRPr>
+          </a:p>
+          <a:p>
+            <a:endParaRPr lang="en-GB" i="1" dirty="0">
+              <a:solidFill>
+                <a:srgbClr val="C00000"/>
+              </a:solidFill>
+            </a:endParaRPr>
+          </a:p>
+          <a:p>
+            <a:endParaRPr lang="en-GB" dirty="0">
+              <a:solidFill>
+                <a:srgbClr val="C00000"/>
+              </a:solidFill>
+            </a:endParaRPr>
+          </a:p>
+          <a:p>
+            <a:pPr marL="914400" lvl="2" indent="0">
+              <a:buNone/>
+            </a:pPr>
+            <a:endParaRPr lang="en-GB" dirty="0">
+              <a:solidFill>
+                <a:srgbClr val="C00000"/>
+              </a:solidFill>
+            </a:endParaRPr>
+          </a:p>
+          <a:p>
+            <a:pPr lvl="1"/>
+            <a:endParaRPr lang="en-GB" dirty="0"/>
+          </a:p>
+        </p:txBody>
+      </p:sp>
+      <p:sp>
+        <p:nvSpPr>
+          <p:cNvPr id="9" name="TextBox 8">
+            <a:extLst>
+              <a:ext uri="{FF2B5EF4-FFF2-40B4-BE49-F238E27FC236}">
+                <a16:creationId xmlns:a16="http://schemas.microsoft.com/office/drawing/2014/main" id="{98AE3EDE-E100-4B77-BF04-83AF18153431}"/>
+              </a:ext>
+            </a:extLst>
+          </p:cNvPr>
+          <p:cNvSpPr txBox="1"/>
+          <p:nvPr/>
+        </p:nvSpPr>
+        <p:spPr>
+          <a:xfrm>
+            <a:off x="55236" y="2548568"/>
+            <a:ext cx="4661790" cy="461665"/>
+          </a:xfrm>
+          <a:prstGeom prst="rect">
+            <a:avLst/>
+          </a:prstGeom>
+          <a:noFill/>
+        </p:spPr>
+        <p:txBody>
+          <a:bodyPr wrap="square" rtlCol="0">
+            <a:spAutoFit/>
+          </a:bodyPr>
+          <a:lstStyle/>
+          <a:p>
+            <a:pPr algn="ctr"/>
+            <a:r>
+              <a:rPr lang="en-GB" sz="2400" dirty="0">
+                <a:solidFill>
+                  <a:srgbClr val="FF0000"/>
+                </a:solidFill>
+              </a:rPr>
+              <a:t>Type .get, then press tab</a:t>
+            </a:r>
+          </a:p>
+        </p:txBody>
+      </p:sp>
+      <p:cxnSp>
+        <p:nvCxnSpPr>
+          <p:cNvPr id="10" name="Straight Arrow Connector 9">
+            <a:extLst>
+              <a:ext uri="{FF2B5EF4-FFF2-40B4-BE49-F238E27FC236}">
+                <a16:creationId xmlns:a16="http://schemas.microsoft.com/office/drawing/2014/main" id="{3400CE82-F430-4D55-A66C-E28A60941DD2}"/>
+              </a:ext>
+            </a:extLst>
+          </p:cNvPr>
+          <p:cNvCxnSpPr>
+            <a:cxnSpLocks/>
+          </p:cNvCxnSpPr>
+          <p:nvPr/>
+        </p:nvCxnSpPr>
+        <p:spPr>
+          <a:xfrm>
+            <a:off x="2386131" y="3008170"/>
+            <a:ext cx="0" cy="1663376"/>
+          </a:xfrm>
+          <a:prstGeom prst="straightConnector1">
+            <a:avLst/>
+          </a:prstGeom>
+          <a:ln w="28575">
+            <a:solidFill>
+              <a:srgbClr val="FF0000"/>
+            </a:solidFill>
+            <a:tailEnd type="triangle" w="lg" len="lg"/>
+          </a:ln>
+        </p:spPr>
+        <p:style>
+          <a:lnRef idx="1">
+            <a:schemeClr val="accent1"/>
+          </a:lnRef>
+          <a:fillRef idx="0">
+            <a:schemeClr val="accent1"/>
+          </a:fillRef>
+          <a:effectRef idx="0">
+            <a:schemeClr val="accent1"/>
+          </a:effectRef>
+          <a:fontRef idx="minor">
+            <a:schemeClr val="tx1"/>
+          </a:fontRef>
+        </p:style>
+      </p:cxnSp>
+      <p:sp>
+        <p:nvSpPr>
+          <p:cNvPr id="12" name="Rectangle 11">
+            <a:extLst>
+              <a:ext uri="{FF2B5EF4-FFF2-40B4-BE49-F238E27FC236}">
+                <a16:creationId xmlns:a16="http://schemas.microsoft.com/office/drawing/2014/main" id="{1AD6AEBD-113E-4B6C-8C0E-88A762058B81}"/>
+              </a:ext>
+            </a:extLst>
+          </p:cNvPr>
+          <p:cNvSpPr/>
+          <p:nvPr/>
+        </p:nvSpPr>
+        <p:spPr>
+          <a:xfrm>
+            <a:off x="1678540" y="4671546"/>
+            <a:ext cx="1415180" cy="228350"/>
+          </a:xfrm>
+          <a:prstGeom prst="rect">
+            <a:avLst/>
+          </a:prstGeom>
+          <a:noFill/>
+          <a:ln>
+            <a:solidFill>
+              <a:srgbClr val="FF0000"/>
+            </a:solidFill>
+          </a:ln>
+        </p:spPr>
+        <p:style>
+          <a:lnRef idx="2">
+            <a:schemeClr val="accent1">
+              <a:shade val="50000"/>
+            </a:schemeClr>
+          </a:lnRef>
+          <a:fillRef idx="1">
+            <a:schemeClr val="accent1"/>
+          </a:fillRef>
+          <a:effectRef idx="0">
+            <a:schemeClr val="accent1"/>
+          </a:effectRef>
+          <a:fontRef idx="minor">
+            <a:schemeClr val="lt1"/>
+          </a:fontRef>
+        </p:style>
+        <p:txBody>
+          <a:bodyPr rtlCol="0" anchor="ctr"/>
+          <a:lstStyle/>
+          <a:p>
+            <a:pPr algn="ctr"/>
+            <a:endParaRPr lang="en-GB"/>
+          </a:p>
+        </p:txBody>
+      </p:sp>
+    </p:spTree>
+    <p:extLst>
+      <p:ext uri="{BB962C8B-B14F-4D97-AF65-F5344CB8AC3E}">
+        <p14:creationId xmlns:p14="http://schemas.microsoft.com/office/powerpoint/2010/main" val="2530991976"/>
+      </p:ext>
+    </p:extLst>
+  </p:cSld>
+  <p:clrMapOvr>
+    <a:masterClrMapping/>
+  </p:clrMapOvr>
+  <mc:AlternateContent xmlns:mc="http://schemas.openxmlformats.org/markup-compatibility/2006" xmlns:p14="http://schemas.microsoft.com/office/powerpoint/2010/main">
+    <mc:Choice Requires="p14">
+      <p:transition p14:dur="300">
+        <p:fade/>
+      </p:transition>
+    </mc:Choice>
+    <mc:Fallback xmlns="">
+      <p:transition>
+        <p:fade/>
+      </p:transition>
+    </mc:Fallback>
+  </mc:AlternateContent>
+  <p:timing>
+    <p:tnLst>
+      <p:par>
+        <p:cTn id="1" dur="indefinite" restart="never" nodeType="tmRoot">
+          <p:childTnLst>
+            <p:seq concurrent="1" nextAc="seek">
+              <p:cTn id="2" dur="indefinite" nodeType="mainSeq">
+                <p:childTnLst>
+                  <p:par>
+                    <p:cTn id="3" fill="hold">
+                      <p:stCondLst>
+                        <p:cond delay="indefinite"/>
+                      </p:stCondLst>
+                      <p:childTnLst>
+                        <p:par>
+                          <p:cTn id="4" fill="hold">
+                            <p:stCondLst>
+                              <p:cond delay="0"/>
+                            </p:stCondLst>
+                            <p:childTnLst>
+                              <p:par>
+                                <p:cTn id="5" presetID="10" presetClass="entr" presetSubtype="0" fill="hold" grpId="0" nodeType="clickEffect">
+                                  <p:stCondLst>
+                                    <p:cond delay="0"/>
+                                  </p:stCondLst>
+                                  <p:childTnLst>
+                                    <p:set>
+                                      <p:cBhvr>
+                                        <p:cTn id="6" dur="1" fill="hold">
+                                          <p:stCondLst>
+                                            <p:cond delay="0"/>
+                                          </p:stCondLst>
+                                        </p:cTn>
+                                        <p:tgtEl>
+                                          <p:spTgt spid="9"/>
+                                        </p:tgtEl>
+                                        <p:attrNameLst>
+                                          <p:attrName>style.visibility</p:attrName>
+                                        </p:attrNameLst>
+                                      </p:cBhvr>
+                                      <p:to>
+                                        <p:strVal val="visible"/>
+                                      </p:to>
+                                    </p:set>
+                                    <p:animEffect transition="in" filter="fade">
+                                      <p:cBhvr>
+                                        <p:cTn id="7" dur="300"/>
+                                        <p:tgtEl>
+                                          <p:spTgt spid="9"/>
+                                        </p:tgtEl>
+                                      </p:cBhvr>
+                                    </p:animEffect>
+                                  </p:childTnLst>
+                                </p:cTn>
+                              </p:par>
+                              <p:par>
+                                <p:cTn id="8" presetID="10" presetClass="entr" presetSubtype="0" fill="hold" nodeType="withEffect">
+                                  <p:stCondLst>
+                                    <p:cond delay="0"/>
+                                  </p:stCondLst>
+                                  <p:childTnLst>
+                                    <p:set>
+                                      <p:cBhvr>
+                                        <p:cTn id="9" dur="1" fill="hold">
+                                          <p:stCondLst>
+                                            <p:cond delay="0"/>
+                                          </p:stCondLst>
+                                        </p:cTn>
+                                        <p:tgtEl>
+                                          <p:spTgt spid="10"/>
+                                        </p:tgtEl>
+                                        <p:attrNameLst>
+                                          <p:attrName>style.visibility</p:attrName>
+                                        </p:attrNameLst>
+                                      </p:cBhvr>
+                                      <p:to>
+                                        <p:strVal val="visible"/>
+                                      </p:to>
+                                    </p:set>
+                                    <p:animEffect transition="in" filter="fade">
+                                      <p:cBhvr>
+                                        <p:cTn id="10" dur="300"/>
+                                        <p:tgtEl>
+                                          <p:spTgt spid="10"/>
+                                        </p:tgtEl>
+                                      </p:cBhvr>
+                                    </p:animEffect>
+                                  </p:childTnLst>
+                                </p:cTn>
+                              </p:par>
+                              <p:par>
+                                <p:cTn id="11" presetID="10" presetClass="entr" presetSubtype="0" fill="hold" grpId="0" nodeType="withEffect">
+                                  <p:stCondLst>
+                                    <p:cond delay="0"/>
+                                  </p:stCondLst>
+                                  <p:childTnLst>
+                                    <p:set>
+                                      <p:cBhvr>
+                                        <p:cTn id="12" dur="1" fill="hold">
+                                          <p:stCondLst>
+                                            <p:cond delay="0"/>
+                                          </p:stCondLst>
+                                        </p:cTn>
+                                        <p:tgtEl>
+                                          <p:spTgt spid="12"/>
+                                        </p:tgtEl>
+                                        <p:attrNameLst>
+                                          <p:attrName>style.visibility</p:attrName>
+                                        </p:attrNameLst>
+                                      </p:cBhvr>
+                                      <p:to>
+                                        <p:strVal val="visible"/>
+                                      </p:to>
+                                    </p:set>
+                                    <p:animEffect transition="in" filter="fade">
+                                      <p:cBhvr>
+                                        <p:cTn id="13" dur="300"/>
+                                        <p:tgtEl>
+                                          <p:spTgt spid="12"/>
+                                        </p:tgtEl>
+                                      </p:cBhvr>
+                                    </p:animEffect>
+                                  </p:childTnLst>
+                                </p:cTn>
+                              </p:par>
+                            </p:childTnLst>
+                          </p:cTn>
+                        </p:par>
+                      </p:childTnLst>
+                    </p:cTn>
+                  </p:par>
+                </p:childTnLst>
+              </p:cTn>
+              <p:prevCondLst>
+                <p:cond evt="onPrev" delay="0">
+                  <p:tgtEl>
+                    <p:sldTgt/>
+                  </p:tgtEl>
+                </p:cond>
+              </p:prevCondLst>
+              <p:nextCondLst>
+                <p:cond evt="onNext" delay="0">
+                  <p:tgtEl>
+                    <p:sldTgt/>
+                  </p:tgtEl>
+                </p:cond>
+              </p:nextCondLst>
+            </p:seq>
+          </p:childTnLst>
+        </p:cTn>
+      </p:par>
+    </p:tnLst>
+    <p:bldLst>
+      <p:bldP spid="9" grpId="0"/>
+      <p:bldP spid="12" grpId="0" animBg="1"/>
+    </p:bldLst>
+  </p:timing>
+</p:sld>
+</file>
+
+<file path=ppt/slides/slide55.xml><?xml version="1.0" encoding="utf-8"?>
+<p:sld xmlns:a="http://schemas.openxmlformats.org/drawingml/2006/main" xmlns:r="http://schemas.openxmlformats.org/officeDocument/2006/relationships" xmlns:p="http://schemas.openxmlformats.org/presentationml/2006/main">
+  <p:cSld>
+    <p:spTree>
+      <p:nvGrpSpPr>
+        <p:cNvPr id="1" name=""/>
+        <p:cNvGrpSpPr/>
+        <p:nvPr/>
+      </p:nvGrpSpPr>
+      <p:grpSpPr>
+        <a:xfrm>
+          <a:off x="0" y="0"/>
+          <a:ext cx="0" cy="0"/>
+          <a:chOff x="0" y="0"/>
+          <a:chExt cx="0" cy="0"/>
+        </a:xfrm>
+      </p:grpSpPr>
+      <p:pic>
+        <p:nvPicPr>
+          <p:cNvPr id="4" name="Picture 3">
+            <a:extLst>
+              <a:ext uri="{FF2B5EF4-FFF2-40B4-BE49-F238E27FC236}">
+                <a16:creationId xmlns:a16="http://schemas.microsoft.com/office/drawing/2014/main" id="{C2A0FC10-8862-4451-BBFA-C15FC5D49676}"/>
+              </a:ext>
+            </a:extLst>
+          </p:cNvPr>
+          <p:cNvPicPr>
+            <a:picLocks noChangeAspect="1"/>
+          </p:cNvPicPr>
+          <p:nvPr/>
+        </p:nvPicPr>
+        <p:blipFill>
+          <a:blip r:embed="rId2"/>
+          <a:stretch>
+            <a:fillRect/>
+          </a:stretch>
+        </p:blipFill>
+        <p:spPr>
+          <a:xfrm>
+            <a:off x="1191238" y="3183983"/>
+            <a:ext cx="9809524" cy="2857143"/>
+          </a:xfrm>
+          <a:prstGeom prst="rect">
+            <a:avLst/>
+          </a:prstGeom>
+          <a:ln w="12700">
+            <a:solidFill>
+              <a:srgbClr val="C00000"/>
+            </a:solidFill>
+          </a:ln>
+        </p:spPr>
+      </p:pic>
+      <p:sp>
+        <p:nvSpPr>
+          <p:cNvPr id="2" name="Title 1">
+            <a:extLst>
+              <a:ext uri="{FF2B5EF4-FFF2-40B4-BE49-F238E27FC236}">
+                <a16:creationId xmlns:a16="http://schemas.microsoft.com/office/drawing/2014/main" id="{FB0D9636-2B3A-4E3D-9B13-904FF3CE8CE3}"/>
+              </a:ext>
+            </a:extLst>
+          </p:cNvPr>
+          <p:cNvSpPr>
+            <a:spLocks noGrp="1"/>
+          </p:cNvSpPr>
+          <p:nvPr>
+            <p:ph type="title"/>
+          </p:nvPr>
+        </p:nvSpPr>
+        <p:spPr/>
+        <p:txBody>
+          <a:bodyPr/>
+          <a:lstStyle/>
+          <a:p>
+            <a:r>
+              <a:rPr lang="en-GB" dirty="0"/>
+              <a:t>Bio-Formats and MATLAB</a:t>
+            </a:r>
+          </a:p>
+        </p:txBody>
+      </p:sp>
+      <p:sp>
+        <p:nvSpPr>
+          <p:cNvPr id="3" name="Content Placeholder 2">
+            <a:extLst>
+              <a:ext uri="{FF2B5EF4-FFF2-40B4-BE49-F238E27FC236}">
+                <a16:creationId xmlns:a16="http://schemas.microsoft.com/office/drawing/2014/main" id="{DFE43EAF-8F5E-44D2-BF28-45DAFCB5DD96}"/>
+              </a:ext>
+            </a:extLst>
+          </p:cNvPr>
+          <p:cNvSpPr>
+            <a:spLocks noGrp="1"/>
+          </p:cNvSpPr>
+          <p:nvPr>
+            <p:ph idx="1"/>
+          </p:nvPr>
+        </p:nvSpPr>
+        <p:spPr>
+          <a:xfrm>
+            <a:off x="335360" y="1196754"/>
+            <a:ext cx="11443685" cy="4929411"/>
+          </a:xfrm>
+        </p:spPr>
+        <p:txBody>
+          <a:bodyPr/>
+          <a:lstStyle/>
+          <a:p>
+            <a:r>
+              <a:rPr lang="en-GB" dirty="0"/>
+              <a:t>Basic image loading with </a:t>
+            </a:r>
+            <a:r>
+              <a:rPr lang="en-GB" i="1" dirty="0" err="1">
+                <a:solidFill>
+                  <a:schemeClr val="accent1"/>
+                </a:solidFill>
+              </a:rPr>
+              <a:t>bfopen</a:t>
+            </a:r>
+            <a:endParaRPr lang="en-GB" i="1" dirty="0">
+              <a:solidFill>
+                <a:schemeClr val="accent1"/>
+              </a:solidFill>
+            </a:endParaRPr>
+          </a:p>
+          <a:p>
+            <a:pPr lvl="1"/>
+            <a:r>
+              <a:rPr lang="en-GB" dirty="0">
+                <a:solidFill>
+                  <a:srgbClr val="C00000"/>
+                </a:solidFill>
+              </a:rPr>
+              <a:t>Outputs nested cell structure with one row per series</a:t>
+            </a:r>
+          </a:p>
+          <a:p>
+            <a:pPr lvl="1"/>
+            <a:endParaRPr lang="en-GB" sz="1200" i="1" dirty="0">
+              <a:solidFill>
+                <a:srgbClr val="C00000"/>
+              </a:solidFill>
+            </a:endParaRPr>
+          </a:p>
+          <a:p>
+            <a:endParaRPr lang="en-GB" i="1" dirty="0">
+              <a:solidFill>
+                <a:srgbClr val="C00000"/>
+              </a:solidFill>
+            </a:endParaRPr>
+          </a:p>
+          <a:p>
+            <a:endParaRPr lang="en-GB" dirty="0">
+              <a:solidFill>
+                <a:srgbClr val="C00000"/>
+              </a:solidFill>
+            </a:endParaRPr>
+          </a:p>
+          <a:p>
+            <a:pPr marL="914400" lvl="2" indent="0">
+              <a:buNone/>
+            </a:pPr>
+            <a:endParaRPr lang="en-GB" dirty="0">
+              <a:solidFill>
+                <a:srgbClr val="C00000"/>
+              </a:solidFill>
+            </a:endParaRPr>
+          </a:p>
+          <a:p>
+            <a:pPr lvl="1"/>
+            <a:endParaRPr lang="en-GB" dirty="0"/>
+          </a:p>
+        </p:txBody>
+      </p:sp>
+      <p:pic>
+        <p:nvPicPr>
+          <p:cNvPr id="13" name="Picture 12">
+            <a:extLst>
+              <a:ext uri="{FF2B5EF4-FFF2-40B4-BE49-F238E27FC236}">
+                <a16:creationId xmlns:a16="http://schemas.microsoft.com/office/drawing/2014/main" id="{F36CEB16-2B81-4E68-9519-2F30B99DA756}"/>
+              </a:ext>
+            </a:extLst>
+          </p:cNvPr>
+          <p:cNvPicPr>
+            <a:picLocks noChangeAspect="1"/>
+          </p:cNvPicPr>
+          <p:nvPr/>
+        </p:nvPicPr>
+        <p:blipFill>
+          <a:blip r:embed="rId3"/>
+          <a:stretch>
+            <a:fillRect/>
+          </a:stretch>
+        </p:blipFill>
+        <p:spPr>
+          <a:xfrm>
+            <a:off x="3165849" y="2699554"/>
+            <a:ext cx="5419048" cy="1923810"/>
+          </a:xfrm>
+          <a:prstGeom prst="rect">
+            <a:avLst/>
+          </a:prstGeom>
+        </p:spPr>
+      </p:pic>
+    </p:spTree>
+    <p:extLst>
+      <p:ext uri="{BB962C8B-B14F-4D97-AF65-F5344CB8AC3E}">
+        <p14:creationId xmlns:p14="http://schemas.microsoft.com/office/powerpoint/2010/main" val="3363281671"/>
+      </p:ext>
+    </p:extLst>
+  </p:cSld>
+  <p:clrMapOvr>
+    <a:masterClrMapping/>
+  </p:clrMapOvr>
+  <mc:AlternateContent xmlns:mc="http://schemas.openxmlformats.org/markup-compatibility/2006" xmlns:p14="http://schemas.microsoft.com/office/powerpoint/2010/main">
+    <mc:Choice Requires="p14">
+      <p:transition p14:dur="300">
+        <p:fade/>
+      </p:transition>
+    </mc:Choice>
+    <mc:Fallback xmlns="">
+      <p:transition>
+        <p:fade/>
+      </p:transition>
+    </mc:Fallback>
+  </mc:AlternateContent>
+</p:sld>
+</file>
+
+<file path=ppt/slides/slide56.xml><?xml version="1.0" encoding="utf-8"?>
+<p:sld xmlns:a="http://schemas.openxmlformats.org/drawingml/2006/main" xmlns:r="http://schemas.openxmlformats.org/officeDocument/2006/relationships" xmlns:p="http://schemas.openxmlformats.org/presentationml/2006/main">
+  <p:cSld>
+    <p:spTree>
+      <p:nvGrpSpPr>
+        <p:cNvPr id="1" name=""/>
+        <p:cNvGrpSpPr/>
+        <p:nvPr/>
+      </p:nvGrpSpPr>
+      <p:grpSpPr>
+        <a:xfrm>
+          <a:off x="0" y="0"/>
+          <a:ext cx="0" cy="0"/>
+          <a:chOff x="0" y="0"/>
+          <a:chExt cx="0" cy="0"/>
+        </a:xfrm>
+      </p:grpSpPr>
+      <p:pic>
+        <p:nvPicPr>
+          <p:cNvPr id="5" name="Picture 4">
+            <a:extLst>
+              <a:ext uri="{FF2B5EF4-FFF2-40B4-BE49-F238E27FC236}">
+                <a16:creationId xmlns:a16="http://schemas.microsoft.com/office/drawing/2014/main" id="{D45375C9-C69E-4D8E-B14D-A20F73555770}"/>
+              </a:ext>
+            </a:extLst>
+          </p:cNvPr>
+          <p:cNvPicPr>
+            <a:picLocks noChangeAspect="1"/>
+          </p:cNvPicPr>
+          <p:nvPr/>
+        </p:nvPicPr>
+        <p:blipFill>
+          <a:blip r:embed="rId2"/>
+          <a:stretch>
+            <a:fillRect/>
+          </a:stretch>
+        </p:blipFill>
+        <p:spPr>
+          <a:xfrm>
+            <a:off x="1191238" y="3183983"/>
+            <a:ext cx="9809524" cy="2857143"/>
+          </a:xfrm>
+          <a:prstGeom prst="rect">
+            <a:avLst/>
+          </a:prstGeom>
+          <a:ln w="12700">
+            <a:solidFill>
+              <a:srgbClr val="C00000"/>
+            </a:solidFill>
+          </a:ln>
+        </p:spPr>
+      </p:pic>
+      <p:sp>
+        <p:nvSpPr>
+          <p:cNvPr id="2" name="Title 1">
+            <a:extLst>
+              <a:ext uri="{FF2B5EF4-FFF2-40B4-BE49-F238E27FC236}">
+                <a16:creationId xmlns:a16="http://schemas.microsoft.com/office/drawing/2014/main" id="{FB0D9636-2B3A-4E3D-9B13-904FF3CE8CE3}"/>
+              </a:ext>
+            </a:extLst>
+          </p:cNvPr>
+          <p:cNvSpPr>
+            <a:spLocks noGrp="1"/>
+          </p:cNvSpPr>
+          <p:nvPr>
+            <p:ph type="title"/>
+          </p:nvPr>
+        </p:nvSpPr>
+        <p:spPr/>
+        <p:txBody>
+          <a:bodyPr/>
+          <a:lstStyle/>
+          <a:p>
+            <a:r>
+              <a:rPr lang="en-GB" dirty="0"/>
+              <a:t>Bio-Formats and MATLAB</a:t>
+            </a:r>
+          </a:p>
+        </p:txBody>
+      </p:sp>
+      <p:sp>
+        <p:nvSpPr>
+          <p:cNvPr id="3" name="Content Placeholder 2">
+            <a:extLst>
+              <a:ext uri="{FF2B5EF4-FFF2-40B4-BE49-F238E27FC236}">
+                <a16:creationId xmlns:a16="http://schemas.microsoft.com/office/drawing/2014/main" id="{DFE43EAF-8F5E-44D2-BF28-45DAFCB5DD96}"/>
+              </a:ext>
+            </a:extLst>
+          </p:cNvPr>
+          <p:cNvSpPr>
+            <a:spLocks noGrp="1"/>
+          </p:cNvSpPr>
+          <p:nvPr>
+            <p:ph idx="1"/>
+          </p:nvPr>
+        </p:nvSpPr>
+        <p:spPr>
+          <a:xfrm>
+            <a:off x="335360" y="1196754"/>
+            <a:ext cx="11433853" cy="4929411"/>
+          </a:xfrm>
+        </p:spPr>
+        <p:txBody>
+          <a:bodyPr/>
+          <a:lstStyle/>
+          <a:p>
+            <a:r>
+              <a:rPr lang="en-GB" dirty="0"/>
+              <a:t>Basic image loading with </a:t>
+            </a:r>
+            <a:r>
+              <a:rPr lang="en-GB" i="1" dirty="0" err="1">
+                <a:solidFill>
+                  <a:schemeClr val="accent1"/>
+                </a:solidFill>
+              </a:rPr>
+              <a:t>bfopen</a:t>
+            </a:r>
+            <a:endParaRPr lang="en-GB" i="1" dirty="0">
+              <a:solidFill>
+                <a:schemeClr val="accent1"/>
+              </a:solidFill>
+            </a:endParaRPr>
+          </a:p>
+          <a:p>
+            <a:pPr lvl="1"/>
+            <a:r>
+              <a:rPr lang="en-GB" dirty="0">
+                <a:solidFill>
+                  <a:srgbClr val="C00000"/>
+                </a:solidFill>
+              </a:rPr>
+              <a:t>Outputs nested cell structure with one row per series</a:t>
+            </a:r>
+          </a:p>
+          <a:p>
+            <a:pPr lvl="1"/>
+            <a:endParaRPr lang="en-GB" sz="1200" i="1" dirty="0">
+              <a:solidFill>
+                <a:srgbClr val="C00000"/>
+              </a:solidFill>
+            </a:endParaRPr>
+          </a:p>
+          <a:p>
+            <a:endParaRPr lang="en-GB" i="1" dirty="0">
+              <a:solidFill>
+                <a:srgbClr val="C00000"/>
+              </a:solidFill>
+            </a:endParaRPr>
+          </a:p>
+          <a:p>
+            <a:endParaRPr lang="en-GB" dirty="0">
+              <a:solidFill>
+                <a:srgbClr val="C00000"/>
+              </a:solidFill>
+            </a:endParaRPr>
+          </a:p>
+          <a:p>
+            <a:pPr marL="914400" lvl="2" indent="0">
+              <a:buNone/>
+            </a:pPr>
+            <a:endParaRPr lang="en-GB" dirty="0">
+              <a:solidFill>
+                <a:srgbClr val="C00000"/>
+              </a:solidFill>
+            </a:endParaRPr>
+          </a:p>
+          <a:p>
+            <a:pPr lvl="1"/>
+            <a:endParaRPr lang="en-GB" dirty="0"/>
+          </a:p>
+        </p:txBody>
+      </p:sp>
+    </p:spTree>
+    <p:extLst>
+      <p:ext uri="{BB962C8B-B14F-4D97-AF65-F5344CB8AC3E}">
+        <p14:creationId xmlns:p14="http://schemas.microsoft.com/office/powerpoint/2010/main" val="3886738883"/>
+      </p:ext>
+    </p:extLst>
+  </p:cSld>
+  <p:clrMapOvr>
+    <a:masterClrMapping/>
+  </p:clrMapOvr>
+  <mc:AlternateContent xmlns:mc="http://schemas.openxmlformats.org/markup-compatibility/2006" xmlns:p14="http://schemas.microsoft.com/office/powerpoint/2010/main">
+    <mc:Choice Requires="p14">
+      <p:transition p14:dur="300">
+        <p:fade/>
+      </p:transition>
+    </mc:Choice>
+    <mc:Fallback xmlns="">
+      <p:transition>
+        <p:fade/>
+      </p:transition>
+    </mc:Fallback>
+  </mc:AlternateContent>
+</p:sld>
+</file>
+
+<file path=ppt/slides/slide57.xml><?xml version="1.0" encoding="utf-8"?>
+<p:sld xmlns:a="http://schemas.openxmlformats.org/drawingml/2006/main" xmlns:r="http://schemas.openxmlformats.org/officeDocument/2006/relationships" xmlns:p="http://schemas.openxmlformats.org/presentationml/2006/main">
+  <p:cSld>
+    <p:spTree>
+      <p:nvGrpSpPr>
+        <p:cNvPr id="1" name=""/>
+        <p:cNvGrpSpPr/>
+        <p:nvPr/>
+      </p:nvGrpSpPr>
+      <p:grpSpPr>
+        <a:xfrm>
+          <a:off x="0" y="0"/>
+          <a:ext cx="0" cy="0"/>
+          <a:chOff x="0" y="0"/>
+          <a:chExt cx="0" cy="0"/>
+        </a:xfrm>
+      </p:grpSpPr>
+      <p:sp>
+        <p:nvSpPr>
+          <p:cNvPr id="2" name="Title 1">
+            <a:extLst>
+              <a:ext uri="{FF2B5EF4-FFF2-40B4-BE49-F238E27FC236}">
+                <a16:creationId xmlns:a16="http://schemas.microsoft.com/office/drawing/2014/main" id="{FB0D9636-2B3A-4E3D-9B13-904FF3CE8CE3}"/>
+              </a:ext>
+            </a:extLst>
+          </p:cNvPr>
+          <p:cNvSpPr>
+            <a:spLocks noGrp="1"/>
+          </p:cNvSpPr>
+          <p:nvPr>
+            <p:ph type="title"/>
+          </p:nvPr>
+        </p:nvSpPr>
+        <p:spPr/>
+        <p:txBody>
+          <a:bodyPr/>
+          <a:lstStyle/>
+          <a:p>
+            <a:r>
+              <a:rPr lang="en-GB" dirty="0"/>
+              <a:t>Bio-Formats and MATLAB</a:t>
+            </a:r>
+          </a:p>
+        </p:txBody>
+      </p:sp>
+      <p:sp>
+        <p:nvSpPr>
+          <p:cNvPr id="3" name="Content Placeholder 2">
+            <a:extLst>
+              <a:ext uri="{FF2B5EF4-FFF2-40B4-BE49-F238E27FC236}">
+                <a16:creationId xmlns:a16="http://schemas.microsoft.com/office/drawing/2014/main" id="{DFE43EAF-8F5E-44D2-BF28-45DAFCB5DD96}"/>
+              </a:ext>
+            </a:extLst>
+          </p:cNvPr>
+          <p:cNvSpPr>
+            <a:spLocks noGrp="1"/>
+          </p:cNvSpPr>
+          <p:nvPr>
+            <p:ph idx="1"/>
+          </p:nvPr>
+        </p:nvSpPr>
+        <p:spPr>
+          <a:xfrm>
+            <a:off x="335360" y="1196754"/>
+            <a:ext cx="11433853" cy="4929411"/>
+          </a:xfrm>
+        </p:spPr>
+        <p:txBody>
+          <a:bodyPr/>
+          <a:lstStyle/>
+          <a:p>
+            <a:r>
+              <a:rPr lang="en-GB" dirty="0"/>
+              <a:t>This is fine, but all data is loaded to PC memory</a:t>
+            </a:r>
+          </a:p>
+          <a:p>
+            <a:pPr lvl="1"/>
+            <a:endParaRPr lang="en-GB" sz="1200" dirty="0"/>
+          </a:p>
+          <a:p>
+            <a:r>
+              <a:rPr lang="en-GB" dirty="0"/>
+              <a:t>What if we only want to load a single series?</a:t>
+            </a:r>
+          </a:p>
+          <a:p>
+            <a:pPr lvl="1"/>
+            <a:r>
+              <a:rPr lang="en-GB" dirty="0"/>
+              <a:t>To do this, we need the Bio-Formats Reader object</a:t>
+            </a:r>
+          </a:p>
+          <a:p>
+            <a:pPr marL="914400" lvl="2" indent="0">
+              <a:buNone/>
+            </a:pPr>
+            <a:r>
+              <a:rPr lang="en-GB" i="1" dirty="0" err="1">
+                <a:solidFill>
+                  <a:schemeClr val="accent1"/>
+                </a:solidFill>
+              </a:rPr>
+              <a:t>reader_obj</a:t>
+            </a:r>
+            <a:r>
+              <a:rPr lang="en-GB" i="1" dirty="0">
+                <a:solidFill>
+                  <a:schemeClr val="accent1"/>
+                </a:solidFill>
+              </a:rPr>
+              <a:t> = </a:t>
+            </a:r>
+            <a:r>
+              <a:rPr lang="en-GB" i="1" dirty="0" err="1">
+                <a:solidFill>
+                  <a:schemeClr val="accent1"/>
+                </a:solidFill>
+              </a:rPr>
+              <a:t>bfGetReader</a:t>
+            </a:r>
+            <a:r>
+              <a:rPr lang="en-GB" i="1" dirty="0">
+                <a:solidFill>
+                  <a:schemeClr val="accent1"/>
+                </a:solidFill>
+              </a:rPr>
+              <a:t>(‘</a:t>
+            </a:r>
+            <a:r>
+              <a:rPr lang="en-GB" i="1" dirty="0" err="1">
+                <a:solidFill>
+                  <a:schemeClr val="accent1"/>
+                </a:solidFill>
+              </a:rPr>
+              <a:t>Example.lif</a:t>
+            </a:r>
+            <a:r>
+              <a:rPr lang="en-GB" i="1" dirty="0">
+                <a:solidFill>
+                  <a:schemeClr val="accent1"/>
+                </a:solidFill>
+              </a:rPr>
+              <a:t>’)</a:t>
+            </a:r>
+          </a:p>
+          <a:p>
+            <a:pPr lvl="1"/>
+            <a:r>
+              <a:rPr lang="en-GB" dirty="0"/>
+              <a:t>Accessing the reader’s OME metadata store</a:t>
+            </a:r>
+          </a:p>
+          <a:p>
+            <a:pPr marL="914400" lvl="2" indent="0">
+              <a:buNone/>
+            </a:pPr>
+            <a:r>
+              <a:rPr lang="en-GB" i="1" dirty="0" err="1">
+                <a:solidFill>
+                  <a:schemeClr val="accent1"/>
+                </a:solidFill>
+              </a:rPr>
+              <a:t>metadata_obj</a:t>
+            </a:r>
+            <a:r>
+              <a:rPr lang="en-GB" i="1" dirty="0">
+                <a:solidFill>
+                  <a:schemeClr val="accent1"/>
+                </a:solidFill>
+              </a:rPr>
+              <a:t> = </a:t>
+            </a:r>
+            <a:r>
+              <a:rPr lang="en-GB" i="1" dirty="0" err="1">
+                <a:solidFill>
+                  <a:schemeClr val="accent1"/>
+                </a:solidFill>
+              </a:rPr>
+              <a:t>reader_obj.getMetadataStore</a:t>
+            </a:r>
+            <a:r>
+              <a:rPr lang="en-GB" i="1" dirty="0">
+                <a:solidFill>
+                  <a:schemeClr val="accent1"/>
+                </a:solidFill>
+              </a:rPr>
+              <a:t>()</a:t>
+            </a:r>
+          </a:p>
+          <a:p>
+            <a:pPr lvl="1"/>
+            <a:r>
+              <a:rPr lang="en-GB" dirty="0"/>
+              <a:t>Setting the file series number (zero indexed)</a:t>
+            </a:r>
+          </a:p>
+          <a:p>
+            <a:pPr marL="914400" lvl="2" indent="0">
+              <a:buNone/>
+            </a:pPr>
+            <a:r>
+              <a:rPr lang="en-GB" i="1" dirty="0" err="1">
+                <a:solidFill>
+                  <a:schemeClr val="accent1"/>
+                </a:solidFill>
+              </a:rPr>
+              <a:t>reader_obj.setSeries</a:t>
+            </a:r>
+            <a:r>
+              <a:rPr lang="en-GB" i="1" dirty="0">
+                <a:solidFill>
+                  <a:schemeClr val="accent1"/>
+                </a:solidFill>
+              </a:rPr>
+              <a:t>(2)</a:t>
+            </a:r>
+          </a:p>
+          <a:p>
+            <a:pPr lvl="1"/>
+            <a:r>
+              <a:rPr lang="en-GB" dirty="0"/>
+              <a:t>Reading a single plane</a:t>
+            </a:r>
+          </a:p>
+          <a:p>
+            <a:pPr marL="914400" lvl="2" indent="0">
+              <a:buNone/>
+            </a:pPr>
+            <a:r>
+              <a:rPr lang="en-GB" i="1" dirty="0" err="1">
+                <a:solidFill>
+                  <a:schemeClr val="accent1"/>
+                </a:solidFill>
+              </a:rPr>
+              <a:t>image_plane</a:t>
+            </a:r>
+            <a:r>
+              <a:rPr lang="en-GB" i="1" dirty="0">
+                <a:solidFill>
+                  <a:schemeClr val="accent1"/>
+                </a:solidFill>
+              </a:rPr>
+              <a:t> = </a:t>
+            </a:r>
+            <a:r>
+              <a:rPr lang="en-GB" i="1" dirty="0" err="1">
+                <a:solidFill>
+                  <a:schemeClr val="accent1"/>
+                </a:solidFill>
+              </a:rPr>
+              <a:t>bfGetPlane</a:t>
+            </a:r>
+            <a:r>
+              <a:rPr lang="en-GB" i="1" dirty="0">
+                <a:solidFill>
+                  <a:schemeClr val="accent1"/>
+                </a:solidFill>
+              </a:rPr>
+              <a:t>(</a:t>
+            </a:r>
+            <a:r>
+              <a:rPr lang="en-GB" i="1" dirty="0" err="1">
+                <a:solidFill>
+                  <a:schemeClr val="accent1"/>
+                </a:solidFill>
+              </a:rPr>
+              <a:t>reader_obj</a:t>
+            </a:r>
+            <a:r>
+              <a:rPr lang="en-GB" i="1" dirty="0">
+                <a:solidFill>
+                  <a:schemeClr val="accent1"/>
+                </a:solidFill>
+              </a:rPr>
+              <a:t>, 3)</a:t>
+            </a:r>
+          </a:p>
+        </p:txBody>
+      </p:sp>
+    </p:spTree>
+    <p:extLst>
+      <p:ext uri="{BB962C8B-B14F-4D97-AF65-F5344CB8AC3E}">
+        <p14:creationId xmlns:p14="http://schemas.microsoft.com/office/powerpoint/2010/main" val="2315022911"/>
+      </p:ext>
+    </p:extLst>
+  </p:cSld>
+  <p:clrMapOvr>
+    <a:masterClrMapping/>
+  </p:clrMapOvr>
+  <mc:AlternateContent xmlns:mc="http://schemas.openxmlformats.org/markup-compatibility/2006" xmlns:p14="http://schemas.microsoft.com/office/powerpoint/2010/main">
+    <mc:Choice Requires="p14">
+      <p:transition p14:dur="300">
+        <p:fade/>
+      </p:transition>
+    </mc:Choice>
+    <mc:Fallback xmlns="">
+      <p:transition>
+        <p:fade/>
+      </p:transition>
+    </mc:Fallback>
+  </mc:AlternateContent>
+</p:sld>
+</file>
+
+<file path=ppt/slides/slide58.xml><?xml version="1.0" encoding="utf-8"?>
+<p:sld xmlns:a="http://schemas.openxmlformats.org/drawingml/2006/main" xmlns:r="http://schemas.openxmlformats.org/officeDocument/2006/relationships" xmlns:p="http://schemas.openxmlformats.org/presentationml/2006/main">
+  <p:cSld>
+    <p:spTree>
+      <p:nvGrpSpPr>
+        <p:cNvPr id="1" name=""/>
+        <p:cNvGrpSpPr/>
+        <p:nvPr/>
+      </p:nvGrpSpPr>
+      <p:grpSpPr>
+        <a:xfrm>
+          <a:off x="0" y="0"/>
+          <a:ext cx="0" cy="0"/>
+          <a:chOff x="0" y="0"/>
+          <a:chExt cx="0" cy="0"/>
+        </a:xfrm>
+      </p:grpSpPr>
+      <p:sp>
+        <p:nvSpPr>
+          <p:cNvPr id="2" name="Title 1">
+            <a:extLst>
+              <a:ext uri="{FF2B5EF4-FFF2-40B4-BE49-F238E27FC236}">
+                <a16:creationId xmlns:a16="http://schemas.microsoft.com/office/drawing/2014/main" id="{FB0D9636-2B3A-4E3D-9B13-904FF3CE8CE3}"/>
+              </a:ext>
+            </a:extLst>
+          </p:cNvPr>
+          <p:cNvSpPr>
+            <a:spLocks noGrp="1"/>
+          </p:cNvSpPr>
+          <p:nvPr>
+            <p:ph type="title"/>
+          </p:nvPr>
+        </p:nvSpPr>
+        <p:spPr/>
+        <p:txBody>
+          <a:bodyPr/>
+          <a:lstStyle/>
+          <a:p>
+            <a:r>
+              <a:rPr lang="en-GB" dirty="0"/>
+              <a:t>Bio-Formats and MATLAB</a:t>
+            </a:r>
+          </a:p>
+        </p:txBody>
+      </p:sp>
+      <p:sp>
+        <p:nvSpPr>
+          <p:cNvPr id="3" name="Content Placeholder 2">
+            <a:extLst>
+              <a:ext uri="{FF2B5EF4-FFF2-40B4-BE49-F238E27FC236}">
+                <a16:creationId xmlns:a16="http://schemas.microsoft.com/office/drawing/2014/main" id="{DFE43EAF-8F5E-44D2-BF28-45DAFCB5DD96}"/>
+              </a:ext>
+            </a:extLst>
+          </p:cNvPr>
+          <p:cNvSpPr>
+            <a:spLocks noGrp="1"/>
+          </p:cNvSpPr>
+          <p:nvPr>
+            <p:ph idx="1"/>
+          </p:nvPr>
+        </p:nvSpPr>
+        <p:spPr>
+          <a:xfrm>
+            <a:off x="335360" y="1196754"/>
+            <a:ext cx="11433853" cy="4929411"/>
+          </a:xfrm>
+        </p:spPr>
+        <p:txBody>
+          <a:bodyPr/>
+          <a:lstStyle/>
+          <a:p>
+            <a:r>
+              <a:rPr lang="en-GB" dirty="0"/>
+              <a:t>Bio-Formats can also deal with higher dimensionality image stacks</a:t>
+            </a:r>
+            <a:endParaRPr lang="en-GB" sz="1200" dirty="0"/>
+          </a:p>
+          <a:p>
+            <a:pPr lvl="1"/>
+            <a:r>
+              <a:rPr lang="en-GB" dirty="0"/>
+              <a:t>[Talk about </a:t>
+            </a:r>
+            <a:r>
+              <a:rPr lang="en-GB"/>
+              <a:t>get index]</a:t>
+            </a:r>
+            <a:endParaRPr lang="en-GB" dirty="0"/>
+          </a:p>
+        </p:txBody>
+      </p:sp>
+    </p:spTree>
+    <p:extLst>
+      <p:ext uri="{BB962C8B-B14F-4D97-AF65-F5344CB8AC3E}">
+        <p14:creationId xmlns:p14="http://schemas.microsoft.com/office/powerpoint/2010/main" val="18416038"/>
+      </p:ext>
+    </p:extLst>
+  </p:cSld>
+  <p:clrMapOvr>
+    <a:masterClrMapping/>
+  </p:clrMapOvr>
+  <mc:AlternateContent xmlns:mc="http://schemas.openxmlformats.org/markup-compatibility/2006" xmlns:p14="http://schemas.microsoft.com/office/powerpoint/2010/main">
+    <mc:Choice Requires="p14">
+      <p:transition p14:dur="300">
+        <p:fade/>
+      </p:transition>
+    </mc:Choice>
+    <mc:Fallback xmlns="">
+      <p:transition>
+        <p:fade/>
+      </p:transition>
+    </mc:Fallback>
+  </mc:AlternateContent>
+</p:sld>
+</file>
+
+<file path=ppt/slides/slide59.xml><?xml version="1.0" encoding="utf-8"?>
 <p:sld xmlns:a="http://schemas.openxmlformats.org/drawingml/2006/main" xmlns:r="http://schemas.openxmlformats.org/officeDocument/2006/relationships" xmlns:p="http://schemas.openxmlformats.org/presentationml/2006/main">
   <p:cSld>
     <p:spTree>
@@ -20383,7 +24073,115 @@
 </p:sld>
 </file>
 
-<file path=ppt/slides/slide49.xml><?xml version="1.0" encoding="utf-8"?>
+<file path=ppt/slides/slide6.xml><?xml version="1.0" encoding="utf-8"?>
+<p:sld xmlns:a="http://schemas.openxmlformats.org/drawingml/2006/main" xmlns:r="http://schemas.openxmlformats.org/officeDocument/2006/relationships" xmlns:p="http://schemas.openxmlformats.org/presentationml/2006/main">
+  <p:cSld>
+    <p:spTree>
+      <p:nvGrpSpPr>
+        <p:cNvPr id="1" name=""/>
+        <p:cNvGrpSpPr/>
+        <p:nvPr/>
+      </p:nvGrpSpPr>
+      <p:grpSpPr>
+        <a:xfrm>
+          <a:off x="0" y="0"/>
+          <a:ext cx="0" cy="0"/>
+          <a:chOff x="0" y="0"/>
+          <a:chExt cx="0" cy="0"/>
+        </a:xfrm>
+      </p:grpSpPr>
+      <p:sp>
+        <p:nvSpPr>
+          <p:cNvPr id="2" name="Title 1">
+            <a:extLst>
+              <a:ext uri="{FF2B5EF4-FFF2-40B4-BE49-F238E27FC236}">
+                <a16:creationId xmlns:a16="http://schemas.microsoft.com/office/drawing/2014/main" id="{8EEF9218-B50A-424A-A99D-57BA08F4A8E3}"/>
+              </a:ext>
+            </a:extLst>
+          </p:cNvPr>
+          <p:cNvSpPr>
+            <a:spLocks noGrp="1"/>
+          </p:cNvSpPr>
+          <p:nvPr>
+            <p:ph type="title"/>
+          </p:nvPr>
+        </p:nvSpPr>
+        <p:spPr/>
+        <p:txBody>
+          <a:bodyPr/>
+          <a:lstStyle/>
+          <a:p>
+            <a:endParaRPr lang="en-GB" dirty="0"/>
+          </a:p>
+        </p:txBody>
+      </p:sp>
+      <p:sp>
+        <p:nvSpPr>
+          <p:cNvPr id="4" name="TextBox 3">
+            <a:extLst>
+              <a:ext uri="{FF2B5EF4-FFF2-40B4-BE49-F238E27FC236}">
+                <a16:creationId xmlns:a16="http://schemas.microsoft.com/office/drawing/2014/main" id="{31426854-EE0B-4A5A-AC6D-2BF50C4B1D90}"/>
+              </a:ext>
+            </a:extLst>
+          </p:cNvPr>
+          <p:cNvSpPr txBox="1"/>
+          <p:nvPr/>
+        </p:nvSpPr>
+        <p:spPr>
+          <a:xfrm>
+            <a:off x="2052408" y="3136612"/>
+            <a:ext cx="8087183" cy="584775"/>
+          </a:xfrm>
+          <a:prstGeom prst="rect">
+            <a:avLst/>
+          </a:prstGeom>
+          <a:noFill/>
+        </p:spPr>
+        <p:txBody>
+          <a:bodyPr wrap="square" rtlCol="0">
+            <a:spAutoFit/>
+          </a:bodyPr>
+          <a:lstStyle/>
+          <a:p>
+            <a:pPr algn="ctr"/>
+            <a:r>
+              <a:rPr lang="en-GB" sz="3200" dirty="0"/>
+              <a:t>Structure arrays</a:t>
+            </a:r>
+            <a:endParaRPr lang="en-GB" sz="2800" dirty="0">
+              <a:solidFill>
+                <a:schemeClr val="tx1"/>
+              </a:solidFill>
+            </a:endParaRPr>
+          </a:p>
+        </p:txBody>
+      </p:sp>
+    </p:spTree>
+    <p:extLst>
+      <p:ext uri="{BB962C8B-B14F-4D97-AF65-F5344CB8AC3E}">
+        <p14:creationId xmlns:p14="http://schemas.microsoft.com/office/powerpoint/2010/main" val="3173263421"/>
+      </p:ext>
+    </p:extLst>
+  </p:cSld>
+  <p:clrMapOvr>
+    <a:masterClrMapping/>
+  </p:clrMapOvr>
+  <mc:AlternateContent xmlns:mc="http://schemas.openxmlformats.org/markup-compatibility/2006" xmlns:p14="http://schemas.microsoft.com/office/powerpoint/2010/main">
+    <mc:Choice Requires="p14">
+      <p:transition p14:dur="300">
+        <p:fade/>
+      </p:transition>
+    </mc:Choice>
+    <mc:Fallback xmlns="">
+      <p:transition>
+        <p:fade/>
+      </p:transition>
+    </mc:Fallback>
+  </mc:AlternateContent>
+</p:sld>
+</file>
+
+<file path=ppt/slides/slide60.xml><?xml version="1.0" encoding="utf-8"?>
 <p:sld xmlns:a="http://schemas.openxmlformats.org/drawingml/2006/main" xmlns:r="http://schemas.openxmlformats.org/officeDocument/2006/relationships" xmlns:p="http://schemas.openxmlformats.org/presentationml/2006/main">
   <p:cSld>
     <p:spTree>
@@ -20815,310 +24613,6 @@
     <p:extLst>
       <p:ext uri="{BB962C8B-B14F-4D97-AF65-F5344CB8AC3E}">
         <p14:creationId xmlns:p14="http://schemas.microsoft.com/office/powerpoint/2010/main" val="1299104037"/>
-      </p:ext>
-    </p:extLst>
-  </p:cSld>
-  <p:clrMapOvr>
-    <a:masterClrMapping/>
-  </p:clrMapOvr>
-  <mc:AlternateContent xmlns:mc="http://schemas.openxmlformats.org/markup-compatibility/2006" xmlns:p14="http://schemas.microsoft.com/office/powerpoint/2010/main">
-    <mc:Choice Requires="p14">
-      <p:transition p14:dur="300">
-        <p:fade/>
-      </p:transition>
-    </mc:Choice>
-    <mc:Fallback xmlns="">
-      <p:transition>
-        <p:fade/>
-      </p:transition>
-    </mc:Fallback>
-  </mc:AlternateContent>
-</p:sld>
-</file>
-
-<file path=ppt/slides/slide5.xml><?xml version="1.0" encoding="utf-8"?>
-<p:sld xmlns:a="http://schemas.openxmlformats.org/drawingml/2006/main" xmlns:r="http://schemas.openxmlformats.org/officeDocument/2006/relationships" xmlns:p="http://schemas.openxmlformats.org/presentationml/2006/main">
-  <p:cSld>
-    <p:spTree>
-      <p:nvGrpSpPr>
-        <p:cNvPr id="1" name=""/>
-        <p:cNvGrpSpPr/>
-        <p:nvPr/>
-      </p:nvGrpSpPr>
-      <p:grpSpPr>
-        <a:xfrm>
-          <a:off x="0" y="0"/>
-          <a:ext cx="0" cy="0"/>
-          <a:chOff x="0" y="0"/>
-          <a:chExt cx="0" cy="0"/>
-        </a:xfrm>
-      </p:grpSpPr>
-      <p:sp>
-        <p:nvSpPr>
-          <p:cNvPr id="2" name="Title 1">
-            <a:extLst>
-              <a:ext uri="{FF2B5EF4-FFF2-40B4-BE49-F238E27FC236}">
-                <a16:creationId xmlns:a16="http://schemas.microsoft.com/office/drawing/2014/main" id="{FB0D9636-2B3A-4E3D-9B13-904FF3CE8CE3}"/>
-              </a:ext>
-            </a:extLst>
-          </p:cNvPr>
-          <p:cNvSpPr>
-            <a:spLocks noGrp="1"/>
-          </p:cNvSpPr>
-          <p:nvPr>
-            <p:ph type="title"/>
-          </p:nvPr>
-        </p:nvSpPr>
-        <p:spPr/>
-        <p:txBody>
-          <a:bodyPr/>
-          <a:lstStyle/>
-          <a:p>
-            <a:r>
-              <a:rPr lang="en-GB" dirty="0"/>
-              <a:t>Advanced data structures</a:t>
-            </a:r>
-          </a:p>
-        </p:txBody>
-      </p:sp>
-      <p:sp>
-        <p:nvSpPr>
-          <p:cNvPr id="3" name="Content Placeholder 2">
-            <a:extLst>
-              <a:ext uri="{FF2B5EF4-FFF2-40B4-BE49-F238E27FC236}">
-                <a16:creationId xmlns:a16="http://schemas.microsoft.com/office/drawing/2014/main" id="{DFE43EAF-8F5E-44D2-BF28-45DAFCB5DD96}"/>
-              </a:ext>
-            </a:extLst>
-          </p:cNvPr>
-          <p:cNvSpPr>
-            <a:spLocks noGrp="1"/>
-          </p:cNvSpPr>
-          <p:nvPr>
-            <p:ph idx="1"/>
-          </p:nvPr>
-        </p:nvSpPr>
-        <p:spPr/>
-        <p:txBody>
-          <a:bodyPr/>
-          <a:lstStyle/>
-          <a:p>
-            <a:r>
-              <a:rPr lang="en-GB" dirty="0"/>
-              <a:t>Arrays and matrices recap</a:t>
-            </a:r>
-          </a:p>
-          <a:p>
-            <a:pPr lvl="1"/>
-            <a:r>
-              <a:rPr lang="en-GB" dirty="0"/>
-              <a:t>Arrays are a regular grid of numbers in N dimensions</a:t>
-            </a:r>
-          </a:p>
-          <a:p>
-            <a:pPr lvl="1"/>
-            <a:r>
-              <a:rPr lang="en-GB" dirty="0"/>
-              <a:t>Vectors are 1D arrays, matrices are 2D arrays</a:t>
-            </a:r>
-          </a:p>
-          <a:p>
-            <a:pPr lvl="1"/>
-            <a:r>
-              <a:rPr lang="en-GB" dirty="0">
-                <a:sym typeface="Wingdings" panose="05000000000000000000" pitchFamily="2" charset="2"/>
-              </a:rPr>
-              <a:t> </a:t>
-            </a:r>
-            <a:r>
-              <a:rPr lang="en-GB" dirty="0"/>
-              <a:t>Fast access to subsets via indexing</a:t>
-            </a:r>
-          </a:p>
-          <a:p>
-            <a:pPr lvl="1"/>
-            <a:r>
-              <a:rPr lang="en-GB" dirty="0">
-                <a:sym typeface="Wingdings" panose="05000000000000000000" pitchFamily="2" charset="2"/>
-              </a:rPr>
-              <a:t> </a:t>
-            </a:r>
-            <a:r>
-              <a:rPr lang="en-GB" dirty="0"/>
-              <a:t>Fast calculations on all values</a:t>
-            </a:r>
-          </a:p>
-          <a:p>
-            <a:pPr lvl="1"/>
-            <a:r>
-              <a:rPr lang="en-GB" dirty="0">
-                <a:sym typeface="Wingdings" panose="05000000000000000000" pitchFamily="2" charset="2"/>
-              </a:rPr>
-              <a:t> </a:t>
-            </a:r>
-            <a:r>
-              <a:rPr lang="en-GB" dirty="0"/>
-              <a:t>Can only store numeric values</a:t>
-            </a:r>
-          </a:p>
-          <a:p>
-            <a:pPr lvl="1"/>
-            <a:endParaRPr lang="en-GB" sz="1200" dirty="0"/>
-          </a:p>
-          <a:p>
-            <a:r>
-              <a:rPr lang="en-GB" dirty="0"/>
-              <a:t>Alternatives for mixed data types</a:t>
-            </a:r>
-          </a:p>
-          <a:p>
-            <a:pPr lvl="1"/>
-            <a:r>
-              <a:rPr lang="en-GB" dirty="0"/>
-              <a:t>Cell arrays</a:t>
-            </a:r>
-          </a:p>
-          <a:p>
-            <a:pPr lvl="1"/>
-            <a:r>
-              <a:rPr lang="en-GB" dirty="0"/>
-              <a:t>Tables</a:t>
-            </a:r>
-          </a:p>
-          <a:p>
-            <a:pPr lvl="1"/>
-            <a:r>
-              <a:rPr lang="en-GB" dirty="0"/>
-              <a:t>Structure arrays (aka “structs”)</a:t>
-            </a:r>
-          </a:p>
-          <a:p>
-            <a:pPr marL="457200" lvl="1" indent="0">
-              <a:buNone/>
-            </a:pPr>
-            <a:endParaRPr lang="en-GB" dirty="0"/>
-          </a:p>
-          <a:p>
-            <a:pPr lvl="1"/>
-            <a:endParaRPr lang="en-GB" dirty="0"/>
-          </a:p>
-          <a:p>
-            <a:pPr lvl="1"/>
-            <a:endParaRPr lang="en-GB" dirty="0"/>
-          </a:p>
-        </p:txBody>
-      </p:sp>
-    </p:spTree>
-    <p:extLst>
-      <p:ext uri="{BB962C8B-B14F-4D97-AF65-F5344CB8AC3E}">
-        <p14:creationId xmlns:p14="http://schemas.microsoft.com/office/powerpoint/2010/main" val="875391173"/>
-      </p:ext>
-    </p:extLst>
-  </p:cSld>
-  <p:clrMapOvr>
-    <a:masterClrMapping/>
-  </p:clrMapOvr>
-  <mc:AlternateContent xmlns:mc="http://schemas.openxmlformats.org/markup-compatibility/2006" xmlns:p14="http://schemas.microsoft.com/office/powerpoint/2010/main">
-    <mc:Choice Requires="p14">
-      <p:transition p14:dur="300">
-        <p:fade/>
-      </p:transition>
-    </mc:Choice>
-    <mc:Fallback xmlns="">
-      <p:transition>
-        <p:fade/>
-      </p:transition>
-    </mc:Fallback>
-  </mc:AlternateContent>
-</p:sld>
-</file>
-
-<file path=ppt/slides/slide6.xml><?xml version="1.0" encoding="utf-8"?>
-<p:sld xmlns:a="http://schemas.openxmlformats.org/drawingml/2006/main" xmlns:r="http://schemas.openxmlformats.org/officeDocument/2006/relationships" xmlns:p="http://schemas.openxmlformats.org/presentationml/2006/main">
-  <p:cSld>
-    <p:spTree>
-      <p:nvGrpSpPr>
-        <p:cNvPr id="1" name=""/>
-        <p:cNvGrpSpPr/>
-        <p:nvPr/>
-      </p:nvGrpSpPr>
-      <p:grpSpPr>
-        <a:xfrm>
-          <a:off x="0" y="0"/>
-          <a:ext cx="0" cy="0"/>
-          <a:chOff x="0" y="0"/>
-          <a:chExt cx="0" cy="0"/>
-        </a:xfrm>
-      </p:grpSpPr>
-      <p:sp>
-        <p:nvSpPr>
-          <p:cNvPr id="2" name="Title 1">
-            <a:extLst>
-              <a:ext uri="{FF2B5EF4-FFF2-40B4-BE49-F238E27FC236}">
-                <a16:creationId xmlns:a16="http://schemas.microsoft.com/office/drawing/2014/main" id="{8EEF9218-B50A-424A-A99D-57BA08F4A8E3}"/>
-              </a:ext>
-            </a:extLst>
-          </p:cNvPr>
-          <p:cNvSpPr>
-            <a:spLocks noGrp="1"/>
-          </p:cNvSpPr>
-          <p:nvPr>
-            <p:ph type="title"/>
-          </p:nvPr>
-        </p:nvSpPr>
-        <p:spPr/>
-        <p:txBody>
-          <a:bodyPr/>
-          <a:lstStyle/>
-          <a:p>
-            <a:endParaRPr lang="en-GB" dirty="0"/>
-          </a:p>
-        </p:txBody>
-      </p:sp>
-      <p:sp>
-        <p:nvSpPr>
-          <p:cNvPr id="4" name="TextBox 3">
-            <a:extLst>
-              <a:ext uri="{FF2B5EF4-FFF2-40B4-BE49-F238E27FC236}">
-                <a16:creationId xmlns:a16="http://schemas.microsoft.com/office/drawing/2014/main" id="{31426854-EE0B-4A5A-AC6D-2BF50C4B1D90}"/>
-              </a:ext>
-            </a:extLst>
-          </p:cNvPr>
-          <p:cNvSpPr txBox="1"/>
-          <p:nvPr/>
-        </p:nvSpPr>
-        <p:spPr>
-          <a:xfrm>
-            <a:off x="2052408" y="3136612"/>
-            <a:ext cx="8087183" cy="584775"/>
-          </a:xfrm>
-          <a:prstGeom prst="rect">
-            <a:avLst/>
-          </a:prstGeom>
-          <a:noFill/>
-        </p:spPr>
-        <p:txBody>
-          <a:bodyPr wrap="square" rtlCol="0">
-            <a:spAutoFit/>
-          </a:bodyPr>
-          <a:lstStyle/>
-          <a:p>
-            <a:pPr algn="ctr"/>
-            <a:r>
-              <a:rPr lang="en-GB" sz="3200" dirty="0"/>
-              <a:t>Structure arrays</a:t>
-            </a:r>
-            <a:endParaRPr lang="en-GB" sz="2800" dirty="0">
-              <a:solidFill>
-                <a:schemeClr val="tx1"/>
-              </a:solidFill>
-            </a:endParaRPr>
-          </a:p>
-        </p:txBody>
-      </p:sp>
-    </p:spTree>
-    <p:extLst>
-      <p:ext uri="{BB962C8B-B14F-4D97-AF65-F5344CB8AC3E}">
-        <p14:creationId xmlns:p14="http://schemas.microsoft.com/office/powerpoint/2010/main" val="3173263421"/>
       </p:ext>
     </p:extLst>
   </p:cSld>

</xml_diff>